<commit_message>
Sample SIze presentation has been updated
Some errors have been corrected and sample size for testing has been introduced (yet to be completed)
</commit_message>
<xml_diff>
--- a/Sessio_5/EBB_2018_Session_5_Sample_Size_(1).pptx
+++ b/Sessio_5/EBB_2018_Session_5_Sample_Size_(1).pptx
@@ -5,7 +5,7 @@
     <p:sldMasterId id="2147483648" r:id="rId1"/>
   </p:sldMasterIdLst>
   <p:notesMasterIdLst>
-    <p:notesMasterId r:id="rId22"/>
+    <p:notesMasterId r:id="rId25"/>
   </p:notesMasterIdLst>
   <p:sldIdLst>
     <p:sldId id="341" r:id="rId2"/>
@@ -28,6 +28,9 @@
     <p:sldId id="415" r:id="rId19"/>
     <p:sldId id="400" r:id="rId20"/>
     <p:sldId id="416" r:id="rId21"/>
+    <p:sldId id="426" r:id="rId22"/>
+    <p:sldId id="427" r:id="rId23"/>
+    <p:sldId id="428" r:id="rId24"/>
   </p:sldIdLst>
   <p:sldSz cx="9906000" cy="6858000" type="A4"/>
   <p:notesSz cx="7099300" cy="10234613"/>
@@ -275,7 +278,7 @@
               <a:pPr>
                 <a:defRPr/>
               </a:pPr>
-              <a:t>28/1/2019</a:t>
+              <a:t>3/2/2019</a:t>
             </a:fld>
             <a:endParaRPr lang="ca-ES"/>
           </a:p>
@@ -3343,7 +3346,7 @@
           <a:bodyPr/>
           <a:lstStyle>
             <a:lvl1pPr>
-              <a:defRPr sz="3000">
+              <a:defRPr sz="2800">
                 <a:solidFill>
                   <a:srgbClr val="993489"/>
                 </a:solidFill>
@@ -3353,7 +3356,7 @@
               </a:defRPr>
             </a:lvl1pPr>
             <a:lvl2pPr>
-              <a:defRPr>
+              <a:defRPr sz="2400">
                 <a:solidFill>
                   <a:srgbClr val="993489"/>
                 </a:solidFill>
@@ -3363,7 +3366,7 @@
               </a:defRPr>
             </a:lvl2pPr>
             <a:lvl3pPr>
-              <a:defRPr>
+              <a:defRPr sz="2000">
                 <a:solidFill>
                   <a:srgbClr val="993489"/>
                 </a:solidFill>
@@ -3373,7 +3376,7 @@
               </a:defRPr>
             </a:lvl3pPr>
             <a:lvl4pPr>
-              <a:defRPr>
+              <a:defRPr sz="1800">
                 <a:solidFill>
                   <a:srgbClr val="993489"/>
                 </a:solidFill>
@@ -3383,7 +3386,7 @@
               </a:defRPr>
             </a:lvl4pPr>
             <a:lvl5pPr>
-              <a:defRPr>
+              <a:defRPr sz="1800">
                 <a:solidFill>
                   <a:srgbClr val="993489"/>
                 </a:solidFill>
@@ -7596,11 +7599,19 @@
             </a:r>
             <a:r>
               <a:rPr lang="ca-ES" altLang="es-ES" sz="2000" u="none" dirty="0" err="1"/>
-              <a:t>thir</a:t>
+              <a:t>their</a:t>
             </a:r>
             <a:r>
               <a:rPr lang="ca-ES" altLang="es-ES" sz="2000" u="none" dirty="0"/>
-              <a:t> genètic profil·le </a:t>
+              <a:t> genètic </a:t>
+            </a:r>
+            <a:r>
+              <a:rPr lang="ca-ES" altLang="es-ES" sz="2000" u="none" dirty="0" err="1"/>
+              <a:t>profile</a:t>
+            </a:r>
+            <a:r>
+              <a:rPr lang="ca-ES" altLang="es-ES" sz="2000" u="none" dirty="0"/>
+              <a:t> </a:t>
             </a:r>
             <a:r>
               <a:rPr lang="ca-ES" altLang="es-ES" sz="2000" u="none" dirty="0" err="1"/>
@@ -9267,7 +9278,7 @@
           <a:graphicData uri="http://schemas.openxmlformats.org/presentationml/2006/ole">
             <mc:AlternateContent xmlns:mc="http://schemas.openxmlformats.org/markup-compatibility/2006">
               <mc:Choice xmlns:v="urn:schemas-microsoft-com:vml" Requires="v">
-                <p:oleObj spid="_x0000_s9248" name="Ecuación" r:id="rId3" imgW="2438400" imgH="444500" progId="Equation.3">
+                <p:oleObj spid="_x0000_s9263" name="Ecuación" r:id="rId3" imgW="2438400" imgH="444500" progId="Equation.3">
                   <p:embed/>
                 </p:oleObj>
               </mc:Choice>
@@ -9558,7 +9569,7 @@
           <a:graphicData uri="http://schemas.openxmlformats.org/presentationml/2006/ole">
             <mc:AlternateContent xmlns:mc="http://schemas.openxmlformats.org/markup-compatibility/2006">
               <mc:Choice xmlns:v="urn:schemas-microsoft-com:vml" Requires="v">
-                <p:oleObj spid="_x0000_s9249" name="Ecuación" r:id="rId5" imgW="1282700" imgH="203200" progId="Equation.3">
+                <p:oleObj spid="_x0000_s9264" name="Ecuación" r:id="rId5" imgW="1282700" imgH="203200" progId="Equation.3">
                   <p:embed/>
                 </p:oleObj>
               </mc:Choice>
@@ -9659,7 +9670,7 @@
           <a:graphicData uri="http://schemas.openxmlformats.org/presentationml/2006/ole">
             <mc:AlternateContent xmlns:mc="http://schemas.openxmlformats.org/markup-compatibility/2006">
               <mc:Choice xmlns:v="urn:schemas-microsoft-com:vml" Requires="v">
-                <p:oleObj spid="_x0000_s9250" name="Ecuación" r:id="rId7" imgW="952087" imgH="393529" progId="Equation.3">
+                <p:oleObj spid="_x0000_s9265" name="Ecuación" r:id="rId7" imgW="952087" imgH="393529" progId="Equation.3">
                   <p:embed/>
                 </p:oleObj>
               </mc:Choice>
@@ -9972,8 +9983,8 @@
         </p:nvSpPr>
         <p:spPr>
           <a:xfrm>
-            <a:off x="495300" y="404664"/>
-            <a:ext cx="8915400" cy="1012974"/>
+            <a:off x="1208584" y="404664"/>
+            <a:ext cx="6840760" cy="504056"/>
           </a:xfrm>
         </p:spPr>
         <p:txBody>
@@ -9981,23 +9992,23 @@
           <a:lstStyle/>
           <a:p>
             <a:r>
-              <a:rPr lang="ca-ES" sz="2800" dirty="0"/>
+              <a:rPr lang="ca-ES" sz="2400" dirty="0"/>
               <a:t>Computing </a:t>
             </a:r>
             <a:r>
-              <a:rPr lang="ca-ES" sz="2800" dirty="0" err="1"/>
+              <a:rPr lang="ca-ES" sz="2400" dirty="0" err="1"/>
               <a:t>confidence</a:t>
             </a:r>
             <a:r>
-              <a:rPr lang="ca-ES" sz="2800" dirty="0"/>
+              <a:rPr lang="ca-ES" sz="2400" dirty="0"/>
               <a:t> interval </a:t>
             </a:r>
             <a:r>
-              <a:rPr lang="ca-ES" sz="2800" dirty="0" err="1"/>
+              <a:rPr lang="ca-ES" sz="2400" dirty="0" err="1"/>
               <a:t>with</a:t>
             </a:r>
             <a:r>
-              <a:rPr lang="ca-ES" sz="2800" dirty="0"/>
+              <a:rPr lang="ca-ES" sz="2400" dirty="0"/>
               <a:t> R</a:t>
             </a:r>
           </a:p>
@@ -11022,7 +11033,7 @@
         <p:spPr bwMode="auto">
           <a:xfrm>
             <a:off x="415925" y="1341438"/>
-            <a:ext cx="8997950" cy="2800767"/>
+            <a:ext cx="8997950" cy="3293209"/>
           </a:xfrm>
           <a:prstGeom prst="rect">
             <a:avLst/>
@@ -11276,14 +11287,14 @@
                 <a:latin typeface="Univers" pitchFamily="34" charset="0"/>
                 <a:cs typeface="Courier New" pitchFamily="49" charset="0"/>
               </a:rPr>
-              <a:t> can compute “</a:t>
+              <a:t> can compute </a:t>
             </a:r>
             <a:r>
               <a:rPr lang="es-ES_tradnl" altLang="ca-ES" sz="3200" u="none" dirty="0" err="1">
                 <a:latin typeface="Univers" pitchFamily="34" charset="0"/>
                 <a:cs typeface="Courier New" pitchFamily="49" charset="0"/>
               </a:rPr>
-              <a:t>sample</a:t>
+              <a:t>the</a:t>
             </a:r>
             <a:r>
               <a:rPr lang="es-ES_tradnl" altLang="ca-ES" sz="3200" u="none" dirty="0">
@@ -11297,14 +11308,112 @@
                 <a:latin typeface="Univers" pitchFamily="34" charset="0"/>
                 <a:cs typeface="Courier New" pitchFamily="49" charset="0"/>
               </a:rPr>
-              <a:t>size</a:t>
+              <a:t>sample</a:t>
             </a:r>
             <a:r>
               <a:rPr lang="es-ES_tradnl" altLang="ca-ES" sz="3200" u="none" dirty="0">
                 <a:latin typeface="Univers" pitchFamily="34" charset="0"/>
                 <a:cs typeface="Courier New" pitchFamily="49" charset="0"/>
               </a:rPr>
-              <a:t>”</a:t>
+              <a:t> </a:t>
+            </a:r>
+            <a:r>
+              <a:rPr lang="es-ES_tradnl" altLang="ca-ES" sz="3200" u="none" dirty="0" err="1">
+                <a:latin typeface="Univers" pitchFamily="34" charset="0"/>
+                <a:cs typeface="Courier New" pitchFamily="49" charset="0"/>
+              </a:rPr>
+              <a:t>size</a:t>
+            </a:r>
+            <a:r>
+              <a:rPr lang="es-ES_tradnl" altLang="ca-ES" sz="3200" u="none" dirty="0">
+                <a:latin typeface="Univers" pitchFamily="34" charset="0"/>
+                <a:cs typeface="Courier New" pitchFamily="49" charset="0"/>
+              </a:rPr>
+              <a:t> </a:t>
+            </a:r>
+            <a:r>
+              <a:rPr lang="es-ES_tradnl" altLang="ca-ES" sz="3200" u="none" dirty="0" err="1">
+                <a:latin typeface="Univers" pitchFamily="34" charset="0"/>
+                <a:cs typeface="Courier New" pitchFamily="49" charset="0"/>
+              </a:rPr>
+              <a:t>needed</a:t>
+            </a:r>
+            <a:r>
+              <a:rPr lang="es-ES_tradnl" altLang="ca-ES" sz="3200" u="none" dirty="0">
+                <a:latin typeface="Univers" pitchFamily="34" charset="0"/>
+                <a:cs typeface="Courier New" pitchFamily="49" charset="0"/>
+              </a:rPr>
+              <a:t> </a:t>
+            </a:r>
+            <a:r>
+              <a:rPr lang="es-ES_tradnl" altLang="ca-ES" sz="3200" u="none" dirty="0" err="1">
+                <a:latin typeface="Univers" pitchFamily="34" charset="0"/>
+                <a:cs typeface="Courier New" pitchFamily="49" charset="0"/>
+              </a:rPr>
+              <a:t>to</a:t>
+            </a:r>
+            <a:r>
+              <a:rPr lang="es-ES_tradnl" altLang="ca-ES" sz="3200" u="none" dirty="0">
+                <a:latin typeface="Univers" pitchFamily="34" charset="0"/>
+                <a:cs typeface="Courier New" pitchFamily="49" charset="0"/>
+              </a:rPr>
+              <a:t> </a:t>
+            </a:r>
+            <a:r>
+              <a:rPr lang="es-ES_tradnl" altLang="ca-ES" sz="3200" u="none" dirty="0" err="1">
+                <a:latin typeface="Univers" pitchFamily="34" charset="0"/>
+                <a:cs typeface="Courier New" pitchFamily="49" charset="0"/>
+              </a:rPr>
+              <a:t>estimate</a:t>
+            </a:r>
+            <a:r>
+              <a:rPr lang="es-ES_tradnl" altLang="ca-ES" sz="3200" u="none" dirty="0">
+                <a:latin typeface="Univers" pitchFamily="34" charset="0"/>
+                <a:cs typeface="Courier New" pitchFamily="49" charset="0"/>
+              </a:rPr>
+              <a:t> </a:t>
+            </a:r>
+            <a:r>
+              <a:rPr lang="es-ES_tradnl" altLang="ca-ES" sz="3200" u="none" dirty="0" err="1">
+                <a:latin typeface="Univers" pitchFamily="34" charset="0"/>
+                <a:cs typeface="Courier New" pitchFamily="49" charset="0"/>
+              </a:rPr>
+              <a:t>the</a:t>
+            </a:r>
+            <a:r>
+              <a:rPr lang="es-ES_tradnl" altLang="ca-ES" sz="3200" u="none" dirty="0">
+                <a:latin typeface="Univers" pitchFamily="34" charset="0"/>
+                <a:cs typeface="Courier New" pitchFamily="49" charset="0"/>
+              </a:rPr>
+              <a:t> mean </a:t>
+            </a:r>
+            <a:r>
+              <a:rPr lang="es-ES_tradnl" altLang="ca-ES" sz="3200" u="none" dirty="0" err="1">
+                <a:latin typeface="Univers" pitchFamily="34" charset="0"/>
+                <a:cs typeface="Courier New" pitchFamily="49" charset="0"/>
+              </a:rPr>
+              <a:t>or</a:t>
+            </a:r>
+            <a:r>
+              <a:rPr lang="es-ES_tradnl" altLang="ca-ES" sz="3200" u="none" dirty="0">
+                <a:latin typeface="Univers" pitchFamily="34" charset="0"/>
+                <a:cs typeface="Courier New" pitchFamily="49" charset="0"/>
+              </a:rPr>
+              <a:t> </a:t>
+            </a:r>
+            <a:r>
+              <a:rPr lang="es-ES_tradnl" altLang="ca-ES" sz="3200" u="none" dirty="0" err="1">
+                <a:latin typeface="Univers" pitchFamily="34" charset="0"/>
+                <a:cs typeface="Courier New" pitchFamily="49" charset="0"/>
+              </a:rPr>
+              <a:t>percentage</a:t>
+            </a:r>
+            <a:r>
+              <a:rPr lang="es-ES_tradnl" altLang="ca-ES" sz="3200" u="none" dirty="0">
+                <a:latin typeface="Univers" pitchFamily="34" charset="0"/>
+                <a:cs typeface="Courier New" pitchFamily="49" charset="0"/>
+              </a:rPr>
+              <a:t>. </a:t>
             </a:r>
             <a:endParaRPr lang="es-ES_tradnl" altLang="ca-ES" sz="2400" u="none" dirty="0">
               <a:latin typeface="Univers" pitchFamily="34" charset="0"/>
@@ -12760,7 +12869,7 @@
           <a:graphicData uri="http://schemas.openxmlformats.org/presentationml/2006/ole">
             <mc:AlternateContent xmlns:mc="http://schemas.openxmlformats.org/markup-compatibility/2006">
               <mc:Choice xmlns:v="urn:schemas-microsoft-com:vml" Requires="v">
-                <p:oleObj spid="_x0000_s5147" name="Equation" r:id="rId3" imgW="2793960" imgH="1523880" progId="Equation.DSMT4">
+                <p:oleObj spid="_x0000_s5152" name="Equation" r:id="rId3" imgW="2793960" imgH="1523880" progId="Equation.DSMT4">
                   <p:embed/>
                 </p:oleObj>
               </mc:Choice>
@@ -13374,7 +13483,7 @@
                 <a:latin typeface="Univers" pitchFamily="34" charset="0"/>
                 <a:cs typeface="Courier New" pitchFamily="49" charset="0"/>
               </a:rPr>
-              <a:t>precisio</a:t>
+              <a:t>precision</a:t>
             </a:r>
             <a:r>
               <a:rPr lang="es-ES_tradnl" altLang="ca-ES" sz="2400" u="none" dirty="0">
@@ -13436,7 +13545,7 @@
                 <a:latin typeface="Univers" pitchFamily="34" charset="0"/>
                 <a:cs typeface="Courier New" pitchFamily="49" charset="0"/>
               </a:rPr>
-              <a:t> 95% </a:t>
+              <a:t> 95%, </a:t>
             </a:r>
             <a:r>
               <a:rPr lang="es-ES_tradnl" altLang="ca-ES" sz="2400" u="none" dirty="0" err="1">
@@ -13534,7 +13643,7 @@
                 <a:latin typeface="Univers" pitchFamily="34" charset="0"/>
                 <a:cs typeface="Courier New" pitchFamily="49" charset="0"/>
               </a:rPr>
-              <a:t> 20 </a:t>
+              <a:t> 20, </a:t>
             </a:r>
             <a:r>
               <a:rPr lang="es-ES_tradnl" altLang="ca-ES" sz="2400" u="none" dirty="0" err="1">
@@ -15795,7 +15904,7 @@
           <a:graphicData uri="http://schemas.openxmlformats.org/presentationml/2006/ole">
             <mc:AlternateContent xmlns:mc="http://schemas.openxmlformats.org/markup-compatibility/2006">
               <mc:Choice xmlns:v="urn:schemas-microsoft-com:vml" Requires="v">
-                <p:oleObj spid="_x0000_s6172" name="Equation" r:id="rId4" imgW="2552400" imgH="1130040" progId="Equation.DSMT4">
+                <p:oleObj spid="_x0000_s6176" name="Equation" r:id="rId4" imgW="2552400" imgH="1130040" progId="Equation.DSMT4">
                   <p:embed/>
                 </p:oleObj>
               </mc:Choice>
@@ -29229,7 +29338,7 @@
             <a:pPr eaLnBrk="1" hangingPunct="1"/>
             <a:r>
               <a:rPr lang="en-GB" altLang="ca-ES" sz="2000" u="none" dirty="0"/>
-              <a:t>P                          0.125</a:t>
+              <a:t>P	                          0.125</a:t>
             </a:r>
           </a:p>
           <a:p>
@@ -29410,6 +29519,1443 @@
         </p:txBody>
       </p:sp>
     </p:spTree>
+  </p:cSld>
+  <p:clrMapOvr>
+    <a:masterClrMapping/>
+  </p:clrMapOvr>
+</p:sld>
+</file>
+
+<file path=ppt/slides/slide21.xml><?xml version="1.0" encoding="utf-8"?>
+<p:sld xmlns:a="http://schemas.openxmlformats.org/drawingml/2006/main" xmlns:r="http://schemas.openxmlformats.org/officeDocument/2006/relationships" xmlns:p="http://schemas.openxmlformats.org/presentationml/2006/main">
+  <p:cSld>
+    <p:spTree>
+      <p:nvGrpSpPr>
+        <p:cNvPr id="1" name=""/>
+        <p:cNvGrpSpPr/>
+        <p:nvPr/>
+      </p:nvGrpSpPr>
+      <p:grpSpPr>
+        <a:xfrm>
+          <a:off x="0" y="0"/>
+          <a:ext cx="0" cy="0"/>
+          <a:chOff x="0" y="0"/>
+          <a:chExt cx="0" cy="0"/>
+        </a:xfrm>
+      </p:grpSpPr>
+      <p:sp>
+        <p:nvSpPr>
+          <p:cNvPr id="2" name="Título 1">
+            <a:extLst>
+              <a:ext uri="{FF2B5EF4-FFF2-40B4-BE49-F238E27FC236}">
+                <a16:creationId xmlns:a16="http://schemas.microsoft.com/office/drawing/2014/main" id="{167F69B4-2FEB-40D9-93F8-FB2CB599362A}"/>
+              </a:ext>
+            </a:extLst>
+          </p:cNvPr>
+          <p:cNvSpPr>
+            <a:spLocks noGrp="1"/>
+          </p:cNvSpPr>
+          <p:nvPr>
+            <p:ph type="title"/>
+          </p:nvPr>
+        </p:nvSpPr>
+        <p:spPr>
+          <a:xfrm>
+            <a:off x="495300" y="404664"/>
+            <a:ext cx="7986092" cy="720080"/>
+          </a:xfrm>
+        </p:spPr>
+        <p:txBody>
+          <a:bodyPr/>
+          <a:lstStyle/>
+          <a:p>
+            <a:r>
+              <a:rPr lang="ca-ES" dirty="0" err="1"/>
+              <a:t>Sample</a:t>
+            </a:r>
+            <a:r>
+              <a:rPr lang="ca-ES" dirty="0"/>
+              <a:t> </a:t>
+            </a:r>
+            <a:r>
+              <a:rPr lang="ca-ES" dirty="0" err="1"/>
+              <a:t>size</a:t>
+            </a:r>
+            <a:r>
+              <a:rPr lang="ca-ES" dirty="0"/>
+              <a:t> </a:t>
+            </a:r>
+            <a:r>
+              <a:rPr lang="ca-ES" dirty="0" err="1"/>
+              <a:t>calculations</a:t>
+            </a:r>
+            <a:r>
+              <a:rPr lang="ca-ES" dirty="0"/>
+              <a:t> for </a:t>
+            </a:r>
+            <a:r>
+              <a:rPr lang="ca-ES" dirty="0" err="1"/>
+              <a:t>testing</a:t>
+            </a:r>
+            <a:endParaRPr lang="ca-ES" dirty="0"/>
+          </a:p>
+        </p:txBody>
+      </p:sp>
+      <p:sp>
+        <p:nvSpPr>
+          <p:cNvPr id="3" name="Marcador de contenido 2">
+            <a:extLst>
+              <a:ext uri="{FF2B5EF4-FFF2-40B4-BE49-F238E27FC236}">
+                <a16:creationId xmlns:a16="http://schemas.microsoft.com/office/drawing/2014/main" id="{BE1C8DE1-FEFD-423B-9000-A9CD211E2080}"/>
+              </a:ext>
+            </a:extLst>
+          </p:cNvPr>
+          <p:cNvSpPr>
+            <a:spLocks noGrp="1"/>
+          </p:cNvSpPr>
+          <p:nvPr>
+            <p:ph idx="1"/>
+          </p:nvPr>
+        </p:nvSpPr>
+        <p:spPr>
+          <a:xfrm>
+            <a:off x="495300" y="1124744"/>
+            <a:ext cx="8915400" cy="5001419"/>
+          </a:xfrm>
+        </p:spPr>
+        <p:txBody>
+          <a:bodyPr/>
+          <a:lstStyle/>
+          <a:p>
+            <a:r>
+              <a:rPr lang="ca-ES" dirty="0" err="1"/>
+              <a:t>Similarly</a:t>
+            </a:r>
+            <a:r>
+              <a:rPr lang="ca-ES" dirty="0"/>
+              <a:t> to </a:t>
+            </a:r>
+            <a:r>
+              <a:rPr lang="ca-ES" dirty="0" err="1"/>
+              <a:t>sample</a:t>
+            </a:r>
+            <a:r>
+              <a:rPr lang="ca-ES" dirty="0"/>
+              <a:t> </a:t>
+            </a:r>
+            <a:r>
+              <a:rPr lang="ca-ES" dirty="0" err="1"/>
+              <a:t>size</a:t>
+            </a:r>
+            <a:r>
+              <a:rPr lang="ca-ES" dirty="0"/>
+              <a:t> </a:t>
+            </a:r>
+            <a:r>
+              <a:rPr lang="ca-ES" dirty="0" err="1"/>
+              <a:t>calculations</a:t>
+            </a:r>
+            <a:r>
+              <a:rPr lang="ca-ES" dirty="0"/>
+              <a:t> for </a:t>
+            </a:r>
+            <a:r>
+              <a:rPr lang="ca-ES" dirty="0" err="1"/>
+              <a:t>estimation</a:t>
+            </a:r>
+            <a:r>
+              <a:rPr lang="ca-ES" dirty="0"/>
+              <a:t>, </a:t>
+            </a:r>
+            <a:r>
+              <a:rPr lang="ca-ES" dirty="0" err="1"/>
+              <a:t>several</a:t>
+            </a:r>
+            <a:r>
+              <a:rPr lang="ca-ES" dirty="0"/>
+              <a:t> </a:t>
+            </a:r>
+            <a:r>
+              <a:rPr lang="ca-ES" dirty="0" err="1"/>
+              <a:t>points</a:t>
+            </a:r>
+            <a:r>
+              <a:rPr lang="ca-ES" dirty="0"/>
+              <a:t> </a:t>
+            </a:r>
+            <a:r>
+              <a:rPr lang="ca-ES" dirty="0" err="1"/>
+              <a:t>need</a:t>
+            </a:r>
+            <a:r>
+              <a:rPr lang="ca-ES" dirty="0"/>
+              <a:t> to be </a:t>
+            </a:r>
+            <a:r>
+              <a:rPr lang="ca-ES" dirty="0" err="1"/>
+              <a:t>considered</a:t>
+            </a:r>
+            <a:r>
+              <a:rPr lang="ca-ES" dirty="0"/>
+              <a:t> so </a:t>
+            </a:r>
+            <a:r>
+              <a:rPr lang="ca-ES" dirty="0" err="1"/>
+              <a:t>that</a:t>
+            </a:r>
+            <a:r>
+              <a:rPr lang="ca-ES" dirty="0"/>
+              <a:t> </a:t>
+            </a:r>
+            <a:r>
+              <a:rPr lang="ca-ES" dirty="0" err="1"/>
+              <a:t>the</a:t>
+            </a:r>
+            <a:r>
+              <a:rPr lang="ca-ES" dirty="0"/>
+              <a:t> </a:t>
+            </a:r>
+            <a:r>
+              <a:rPr lang="ca-ES" dirty="0" err="1"/>
+              <a:t>right</a:t>
+            </a:r>
+            <a:r>
+              <a:rPr lang="ca-ES" dirty="0"/>
+              <a:t> </a:t>
+            </a:r>
+            <a:r>
+              <a:rPr lang="ca-ES" dirty="0" err="1"/>
+              <a:t>question</a:t>
+            </a:r>
+            <a:r>
+              <a:rPr lang="ca-ES" dirty="0"/>
+              <a:t> is:</a:t>
+            </a:r>
+          </a:p>
+          <a:p>
+            <a:endParaRPr lang="ca-ES" dirty="0"/>
+          </a:p>
+          <a:p>
+            <a:r>
+              <a:rPr lang="ca-ES" i="1" dirty="0" err="1"/>
+              <a:t>What</a:t>
+            </a:r>
+            <a:r>
+              <a:rPr lang="ca-ES" i="1" dirty="0"/>
+              <a:t> is </a:t>
+            </a:r>
+            <a:r>
+              <a:rPr lang="ca-ES" i="1" dirty="0" err="1"/>
+              <a:t>the</a:t>
+            </a:r>
+            <a:r>
+              <a:rPr lang="ca-ES" i="1" dirty="0"/>
+              <a:t> </a:t>
+            </a:r>
+            <a:r>
+              <a:rPr lang="ca-ES" i="1" dirty="0" err="1"/>
+              <a:t>sample</a:t>
+            </a:r>
+            <a:r>
+              <a:rPr lang="ca-ES" i="1" dirty="0"/>
+              <a:t> </a:t>
+            </a:r>
+            <a:r>
+              <a:rPr lang="ca-ES" i="1" dirty="0" err="1"/>
+              <a:t>size</a:t>
+            </a:r>
+            <a:r>
+              <a:rPr lang="ca-ES" i="1" dirty="0"/>
+              <a:t> </a:t>
+            </a:r>
+            <a:r>
+              <a:rPr lang="ca-ES" i="1" dirty="0" err="1"/>
+              <a:t>needed</a:t>
+            </a:r>
+            <a:r>
+              <a:rPr lang="ca-ES" i="1" dirty="0"/>
+              <a:t> to </a:t>
+            </a:r>
+            <a:r>
+              <a:rPr lang="ca-ES" i="1" dirty="0" err="1"/>
+              <a:t>detect</a:t>
+            </a:r>
+            <a:r>
+              <a:rPr lang="ca-ES" i="1" dirty="0"/>
+              <a:t> </a:t>
+            </a:r>
+            <a:r>
+              <a:rPr lang="ca-ES" i="1" dirty="0" err="1"/>
+              <a:t>at</a:t>
+            </a:r>
+            <a:r>
+              <a:rPr lang="ca-ES" i="1" dirty="0"/>
+              <a:t> </a:t>
+            </a:r>
+            <a:r>
+              <a:rPr lang="ca-ES" i="1" dirty="0" err="1"/>
+              <a:t>least</a:t>
+            </a:r>
+            <a:r>
+              <a:rPr lang="ca-ES" i="1" dirty="0"/>
+              <a:t> a </a:t>
+            </a:r>
+            <a:r>
+              <a:rPr lang="ca-ES" i="1" dirty="0" err="1"/>
+              <a:t>difference</a:t>
+            </a:r>
+            <a:r>
+              <a:rPr lang="ca-ES" i="1" dirty="0"/>
+              <a:t> </a:t>
+            </a:r>
+            <a:r>
+              <a:rPr lang="ca-ES" i="1" dirty="0">
+                <a:latin typeface="Symbol" panose="05050102010706020507" pitchFamily="18" charset="2"/>
+              </a:rPr>
+              <a:t>D</a:t>
+            </a:r>
+            <a:r>
+              <a:rPr lang="ca-ES" i="1" dirty="0"/>
+              <a:t> </a:t>
+            </a:r>
+            <a:r>
+              <a:rPr lang="ca-ES" i="1" dirty="0" err="1"/>
+              <a:t>with</a:t>
+            </a:r>
+            <a:r>
+              <a:rPr lang="ca-ES" i="1" dirty="0"/>
+              <a:t> </a:t>
+            </a:r>
+            <a:r>
+              <a:rPr lang="ca-ES" i="1" dirty="0" err="1"/>
+              <a:t>the</a:t>
+            </a:r>
+            <a:r>
+              <a:rPr lang="ca-ES" i="1" dirty="0"/>
+              <a:t> </a:t>
+            </a:r>
+            <a:r>
+              <a:rPr lang="ca-ES" i="1" dirty="0" err="1"/>
+              <a:t>null</a:t>
+            </a:r>
+            <a:r>
+              <a:rPr lang="ca-ES" i="1" dirty="0"/>
+              <a:t> </a:t>
+            </a:r>
+            <a:r>
+              <a:rPr lang="ca-ES" i="1" dirty="0" err="1"/>
+              <a:t>hypothesis</a:t>
+            </a:r>
+            <a:r>
+              <a:rPr lang="ca-ES" i="1" dirty="0"/>
+              <a:t> </a:t>
+            </a:r>
+            <a:r>
+              <a:rPr lang="ca-ES" i="1" dirty="0" err="1"/>
+              <a:t>with</a:t>
+            </a:r>
+            <a:r>
+              <a:rPr lang="ca-ES" i="1" dirty="0"/>
+              <a:t> a </a:t>
+            </a:r>
+            <a:r>
+              <a:rPr lang="ca-ES" i="1" dirty="0" err="1"/>
+              <a:t>power</a:t>
+            </a:r>
+            <a:r>
+              <a:rPr lang="ca-ES" i="1" dirty="0"/>
+              <a:t> </a:t>
+            </a:r>
+            <a:r>
+              <a:rPr lang="ca-ES" i="1" dirty="0">
+                <a:latin typeface="Symbol" panose="05050102010706020507" pitchFamily="18" charset="2"/>
+              </a:rPr>
+              <a:t>b</a:t>
+            </a:r>
+            <a:r>
+              <a:rPr lang="ca-ES" i="1" dirty="0"/>
+              <a:t> </a:t>
+            </a:r>
+            <a:r>
+              <a:rPr lang="ca-ES" i="1" dirty="0" err="1"/>
+              <a:t>and</a:t>
+            </a:r>
+            <a:r>
+              <a:rPr lang="ca-ES" i="1" dirty="0"/>
+              <a:t> a </a:t>
+            </a:r>
+            <a:r>
+              <a:rPr lang="ca-ES" i="1" dirty="0" err="1"/>
+              <a:t>confidence</a:t>
+            </a:r>
+            <a:r>
+              <a:rPr lang="ca-ES" i="1" dirty="0"/>
+              <a:t> (1-</a:t>
+            </a:r>
+            <a:r>
+              <a:rPr lang="ca-ES" i="1" dirty="0">
+                <a:latin typeface="Symbol" panose="05050102010706020507" pitchFamily="18" charset="2"/>
+              </a:rPr>
+              <a:t>a</a:t>
+            </a:r>
+            <a:r>
+              <a:rPr lang="ca-ES" i="1" dirty="0"/>
+              <a:t>)</a:t>
+            </a:r>
+          </a:p>
+          <a:p>
+            <a:endParaRPr lang="ca-ES" i="1" dirty="0"/>
+          </a:p>
+          <a:p>
+            <a:pPr lvl="1"/>
+            <a:r>
+              <a:rPr lang="ca-ES" dirty="0" err="1"/>
+              <a:t>The</a:t>
+            </a:r>
+            <a:r>
+              <a:rPr lang="ca-ES" dirty="0"/>
+              <a:t> </a:t>
+            </a:r>
+            <a:r>
+              <a:rPr lang="ca-ES" dirty="0" err="1"/>
+              <a:t>computations</a:t>
+            </a:r>
+            <a:r>
+              <a:rPr lang="ca-ES" dirty="0"/>
+              <a:t> </a:t>
+            </a:r>
+            <a:r>
+              <a:rPr lang="ca-ES" dirty="0" err="1"/>
+              <a:t>also</a:t>
+            </a:r>
+            <a:r>
+              <a:rPr lang="ca-ES" dirty="0"/>
+              <a:t> </a:t>
+            </a:r>
+            <a:r>
+              <a:rPr lang="ca-ES" dirty="0" err="1"/>
+              <a:t>need</a:t>
+            </a:r>
+            <a:r>
+              <a:rPr lang="ca-ES" dirty="0"/>
+              <a:t> to </a:t>
+            </a:r>
+            <a:r>
+              <a:rPr lang="ca-ES" dirty="0" err="1"/>
+              <a:t>know</a:t>
+            </a:r>
+            <a:r>
+              <a:rPr lang="ca-ES" dirty="0"/>
+              <a:t> or </a:t>
+            </a:r>
+            <a:r>
+              <a:rPr lang="ca-ES" dirty="0" err="1"/>
+              <a:t>estimate</a:t>
+            </a:r>
+            <a:r>
+              <a:rPr lang="ca-ES" dirty="0"/>
+              <a:t> </a:t>
+            </a:r>
+            <a:r>
+              <a:rPr lang="ca-ES" dirty="0" err="1"/>
+              <a:t>parameters</a:t>
+            </a:r>
+            <a:r>
+              <a:rPr lang="ca-ES" dirty="0"/>
+              <a:t> </a:t>
+            </a:r>
+            <a:r>
+              <a:rPr lang="ca-ES" dirty="0" err="1"/>
+              <a:t>such</a:t>
+            </a:r>
+            <a:r>
+              <a:rPr lang="ca-ES" dirty="0"/>
+              <a:t> as </a:t>
+            </a:r>
+            <a:r>
+              <a:rPr lang="ca-ES" dirty="0" err="1"/>
+              <a:t>standard</a:t>
+            </a:r>
+            <a:r>
+              <a:rPr lang="ca-ES" dirty="0"/>
+              <a:t> </a:t>
+            </a:r>
+            <a:r>
+              <a:rPr lang="ca-ES" dirty="0" err="1"/>
+              <a:t>deviation</a:t>
+            </a:r>
+            <a:r>
+              <a:rPr lang="ca-ES" dirty="0"/>
+              <a:t> or </a:t>
+            </a:r>
+            <a:r>
+              <a:rPr lang="ca-ES" dirty="0" err="1"/>
+              <a:t>the</a:t>
+            </a:r>
+            <a:r>
+              <a:rPr lang="ca-ES" dirty="0"/>
+              <a:t> percentatge.</a:t>
+            </a:r>
+          </a:p>
+        </p:txBody>
+      </p:sp>
+    </p:spTree>
+    <p:extLst>
+      <p:ext uri="{BB962C8B-B14F-4D97-AF65-F5344CB8AC3E}">
+        <p14:creationId xmlns:p14="http://schemas.microsoft.com/office/powerpoint/2010/main" val="9605276"/>
+      </p:ext>
+    </p:extLst>
+  </p:cSld>
+  <p:clrMapOvr>
+    <a:masterClrMapping/>
+  </p:clrMapOvr>
+</p:sld>
+</file>
+
+<file path=ppt/slides/slide22.xml><?xml version="1.0" encoding="utf-8"?>
+<p:sld xmlns:a="http://schemas.openxmlformats.org/drawingml/2006/main" xmlns:r="http://schemas.openxmlformats.org/officeDocument/2006/relationships" xmlns:p="http://schemas.openxmlformats.org/presentationml/2006/main">
+  <p:cSld>
+    <p:spTree>
+      <p:nvGrpSpPr>
+        <p:cNvPr id="1" name=""/>
+        <p:cNvGrpSpPr/>
+        <p:nvPr/>
+      </p:nvGrpSpPr>
+      <p:grpSpPr>
+        <a:xfrm>
+          <a:off x="0" y="0"/>
+          <a:ext cx="0" cy="0"/>
+          <a:chOff x="0" y="0"/>
+          <a:chExt cx="0" cy="0"/>
+        </a:xfrm>
+      </p:grpSpPr>
+      <p:sp>
+        <p:nvSpPr>
+          <p:cNvPr id="2" name="Marcador de contenido 1">
+            <a:extLst>
+              <a:ext uri="{FF2B5EF4-FFF2-40B4-BE49-F238E27FC236}">
+                <a16:creationId xmlns:a16="http://schemas.microsoft.com/office/drawing/2014/main" id="{A063A01C-C4D3-4A0A-8233-8E2A68B0E319}"/>
+              </a:ext>
+            </a:extLst>
+          </p:cNvPr>
+          <p:cNvSpPr>
+            <a:spLocks noGrp="1"/>
+          </p:cNvSpPr>
+          <p:nvPr>
+            <p:ph idx="1"/>
+          </p:nvPr>
+        </p:nvSpPr>
+        <p:spPr/>
+        <p:txBody>
+          <a:bodyPr/>
+          <a:lstStyle/>
+          <a:p>
+            <a:r>
+              <a:rPr lang="ca-ES" dirty="0" err="1"/>
+              <a:t>The</a:t>
+            </a:r>
+            <a:r>
+              <a:rPr lang="ca-ES" dirty="0"/>
+              <a:t> </a:t>
+            </a:r>
+            <a:r>
+              <a:rPr lang="ca-ES" dirty="0" err="1"/>
+              <a:t>question</a:t>
+            </a:r>
+            <a:r>
+              <a:rPr lang="ca-ES" dirty="0"/>
+              <a:t>:</a:t>
+            </a:r>
+          </a:p>
+          <a:p>
+            <a:pPr lvl="1"/>
+            <a:r>
+              <a:rPr lang="ca-ES" dirty="0" err="1"/>
+              <a:t>What</a:t>
+            </a:r>
+            <a:r>
+              <a:rPr lang="ca-ES" dirty="0"/>
+              <a:t> </a:t>
+            </a:r>
+            <a:r>
+              <a:rPr lang="ca-ES" dirty="0" err="1"/>
+              <a:t>sample</a:t>
+            </a:r>
+            <a:r>
+              <a:rPr lang="ca-ES" dirty="0"/>
+              <a:t> </a:t>
+            </a:r>
+            <a:r>
+              <a:rPr lang="ca-ES" dirty="0" err="1"/>
+              <a:t>size</a:t>
+            </a:r>
+            <a:r>
+              <a:rPr lang="ca-ES" dirty="0"/>
+              <a:t> is </a:t>
+            </a:r>
+            <a:r>
+              <a:rPr lang="ca-ES" dirty="0" err="1"/>
+              <a:t>needed</a:t>
+            </a:r>
+            <a:r>
+              <a:rPr lang="ca-ES" dirty="0"/>
+              <a:t> to test </a:t>
+            </a:r>
+            <a:r>
+              <a:rPr lang="ca-ES" dirty="0" err="1"/>
+              <a:t>the</a:t>
+            </a:r>
+            <a:r>
+              <a:rPr lang="ca-ES" dirty="0"/>
+              <a:t> </a:t>
+            </a:r>
+            <a:r>
+              <a:rPr lang="ca-ES" dirty="0" err="1"/>
+              <a:t>belief</a:t>
+            </a:r>
+            <a:r>
+              <a:rPr lang="ca-ES" dirty="0"/>
+              <a:t> </a:t>
+            </a:r>
+            <a:r>
+              <a:rPr lang="ca-ES" dirty="0" err="1"/>
+              <a:t>that</a:t>
+            </a:r>
+            <a:r>
+              <a:rPr lang="ca-ES" dirty="0"/>
+              <a:t> </a:t>
+            </a:r>
+            <a:r>
+              <a:rPr lang="ca-ES" dirty="0" err="1"/>
+              <a:t>systolic</a:t>
+            </a:r>
+            <a:r>
+              <a:rPr lang="ca-ES" dirty="0"/>
+              <a:t> </a:t>
+            </a:r>
+            <a:r>
+              <a:rPr lang="ca-ES" dirty="0" err="1"/>
+              <a:t>pressure</a:t>
+            </a:r>
+            <a:r>
+              <a:rPr lang="ca-ES" dirty="0"/>
+              <a:t> in a </a:t>
+            </a:r>
+            <a:r>
+              <a:rPr lang="ca-ES" dirty="0" err="1"/>
+              <a:t>hypertense</a:t>
+            </a:r>
+            <a:r>
+              <a:rPr lang="ca-ES" dirty="0"/>
+              <a:t> </a:t>
+            </a:r>
+            <a:r>
+              <a:rPr lang="ca-ES" dirty="0" err="1"/>
+              <a:t>population</a:t>
+            </a:r>
+            <a:r>
+              <a:rPr lang="ca-ES" dirty="0"/>
+              <a:t> is 90 or </a:t>
+            </a:r>
+            <a:r>
+              <a:rPr lang="ca-ES" dirty="0" err="1"/>
+              <a:t>bigger</a:t>
+            </a:r>
+            <a:r>
+              <a:rPr lang="ca-ES" dirty="0"/>
+              <a:t> </a:t>
+            </a:r>
+            <a:r>
+              <a:rPr lang="ca-ES" dirty="0" err="1"/>
+              <a:t>than</a:t>
+            </a:r>
+            <a:r>
+              <a:rPr lang="ca-ES" dirty="0"/>
+              <a:t> </a:t>
+            </a:r>
+            <a:r>
+              <a:rPr lang="ca-ES" dirty="0" err="1"/>
+              <a:t>that</a:t>
+            </a:r>
+            <a:endParaRPr lang="ca-ES" dirty="0"/>
+          </a:p>
+          <a:p>
+            <a:r>
+              <a:rPr lang="ca-ES" dirty="0" err="1"/>
+              <a:t>Needs</a:t>
+            </a:r>
+            <a:r>
+              <a:rPr lang="ca-ES" dirty="0"/>
+              <a:t> to be </a:t>
+            </a:r>
+            <a:r>
+              <a:rPr lang="ca-ES" dirty="0" err="1"/>
+              <a:t>formulated</a:t>
+            </a:r>
+            <a:r>
+              <a:rPr lang="ca-ES" dirty="0"/>
+              <a:t> as</a:t>
+            </a:r>
+          </a:p>
+          <a:p>
+            <a:pPr lvl="1"/>
+            <a:r>
+              <a:rPr lang="ca-ES" i="1" dirty="0" err="1"/>
+              <a:t>What</a:t>
+            </a:r>
+            <a:r>
+              <a:rPr lang="ca-ES" i="1" dirty="0"/>
+              <a:t> </a:t>
+            </a:r>
+            <a:r>
+              <a:rPr lang="ca-ES" i="1" dirty="0" err="1"/>
+              <a:t>sample</a:t>
+            </a:r>
+            <a:r>
+              <a:rPr lang="ca-ES" i="1" dirty="0"/>
+              <a:t> </a:t>
+            </a:r>
+            <a:r>
+              <a:rPr lang="ca-ES" i="1" dirty="0" err="1"/>
+              <a:t>size</a:t>
+            </a:r>
+            <a:r>
+              <a:rPr lang="ca-ES" i="1" dirty="0"/>
+              <a:t> is </a:t>
+            </a:r>
+            <a:r>
+              <a:rPr lang="ca-ES" i="1" dirty="0" err="1"/>
+              <a:t>needed</a:t>
+            </a:r>
+            <a:r>
+              <a:rPr lang="ca-ES" i="1" dirty="0"/>
+              <a:t> to test </a:t>
+            </a:r>
+            <a:r>
+              <a:rPr lang="ca-ES" i="1" dirty="0" err="1"/>
+              <a:t>the</a:t>
+            </a:r>
+            <a:r>
+              <a:rPr lang="ca-ES" i="1" dirty="0"/>
+              <a:t> </a:t>
+            </a:r>
+            <a:r>
+              <a:rPr lang="ca-ES" i="1" dirty="0" err="1"/>
+              <a:t>belief</a:t>
+            </a:r>
+            <a:r>
+              <a:rPr lang="ca-ES" i="1" dirty="0"/>
+              <a:t> </a:t>
+            </a:r>
+            <a:r>
+              <a:rPr lang="ca-ES" i="1" dirty="0" err="1"/>
+              <a:t>that</a:t>
+            </a:r>
+            <a:r>
+              <a:rPr lang="ca-ES" i="1" dirty="0"/>
+              <a:t> </a:t>
+            </a:r>
+            <a:r>
+              <a:rPr lang="ca-ES" i="1" dirty="0" err="1"/>
+              <a:t>systolic</a:t>
+            </a:r>
+            <a:r>
+              <a:rPr lang="ca-ES" i="1" dirty="0"/>
+              <a:t> </a:t>
+            </a:r>
+            <a:r>
+              <a:rPr lang="ca-ES" i="1" dirty="0" err="1"/>
+              <a:t>pressure</a:t>
+            </a:r>
+            <a:r>
+              <a:rPr lang="ca-ES" i="1" dirty="0"/>
+              <a:t> in a </a:t>
+            </a:r>
+            <a:r>
+              <a:rPr lang="ca-ES" i="1" dirty="0" err="1"/>
+              <a:t>hypertense</a:t>
+            </a:r>
+            <a:r>
+              <a:rPr lang="ca-ES" i="1" dirty="0"/>
+              <a:t> </a:t>
+            </a:r>
+            <a:r>
+              <a:rPr lang="ca-ES" i="1" dirty="0" err="1"/>
+              <a:t>population</a:t>
+            </a:r>
+            <a:r>
+              <a:rPr lang="ca-ES" i="1" dirty="0"/>
+              <a:t> is 90 or </a:t>
+            </a:r>
+            <a:r>
+              <a:rPr lang="ca-ES" i="1" dirty="0" err="1"/>
+              <a:t>bigger</a:t>
+            </a:r>
+            <a:r>
+              <a:rPr lang="ca-ES" i="1" dirty="0"/>
+              <a:t> </a:t>
+            </a:r>
+            <a:r>
+              <a:rPr lang="ca-ES" i="1" dirty="0" err="1"/>
+              <a:t>than</a:t>
+            </a:r>
+            <a:r>
+              <a:rPr lang="ca-ES" i="1" dirty="0"/>
+              <a:t> </a:t>
+            </a:r>
+            <a:r>
+              <a:rPr lang="ca-ES" i="1" dirty="0" err="1"/>
+              <a:t>that</a:t>
+            </a:r>
+            <a:r>
+              <a:rPr lang="ca-ES" i="1" dirty="0"/>
+              <a:t> </a:t>
+            </a:r>
+            <a:r>
+              <a:rPr lang="ca-ES" i="1" dirty="0" err="1"/>
+              <a:t>with</a:t>
+            </a:r>
+            <a:r>
+              <a:rPr lang="ca-ES" i="1" dirty="0"/>
+              <a:t> a </a:t>
+            </a:r>
+            <a:r>
+              <a:rPr lang="ca-ES" i="1" dirty="0" err="1"/>
+              <a:t>difference</a:t>
+            </a:r>
+            <a:r>
+              <a:rPr lang="ca-ES" i="1" dirty="0"/>
+              <a:t> of </a:t>
+            </a:r>
+            <a:r>
+              <a:rPr lang="ca-ES" i="1" dirty="0" err="1"/>
+              <a:t>at</a:t>
+            </a:r>
+            <a:r>
+              <a:rPr lang="ca-ES" i="1" dirty="0"/>
+              <a:t> </a:t>
+            </a:r>
+            <a:r>
+              <a:rPr lang="ca-ES" i="1" dirty="0" err="1"/>
+              <a:t>least</a:t>
+            </a:r>
+            <a:r>
+              <a:rPr lang="ca-ES" i="1" dirty="0"/>
+              <a:t> 5 units, a </a:t>
+            </a:r>
+            <a:r>
+              <a:rPr lang="ca-ES" i="1" dirty="0" err="1"/>
+              <a:t>power</a:t>
+            </a:r>
+            <a:r>
+              <a:rPr lang="ca-ES" i="1" dirty="0"/>
+              <a:t> of 80% </a:t>
+            </a:r>
+            <a:r>
+              <a:rPr lang="ca-ES" i="1" dirty="0" err="1"/>
+              <a:t>and</a:t>
+            </a:r>
+            <a:r>
+              <a:rPr lang="ca-ES" i="1" dirty="0"/>
+              <a:t> a </a:t>
+            </a:r>
+            <a:r>
+              <a:rPr lang="ca-ES" i="1" dirty="0" err="1"/>
+              <a:t>confidence</a:t>
+            </a:r>
+            <a:r>
+              <a:rPr lang="ca-ES" i="1" dirty="0"/>
+              <a:t> of 95% assumint </a:t>
+            </a:r>
+            <a:r>
+              <a:rPr lang="ca-ES" i="1" dirty="0" err="1"/>
+              <a:t>that</a:t>
+            </a:r>
+            <a:r>
+              <a:rPr lang="ca-ES" i="1" dirty="0"/>
+              <a:t> </a:t>
+            </a:r>
+            <a:r>
+              <a:rPr lang="ca-ES" i="1" dirty="0" err="1"/>
+              <a:t>the</a:t>
+            </a:r>
+            <a:r>
+              <a:rPr lang="ca-ES" i="1" dirty="0"/>
+              <a:t> </a:t>
+            </a:r>
+            <a:r>
+              <a:rPr lang="ca-ES" i="1" dirty="0" err="1"/>
+              <a:t>standard</a:t>
+            </a:r>
+            <a:r>
+              <a:rPr lang="ca-ES" i="1" dirty="0"/>
+              <a:t> </a:t>
+            </a:r>
+            <a:r>
+              <a:rPr lang="ca-ES" i="1" dirty="0" err="1"/>
+              <a:t>deviation</a:t>
+            </a:r>
+            <a:r>
+              <a:rPr lang="ca-ES" i="1" dirty="0"/>
+              <a:t> is 11?</a:t>
+            </a:r>
+            <a:endParaRPr lang="ca-ES" dirty="0"/>
+          </a:p>
+          <a:p>
+            <a:pPr lvl="1"/>
+            <a:endParaRPr lang="ca-ES" dirty="0"/>
+          </a:p>
+        </p:txBody>
+      </p:sp>
+      <p:sp>
+        <p:nvSpPr>
+          <p:cNvPr id="3" name="Título 2">
+            <a:extLst>
+              <a:ext uri="{FF2B5EF4-FFF2-40B4-BE49-F238E27FC236}">
+                <a16:creationId xmlns:a16="http://schemas.microsoft.com/office/drawing/2014/main" id="{356E051A-0D56-471B-A05E-69138403F387}"/>
+              </a:ext>
+            </a:extLst>
+          </p:cNvPr>
+          <p:cNvSpPr>
+            <a:spLocks noGrp="1"/>
+          </p:cNvSpPr>
+          <p:nvPr>
+            <p:ph type="title"/>
+          </p:nvPr>
+        </p:nvSpPr>
+        <p:spPr/>
+        <p:txBody>
+          <a:bodyPr/>
+          <a:lstStyle/>
+          <a:p>
+            <a:r>
+              <a:rPr lang="ca-ES" dirty="0" err="1"/>
+              <a:t>Examples</a:t>
+            </a:r>
+            <a:endParaRPr lang="ca-ES" dirty="0"/>
+          </a:p>
+        </p:txBody>
+      </p:sp>
+    </p:spTree>
+    <p:extLst>
+      <p:ext uri="{BB962C8B-B14F-4D97-AF65-F5344CB8AC3E}">
+        <p14:creationId xmlns:p14="http://schemas.microsoft.com/office/powerpoint/2010/main" val="1838411385"/>
+      </p:ext>
+    </p:extLst>
+  </p:cSld>
+  <p:clrMapOvr>
+    <a:masterClrMapping/>
+  </p:clrMapOvr>
+</p:sld>
+</file>
+
+<file path=ppt/slides/slide23.xml><?xml version="1.0" encoding="utf-8"?>
+<p:sld xmlns:a="http://schemas.openxmlformats.org/drawingml/2006/main" xmlns:r="http://schemas.openxmlformats.org/officeDocument/2006/relationships" xmlns:p="http://schemas.openxmlformats.org/presentationml/2006/main">
+  <p:cSld>
+    <p:spTree>
+      <p:nvGrpSpPr>
+        <p:cNvPr id="1" name=""/>
+        <p:cNvGrpSpPr/>
+        <p:nvPr/>
+      </p:nvGrpSpPr>
+      <p:grpSpPr>
+        <a:xfrm>
+          <a:off x="0" y="0"/>
+          <a:ext cx="0" cy="0"/>
+          <a:chOff x="0" y="0"/>
+          <a:chExt cx="0" cy="0"/>
+        </a:xfrm>
+      </p:grpSpPr>
+      <p:sp>
+        <p:nvSpPr>
+          <p:cNvPr id="4" name="Marcador de contenido 3">
+            <a:extLst>
+              <a:ext uri="{FF2B5EF4-FFF2-40B4-BE49-F238E27FC236}">
+                <a16:creationId xmlns:a16="http://schemas.microsoft.com/office/drawing/2014/main" id="{29EA4575-A453-4971-B87F-5208DE910DE4}"/>
+              </a:ext>
+            </a:extLst>
+          </p:cNvPr>
+          <p:cNvSpPr>
+            <a:spLocks noGrp="1"/>
+          </p:cNvSpPr>
+          <p:nvPr>
+            <p:ph idx="1"/>
+          </p:nvPr>
+        </p:nvSpPr>
+        <p:spPr>
+          <a:xfrm>
+            <a:off x="495300" y="1124744"/>
+            <a:ext cx="8915400" cy="1143000"/>
+          </a:xfrm>
+        </p:spPr>
+        <p:txBody>
+          <a:bodyPr/>
+          <a:lstStyle/>
+          <a:p>
+            <a:r>
+              <a:rPr lang="ca-ES" sz="2400" dirty="0" err="1"/>
+              <a:t>eZR</a:t>
+            </a:r>
+            <a:r>
+              <a:rPr lang="ca-ES" sz="2400" dirty="0"/>
+              <a:t> can </a:t>
+            </a:r>
+            <a:r>
+              <a:rPr lang="ca-ES" sz="2400" dirty="0" err="1"/>
+              <a:t>only</a:t>
+            </a:r>
+            <a:r>
+              <a:rPr lang="ca-ES" sz="2400" dirty="0"/>
+              <a:t> </a:t>
+            </a:r>
+            <a:r>
+              <a:rPr lang="ca-ES" sz="2400" dirty="0" err="1"/>
+              <a:t>compute</a:t>
+            </a:r>
+            <a:r>
+              <a:rPr lang="ca-ES" sz="2400" dirty="0"/>
+              <a:t> </a:t>
+            </a:r>
+            <a:r>
+              <a:rPr lang="ca-ES" sz="2400" dirty="0" err="1"/>
+              <a:t>sample</a:t>
+            </a:r>
+            <a:r>
+              <a:rPr lang="ca-ES" sz="2400" dirty="0"/>
+              <a:t> </a:t>
+            </a:r>
+            <a:r>
+              <a:rPr lang="ca-ES" sz="2400" dirty="0" err="1"/>
+              <a:t>size</a:t>
+            </a:r>
+            <a:r>
+              <a:rPr lang="ca-ES" sz="2400" dirty="0"/>
+              <a:t> for </a:t>
+            </a:r>
+            <a:r>
+              <a:rPr lang="ca-ES" sz="2400" dirty="0" err="1"/>
+              <a:t>paired</a:t>
+            </a:r>
+            <a:r>
+              <a:rPr lang="ca-ES" sz="2400" dirty="0"/>
+              <a:t> </a:t>
+            </a:r>
+            <a:r>
+              <a:rPr lang="ca-ES" sz="2400" dirty="0" err="1"/>
+              <a:t>differences</a:t>
+            </a:r>
+            <a:r>
+              <a:rPr lang="ca-ES" sz="2400" dirty="0"/>
+              <a:t>, so </a:t>
+            </a:r>
+            <a:r>
+              <a:rPr lang="ca-ES" sz="2400" dirty="0" err="1"/>
+              <a:t>we</a:t>
+            </a:r>
+            <a:r>
+              <a:rPr lang="ca-ES" sz="2400" dirty="0"/>
+              <a:t> </a:t>
+            </a:r>
+            <a:r>
+              <a:rPr lang="ca-ES" sz="2400" dirty="0" err="1"/>
+              <a:t>cheat</a:t>
+            </a:r>
+            <a:r>
+              <a:rPr lang="ca-ES" sz="2400" dirty="0"/>
+              <a:t> a </a:t>
+            </a:r>
+            <a:r>
+              <a:rPr lang="ca-ES" sz="2400" dirty="0" err="1"/>
+              <a:t>little</a:t>
+            </a:r>
+            <a:r>
+              <a:rPr lang="ca-ES" sz="2400" dirty="0"/>
+              <a:t>:</a:t>
+            </a:r>
+          </a:p>
+        </p:txBody>
+      </p:sp>
+      <p:sp>
+        <p:nvSpPr>
+          <p:cNvPr id="3" name="Título 2">
+            <a:extLst>
+              <a:ext uri="{FF2B5EF4-FFF2-40B4-BE49-F238E27FC236}">
+                <a16:creationId xmlns:a16="http://schemas.microsoft.com/office/drawing/2014/main" id="{7D5518A4-E3F4-434A-A297-4C811FD9C141}"/>
+              </a:ext>
+            </a:extLst>
+          </p:cNvPr>
+          <p:cNvSpPr>
+            <a:spLocks noGrp="1"/>
+          </p:cNvSpPr>
+          <p:nvPr>
+            <p:ph type="title"/>
+          </p:nvPr>
+        </p:nvSpPr>
+        <p:spPr>
+          <a:xfrm>
+            <a:off x="378230" y="425384"/>
+            <a:ext cx="8915400" cy="1143000"/>
+          </a:xfrm>
+        </p:spPr>
+        <p:txBody>
+          <a:bodyPr/>
+          <a:lstStyle/>
+          <a:p>
+            <a:r>
+              <a:rPr lang="ca-ES" dirty="0"/>
+              <a:t>Computing </a:t>
+            </a:r>
+            <a:r>
+              <a:rPr lang="ca-ES" dirty="0" err="1"/>
+              <a:t>sample</a:t>
+            </a:r>
+            <a:r>
+              <a:rPr lang="ca-ES" dirty="0"/>
+              <a:t> </a:t>
+            </a:r>
+            <a:r>
+              <a:rPr lang="ca-ES" dirty="0" err="1"/>
+              <a:t>size</a:t>
+            </a:r>
+            <a:r>
+              <a:rPr lang="ca-ES" dirty="0"/>
+              <a:t> </a:t>
+            </a:r>
+            <a:r>
+              <a:rPr lang="ca-ES" dirty="0" err="1"/>
+              <a:t>with</a:t>
+            </a:r>
+            <a:r>
+              <a:rPr lang="ca-ES" dirty="0"/>
+              <a:t> </a:t>
+            </a:r>
+            <a:r>
+              <a:rPr lang="ca-ES" dirty="0" err="1"/>
+              <a:t>eZR</a:t>
+            </a:r>
+            <a:endParaRPr lang="ca-ES" dirty="0"/>
+          </a:p>
+        </p:txBody>
+      </p:sp>
+      <p:pic>
+        <p:nvPicPr>
+          <p:cNvPr id="6" name="Imagen 5">
+            <a:extLst>
+              <a:ext uri="{FF2B5EF4-FFF2-40B4-BE49-F238E27FC236}">
+                <a16:creationId xmlns:a16="http://schemas.microsoft.com/office/drawing/2014/main" id="{CD89F88C-1E3C-4B77-84A8-C0357A92A85B}"/>
+              </a:ext>
+            </a:extLst>
+          </p:cNvPr>
+          <p:cNvPicPr>
+            <a:picLocks noChangeAspect="1"/>
+          </p:cNvPicPr>
+          <p:nvPr/>
+        </p:nvPicPr>
+        <p:blipFill>
+          <a:blip r:embed="rId2"/>
+          <a:stretch>
+            <a:fillRect/>
+          </a:stretch>
+        </p:blipFill>
+        <p:spPr>
+          <a:xfrm>
+            <a:off x="776536" y="2012024"/>
+            <a:ext cx="3897131" cy="2592288"/>
+          </a:xfrm>
+          <a:prstGeom prst="rect">
+            <a:avLst/>
+          </a:prstGeom>
+        </p:spPr>
+      </p:pic>
+      <p:pic>
+        <p:nvPicPr>
+          <p:cNvPr id="7" name="Imagen 6">
+            <a:extLst>
+              <a:ext uri="{FF2B5EF4-FFF2-40B4-BE49-F238E27FC236}">
+                <a16:creationId xmlns:a16="http://schemas.microsoft.com/office/drawing/2014/main" id="{CED04BC9-5F9E-444A-9C86-3215B9FE6FCC}"/>
+              </a:ext>
+            </a:extLst>
+          </p:cNvPr>
+          <p:cNvPicPr>
+            <a:picLocks noChangeAspect="1"/>
+          </p:cNvPicPr>
+          <p:nvPr/>
+        </p:nvPicPr>
+        <p:blipFill>
+          <a:blip r:embed="rId3"/>
+          <a:stretch>
+            <a:fillRect/>
+          </a:stretch>
+        </p:blipFill>
+        <p:spPr>
+          <a:xfrm>
+            <a:off x="4939799" y="2012024"/>
+            <a:ext cx="4587971" cy="4735421"/>
+          </a:xfrm>
+          <a:prstGeom prst="rect">
+            <a:avLst/>
+          </a:prstGeom>
+        </p:spPr>
+      </p:pic>
+      <p:sp>
+        <p:nvSpPr>
+          <p:cNvPr id="8" name="Rectángulo 7">
+            <a:extLst>
+              <a:ext uri="{FF2B5EF4-FFF2-40B4-BE49-F238E27FC236}">
+                <a16:creationId xmlns:a16="http://schemas.microsoft.com/office/drawing/2014/main" id="{3C603914-7CCC-4EBD-B5F9-71E731316BDF}"/>
+              </a:ext>
+            </a:extLst>
+          </p:cNvPr>
+          <p:cNvSpPr/>
+          <p:nvPr/>
+        </p:nvSpPr>
+        <p:spPr>
+          <a:xfrm>
+            <a:off x="704528" y="4798837"/>
+            <a:ext cx="4953000" cy="2062103"/>
+          </a:xfrm>
+          <a:prstGeom prst="rect">
+            <a:avLst/>
+          </a:prstGeom>
+        </p:spPr>
+        <p:txBody>
+          <a:bodyPr>
+            <a:spAutoFit/>
+          </a:bodyPr>
+          <a:lstStyle/>
+          <a:p>
+            <a:r>
+              <a:rPr lang="ca-ES" sz="1200" u="none" dirty="0">
+                <a:latin typeface="Courier New" panose="02070309020205020404" pitchFamily="49" charset="0"/>
+                <a:cs typeface="Courier New" panose="02070309020205020404" pitchFamily="49" charset="0"/>
+              </a:rPr>
+              <a:t>&gt; </a:t>
+            </a:r>
+            <a:r>
+              <a:rPr lang="ca-ES" sz="1200" u="none" dirty="0" err="1">
+                <a:latin typeface="Courier New" panose="02070309020205020404" pitchFamily="49" charset="0"/>
+                <a:cs typeface="Courier New" panose="02070309020205020404" pitchFamily="49" charset="0"/>
+              </a:rPr>
+              <a:t>SampleMeanPaired</a:t>
+            </a:r>
+            <a:r>
+              <a:rPr lang="ca-ES" sz="1200" u="none" dirty="0">
+                <a:latin typeface="Courier New" panose="02070309020205020404" pitchFamily="49" charset="0"/>
+                <a:cs typeface="Courier New" panose="02070309020205020404" pitchFamily="49" charset="0"/>
+              </a:rPr>
+              <a:t>(5, 11, 0.05, 0.80, 1)</a:t>
+            </a:r>
+          </a:p>
+          <a:p>
+            <a:r>
+              <a:rPr lang="ca-ES" sz="1200" u="none" dirty="0">
+                <a:latin typeface="Courier New" panose="02070309020205020404" pitchFamily="49" charset="0"/>
+                <a:cs typeface="Courier New" panose="02070309020205020404" pitchFamily="49" charset="0"/>
+              </a:rPr>
+              <a:t>                     </a:t>
+            </a:r>
+            <a:r>
+              <a:rPr lang="ca-ES" sz="1200" u="none" dirty="0" err="1">
+                <a:latin typeface="Courier New" panose="02070309020205020404" pitchFamily="49" charset="0"/>
+                <a:cs typeface="Courier New" panose="02070309020205020404" pitchFamily="49" charset="0"/>
+              </a:rPr>
+              <a:t>Assumptions</a:t>
+            </a:r>
+            <a:endParaRPr lang="ca-ES" sz="1200" u="none" dirty="0">
+              <a:latin typeface="Courier New" panose="02070309020205020404" pitchFamily="49" charset="0"/>
+              <a:cs typeface="Courier New" panose="02070309020205020404" pitchFamily="49" charset="0"/>
+            </a:endParaRPr>
+          </a:p>
+          <a:p>
+            <a:r>
+              <a:rPr lang="ca-ES" sz="1200" u="none" dirty="0" err="1">
+                <a:latin typeface="Courier New" panose="02070309020205020404" pitchFamily="49" charset="0"/>
+                <a:cs typeface="Courier New" panose="02070309020205020404" pitchFamily="49" charset="0"/>
+              </a:rPr>
+              <a:t>Difference</a:t>
+            </a:r>
+            <a:r>
+              <a:rPr lang="ca-ES" sz="1200" u="none" dirty="0">
+                <a:latin typeface="Courier New" panose="02070309020205020404" pitchFamily="49" charset="0"/>
+                <a:cs typeface="Courier New" panose="02070309020205020404" pitchFamily="49" charset="0"/>
+              </a:rPr>
+              <a:t> in </a:t>
+            </a:r>
+            <a:r>
+              <a:rPr lang="ca-ES" sz="1200" u="none" dirty="0" err="1">
+                <a:latin typeface="Courier New" panose="02070309020205020404" pitchFamily="49" charset="0"/>
+                <a:cs typeface="Courier New" panose="02070309020205020404" pitchFamily="49" charset="0"/>
+              </a:rPr>
+              <a:t>means</a:t>
+            </a:r>
+            <a:r>
+              <a:rPr lang="ca-ES" sz="1200" u="none" dirty="0">
+                <a:latin typeface="Courier New" panose="02070309020205020404" pitchFamily="49" charset="0"/>
+                <a:cs typeface="Courier New" panose="02070309020205020404" pitchFamily="49" charset="0"/>
+              </a:rPr>
+              <a:t>            5</a:t>
+            </a:r>
+          </a:p>
+          <a:p>
+            <a:r>
+              <a:rPr lang="ca-ES" sz="1200" u="none" dirty="0">
+                <a:latin typeface="Courier New" panose="02070309020205020404" pitchFamily="49" charset="0"/>
+                <a:cs typeface="Courier New" panose="02070309020205020404" pitchFamily="49" charset="0"/>
+              </a:rPr>
+              <a:t>Standard </a:t>
+            </a:r>
+            <a:r>
+              <a:rPr lang="ca-ES" sz="1200" u="none" dirty="0" err="1">
+                <a:latin typeface="Courier New" panose="02070309020205020404" pitchFamily="49" charset="0"/>
+                <a:cs typeface="Courier New" panose="02070309020205020404" pitchFamily="49" charset="0"/>
+              </a:rPr>
+              <a:t>deviation</a:t>
+            </a:r>
+            <a:r>
+              <a:rPr lang="ca-ES" sz="1200" u="none" dirty="0">
+                <a:latin typeface="Courier New" panose="02070309020205020404" pitchFamily="49" charset="0"/>
+                <a:cs typeface="Courier New" panose="02070309020205020404" pitchFamily="49" charset="0"/>
+              </a:rPr>
+              <a:t>            11</a:t>
+            </a:r>
+          </a:p>
+          <a:p>
+            <a:r>
+              <a:rPr lang="ca-ES" sz="1200" u="none" dirty="0" err="1">
+                <a:latin typeface="Courier New" panose="02070309020205020404" pitchFamily="49" charset="0"/>
+                <a:cs typeface="Courier New" panose="02070309020205020404" pitchFamily="49" charset="0"/>
+              </a:rPr>
+              <a:t>Alpha</a:t>
+            </a:r>
+            <a:r>
+              <a:rPr lang="ca-ES" sz="1200" u="none" dirty="0">
+                <a:latin typeface="Courier New" panose="02070309020205020404" pitchFamily="49" charset="0"/>
+                <a:cs typeface="Courier New" panose="02070309020205020404" pitchFamily="49" charset="0"/>
+              </a:rPr>
+              <a:t>                       0.05</a:t>
+            </a:r>
+          </a:p>
+          <a:p>
+            <a:r>
+              <a:rPr lang="ca-ES" sz="1200" u="none" dirty="0">
+                <a:latin typeface="Courier New" panose="02070309020205020404" pitchFamily="49" charset="0"/>
+                <a:cs typeface="Courier New" panose="02070309020205020404" pitchFamily="49" charset="0"/>
+              </a:rPr>
+              <a:t>                       </a:t>
+            </a:r>
+            <a:r>
+              <a:rPr lang="ca-ES" sz="1200" u="none" dirty="0" err="1">
+                <a:latin typeface="Courier New" panose="02070309020205020404" pitchFamily="49" charset="0"/>
+                <a:cs typeface="Courier New" panose="02070309020205020404" pitchFamily="49" charset="0"/>
+              </a:rPr>
+              <a:t>one.sided</a:t>
+            </a:r>
+            <a:endParaRPr lang="ca-ES" sz="1200" u="none" dirty="0">
+              <a:latin typeface="Courier New" panose="02070309020205020404" pitchFamily="49" charset="0"/>
+              <a:cs typeface="Courier New" panose="02070309020205020404" pitchFamily="49" charset="0"/>
+            </a:endParaRPr>
+          </a:p>
+          <a:p>
+            <a:r>
+              <a:rPr lang="ca-ES" sz="1200" u="none" dirty="0" err="1">
+                <a:latin typeface="Courier New" panose="02070309020205020404" pitchFamily="49" charset="0"/>
+                <a:cs typeface="Courier New" panose="02070309020205020404" pitchFamily="49" charset="0"/>
+              </a:rPr>
+              <a:t>Power</a:t>
+            </a:r>
+            <a:r>
+              <a:rPr lang="ca-ES" sz="1200" u="none" dirty="0">
+                <a:latin typeface="Courier New" panose="02070309020205020404" pitchFamily="49" charset="0"/>
+                <a:cs typeface="Courier New" panose="02070309020205020404" pitchFamily="49" charset="0"/>
+              </a:rPr>
+              <a:t>                        0.8</a:t>
+            </a:r>
+          </a:p>
+          <a:p>
+            <a:r>
+              <a:rPr lang="ca-ES" sz="1200" u="none" dirty="0">
+                <a:latin typeface="Courier New" panose="02070309020205020404" pitchFamily="49" charset="0"/>
+                <a:cs typeface="Courier New" panose="02070309020205020404" pitchFamily="49" charset="0"/>
+              </a:rPr>
+              <a:t>                                </a:t>
+            </a:r>
+          </a:p>
+          <a:p>
+            <a:r>
+              <a:rPr lang="ca-ES" sz="1600" b="1" u="none" dirty="0" err="1">
+                <a:latin typeface="Courier New" panose="02070309020205020404" pitchFamily="49" charset="0"/>
+                <a:cs typeface="Courier New" panose="02070309020205020404" pitchFamily="49" charset="0"/>
+              </a:rPr>
+              <a:t>Required</a:t>
+            </a:r>
+            <a:r>
+              <a:rPr lang="ca-ES" sz="1600" b="1" u="none" dirty="0">
+                <a:latin typeface="Courier New" panose="02070309020205020404" pitchFamily="49" charset="0"/>
+                <a:cs typeface="Courier New" panose="02070309020205020404" pitchFamily="49" charset="0"/>
+              </a:rPr>
+              <a:t> </a:t>
+            </a:r>
+            <a:r>
+              <a:rPr lang="ca-ES" sz="1600" b="1" u="none" dirty="0" err="1">
+                <a:latin typeface="Courier New" panose="02070309020205020404" pitchFamily="49" charset="0"/>
+                <a:cs typeface="Courier New" panose="02070309020205020404" pitchFamily="49" charset="0"/>
+              </a:rPr>
+              <a:t>sample</a:t>
+            </a:r>
+            <a:r>
+              <a:rPr lang="ca-ES" sz="1600" b="1" u="none" dirty="0">
+                <a:latin typeface="Courier New" panose="02070309020205020404" pitchFamily="49" charset="0"/>
+                <a:cs typeface="Courier New" panose="02070309020205020404" pitchFamily="49" charset="0"/>
+              </a:rPr>
+              <a:t> </a:t>
+            </a:r>
+            <a:r>
+              <a:rPr lang="ca-ES" sz="1600" b="1" u="none" dirty="0" err="1">
+                <a:latin typeface="Courier New" panose="02070309020205020404" pitchFamily="49" charset="0"/>
+                <a:cs typeface="Courier New" panose="02070309020205020404" pitchFamily="49" charset="0"/>
+              </a:rPr>
+              <a:t>size</a:t>
+            </a:r>
+            <a:r>
+              <a:rPr lang="ca-ES" sz="1600" b="1" u="none" dirty="0">
+                <a:latin typeface="Courier New" panose="02070309020205020404" pitchFamily="49" charset="0"/>
+                <a:cs typeface="Courier New" panose="02070309020205020404" pitchFamily="49" charset="0"/>
+              </a:rPr>
+              <a:t>   </a:t>
+            </a:r>
+            <a:r>
+              <a:rPr lang="ca-ES" sz="1600" b="1" u="none" dirty="0" err="1">
+                <a:latin typeface="Courier New" panose="02070309020205020404" pitchFamily="49" charset="0"/>
+                <a:cs typeface="Courier New" panose="02070309020205020404" pitchFamily="49" charset="0"/>
+              </a:rPr>
+              <a:t>Estimated</a:t>
+            </a:r>
+            <a:endParaRPr lang="ca-ES" sz="1600" b="1" u="none" dirty="0">
+              <a:latin typeface="Courier New" panose="02070309020205020404" pitchFamily="49" charset="0"/>
+              <a:cs typeface="Courier New" panose="02070309020205020404" pitchFamily="49" charset="0"/>
+            </a:endParaRPr>
+          </a:p>
+          <a:p>
+            <a:r>
+              <a:rPr lang="ca-ES" sz="1600" b="1" u="none" dirty="0">
+                <a:latin typeface="Courier New" panose="02070309020205020404" pitchFamily="49" charset="0"/>
+                <a:cs typeface="Courier New" panose="02070309020205020404" pitchFamily="49" charset="0"/>
+              </a:rPr>
+              <a:t>N                             32</a:t>
+            </a:r>
+            <a:endParaRPr lang="ca-ES" sz="1200" b="1" u="none" dirty="0">
+              <a:latin typeface="Courier New" panose="02070309020205020404" pitchFamily="49" charset="0"/>
+              <a:cs typeface="Courier New" panose="02070309020205020404" pitchFamily="49" charset="0"/>
+            </a:endParaRPr>
+          </a:p>
+        </p:txBody>
+      </p:sp>
+    </p:spTree>
+    <p:extLst>
+      <p:ext uri="{BB962C8B-B14F-4D97-AF65-F5344CB8AC3E}">
+        <p14:creationId xmlns:p14="http://schemas.microsoft.com/office/powerpoint/2010/main" val="595430586"/>
+      </p:ext>
+    </p:extLst>
   </p:cSld>
   <p:clrMapOvr>
     <a:masterClrMapping/>
@@ -29602,7 +31148,7 @@
             </a:r>
             <a:r>
               <a:rPr lang="ca-ES" dirty="0" err="1"/>
-              <a:t>accuracy</a:t>
+              <a:t>precision</a:t>
             </a:r>
             <a:r>
               <a:rPr lang="ca-ES" dirty="0"/>
@@ -29758,7 +31304,7 @@
             </a:r>
             <a:r>
               <a:rPr lang="ca-ES" dirty="0" err="1"/>
-              <a:t>accuracy</a:t>
+              <a:t>precision</a:t>
             </a:r>
             <a:r>
               <a:rPr lang="ca-ES" dirty="0"/>
@@ -30757,7 +32303,7 @@
           <a:graphicData uri="http://schemas.openxmlformats.org/presentationml/2006/ole">
             <mc:AlternateContent xmlns:mc="http://schemas.openxmlformats.org/markup-compatibility/2006">
               <mc:Choice xmlns:v="urn:schemas-microsoft-com:vml" Requires="v">
-                <p:oleObj spid="_x0000_s1053" name="Equation" r:id="rId4" imgW="1650960" imgH="419040" progId="Equation.DSMT4">
+                <p:oleObj spid="_x0000_s1057" name="Equation" r:id="rId4" imgW="1650960" imgH="419040" progId="Equation.DSMT4">
                   <p:embed/>
                 </p:oleObj>
               </mc:Choice>
@@ -31351,25 +32897,25 @@
           <p:nvPr>
             <p:extLst>
               <p:ext uri="{D42A27DB-BD31-4B8C-83A1-F6EECF244321}">
-                <p14:modId xmlns:p14="http://schemas.microsoft.com/office/powerpoint/2010/main" val="2222231062"/>
+                <p14:modId xmlns:p14="http://schemas.microsoft.com/office/powerpoint/2010/main" val="2569945856"/>
               </p:ext>
             </p:extLst>
           </p:nvPr>
         </p:nvGraphicFramePr>
         <p:xfrm>
-          <a:off x="1278266" y="4437112"/>
-          <a:ext cx="7857255" cy="1081099"/>
+          <a:off x="900113" y="4403725"/>
+          <a:ext cx="8615362" cy="1147763"/>
         </p:xfrm>
         <a:graphic>
           <a:graphicData uri="http://schemas.openxmlformats.org/presentationml/2006/ole">
             <mc:AlternateContent xmlns:mc="http://schemas.openxmlformats.org/markup-compatibility/2006">
               <mc:Choice xmlns:v="urn:schemas-microsoft-com:vml" Requires="v">
-                <p:oleObj spid="_x0000_s8205" name="Equation" r:id="rId4" imgW="2374560" imgH="419040" progId="Equation.DSMT4">
+                <p:oleObj spid="_x0000_s8210" name="Equation" r:id="rId4" imgW="2603160" imgH="444240" progId="Equation.DSMT4">
                   <p:embed/>
                 </p:oleObj>
               </mc:Choice>
               <mc:Fallback>
-                <p:oleObj name="Equation" r:id="rId4" imgW="2374560" imgH="419040" progId="Equation.DSMT4">
+                <p:oleObj name="Equation" r:id="rId4" imgW="2603160" imgH="444240" progId="Equation.DSMT4">
                   <p:embed/>
                   <p:pic>
                     <p:nvPicPr>
@@ -31388,8 +32934,8 @@
                     </p:blipFill>
                     <p:spPr bwMode="auto">
                       <a:xfrm>
-                        <a:off x="1278266" y="4437112"/>
-                        <a:ext cx="7857255" cy="1081099"/>
+                        <a:off x="900113" y="4403725"/>
+                        <a:ext cx="8615362" cy="1147763"/>
                       </a:xfrm>
                       <a:prstGeom prst="rect">
                         <a:avLst/>
@@ -36351,6 +37897,14 @@
 <file path=ppt/slides/slide8.xml><?xml version="1.0" encoding="utf-8"?>
 <p:sld xmlns:a="http://schemas.openxmlformats.org/drawingml/2006/main" xmlns:r="http://schemas.openxmlformats.org/officeDocument/2006/relationships" xmlns:p="http://schemas.openxmlformats.org/presentationml/2006/main">
   <p:cSld>
+    <p:bg>
+      <p:bgPr>
+        <a:solidFill>
+          <a:schemeClr val="tx1"/>
+        </a:solidFill>
+        <a:effectLst/>
+      </p:bgPr>
+    </p:bg>
     <p:spTree>
       <p:nvGrpSpPr>
         <p:cNvPr id="1" name=""/>
@@ -36384,7 +37938,7 @@
         <p:spPr>
           <a:xfrm>
             <a:off x="495300" y="1166018"/>
-            <a:ext cx="4169668" cy="4525963"/>
+            <a:ext cx="4241676" cy="4525963"/>
           </a:xfrm>
         </p:spPr>
         <p:txBody>
@@ -36520,6 +38074,9 @@
             <a:endParaRPr lang="ca-ES" sz="1600" dirty="0"/>
           </a:p>
           <a:p>
+            <a:endParaRPr lang="ca-ES" sz="2000" dirty="0"/>
+          </a:p>
+          <a:p>
             <a:r>
               <a:rPr lang="ca-ES" sz="2000" dirty="0"/>
               <a:t>Data: </a:t>
@@ -36570,7 +38127,15 @@
             </a:r>
             <a:r>
               <a:rPr lang="ca-ES" sz="1600" dirty="0"/>
-              <a:t> mus be “</a:t>
+              <a:t> </a:t>
+            </a:r>
+            <a:r>
+              <a:rPr lang="ca-ES" sz="1600" dirty="0" err="1"/>
+              <a:t>must</a:t>
+            </a:r>
+            <a:r>
+              <a:rPr lang="ca-ES" sz="1600" dirty="0"/>
+              <a:t> be “</a:t>
             </a:r>
             <a:r>
               <a:rPr lang="ca-ES" sz="1600" dirty="0" err="1"/>
@@ -36588,6 +38153,66 @@
               <a:rPr lang="ca-ES" sz="1600" dirty="0"/>
               <a:t>”</a:t>
             </a:r>
+          </a:p>
+          <a:p>
+            <a:pPr lvl="1"/>
+            <a:endParaRPr lang="ca-ES" sz="1600" dirty="0"/>
+          </a:p>
+          <a:p>
+            <a:r>
+              <a:rPr lang="es-ES" sz="2000" dirty="0">
+                <a:sym typeface="Symbol" pitchFamily="18" charset="2"/>
+              </a:rPr>
+              <a:t>z</a:t>
+            </a:r>
+            <a:r>
+              <a:rPr lang="es-ES" sz="2000" baseline="-25000" dirty="0">
+                <a:sym typeface="Symbol" pitchFamily="18" charset="2"/>
+              </a:rPr>
+              <a:t>/2</a:t>
+            </a:r>
+            <a:r>
+              <a:rPr lang="es-ES" sz="2000" dirty="0">
+                <a:sym typeface="Symbol" pitchFamily="18" charset="2"/>
+              </a:rPr>
+              <a:t> are </a:t>
+            </a:r>
+            <a:r>
+              <a:rPr lang="es-ES" sz="2000" dirty="0" err="1">
+                <a:sym typeface="Symbol" pitchFamily="18" charset="2"/>
+              </a:rPr>
+              <a:t>quantiles</a:t>
+            </a:r>
+            <a:r>
+              <a:rPr lang="es-ES" sz="2000" dirty="0">
+                <a:sym typeface="Symbol" pitchFamily="18" charset="2"/>
+              </a:rPr>
+              <a:t> </a:t>
+            </a:r>
+            <a:r>
+              <a:rPr lang="es-ES" sz="2000" dirty="0" err="1">
+                <a:sym typeface="Symbol" pitchFamily="18" charset="2"/>
+              </a:rPr>
+              <a:t>of</a:t>
+            </a:r>
+            <a:r>
+              <a:rPr lang="es-ES" sz="2000" dirty="0">
+                <a:sym typeface="Symbol" pitchFamily="18" charset="2"/>
+              </a:rPr>
+              <a:t> standard Normal N(0,1) </a:t>
+            </a:r>
+            <a:r>
+              <a:rPr lang="es-ES" sz="2000" dirty="0" err="1">
+                <a:sym typeface="Symbol" pitchFamily="18" charset="2"/>
+              </a:rPr>
+              <a:t>distribution</a:t>
+            </a:r>
+            <a:endParaRPr lang="es-ES" sz="2000" dirty="0">
+              <a:sym typeface="Symbol" pitchFamily="18" charset="2"/>
+            </a:endParaRPr>
+          </a:p>
+          <a:p>
+            <a:endParaRPr lang="ca-ES" sz="1800" dirty="0"/>
           </a:p>
         </p:txBody>
       </p:sp>
@@ -36646,20 +38271,20 @@
           <p:nvPr>
             <p:extLst>
               <p:ext uri="{D42A27DB-BD31-4B8C-83A1-F6EECF244321}">
-                <p14:modId xmlns:p14="http://schemas.microsoft.com/office/powerpoint/2010/main" val="4286512576"/>
+                <p14:modId xmlns:p14="http://schemas.microsoft.com/office/powerpoint/2010/main" val="404250319"/>
               </p:ext>
             </p:extLst>
           </p:nvPr>
         </p:nvGraphicFramePr>
         <p:xfrm>
-          <a:off x="5505077" y="2132856"/>
+          <a:off x="5505449" y="2339975"/>
           <a:ext cx="3854450" cy="839788"/>
         </p:xfrm>
         <a:graphic>
           <a:graphicData uri="http://schemas.openxmlformats.org/presentationml/2006/ole">
             <mc:AlternateContent xmlns:mc="http://schemas.openxmlformats.org/markup-compatibility/2006">
               <mc:Choice xmlns:v="urn:schemas-microsoft-com:vml" Requires="v">
-                <p:oleObj spid="_x0000_s10269" name="Equation" r:id="rId3" imgW="1930320" imgH="419040" progId="Equation.DSMT4">
+                <p:oleObj spid="_x0000_s10287" name="Equation" r:id="rId3" imgW="1930320" imgH="419040" progId="Equation.DSMT4">
                   <p:embed/>
                 </p:oleObj>
               </mc:Choice>
@@ -36689,7 +38314,7 @@
                     </p:blipFill>
                     <p:spPr bwMode="auto">
                       <a:xfrm>
-                        <a:off x="5505077" y="2132856"/>
+                        <a:off x="5505449" y="2339975"/>
                         <a:ext cx="3854450" cy="839788"/>
                       </a:xfrm>
                       <a:prstGeom prst="rect">
@@ -36740,7 +38365,7 @@
           <a:graphicData uri="http://schemas.openxmlformats.org/presentationml/2006/ole">
             <mc:AlternateContent xmlns:mc="http://schemas.openxmlformats.org/markup-compatibility/2006">
               <mc:Choice xmlns:v="urn:schemas-microsoft-com:vml" Requires="v">
-                <p:oleObj spid="_x0000_s10270" name="Equation" r:id="rId5" imgW="1993680" imgH="419040" progId="Equation.DSMT4">
+                <p:oleObj spid="_x0000_s10288" name="Equation" r:id="rId5" imgW="1993680" imgH="419040" progId="Equation.DSMT4">
                   <p:embed/>
                 </p:oleObj>
               </mc:Choice>
@@ -36808,7 +38433,7 @@
           <p:nvPr>
             <p:extLst>
               <p:ext uri="{D42A27DB-BD31-4B8C-83A1-F6EECF244321}">
-                <p14:modId xmlns:p14="http://schemas.microsoft.com/office/powerpoint/2010/main" val="3085035886"/>
+                <p14:modId xmlns:p14="http://schemas.microsoft.com/office/powerpoint/2010/main" val="4111049490"/>
               </p:ext>
             </p:extLst>
           </p:nvPr>
@@ -36821,7 +38446,7 @@
           <a:graphicData uri="http://schemas.openxmlformats.org/presentationml/2006/ole">
             <mc:AlternateContent xmlns:mc="http://schemas.openxmlformats.org/markup-compatibility/2006">
               <mc:Choice xmlns:v="urn:schemas-microsoft-com:vml" Requires="v">
-                <p:oleObj spid="_x0000_s10271" name="Equation" r:id="rId7" imgW="2184120" imgH="444240" progId="Equation.DSMT4">
+                <p:oleObj spid="_x0000_s10289" name="Equation" r:id="rId7" imgW="2184120" imgH="444240" progId="Equation.DSMT4">
                   <p:embed/>
                 </p:oleObj>
               </mc:Choice>
@@ -36859,32 +38484,818 @@
                       </a:prstGeom>
                       <a:noFill/>
                       <a:ln>
-                        <a:noFill/>
+                        <a:solidFill>
+                          <a:schemeClr val="tx1"/>
+                        </a:solidFill>
                       </a:ln>
-                      <a:extLst>
-                        <a:ext uri="{909E8E84-426E-40DD-AFC4-6F175D3DCCD1}">
-                          <a14:hiddenFill xmlns:a14="http://schemas.microsoft.com/office/drawing/2010/main">
-                            <a:solidFill>
-                              <a:srgbClr val="FFFFFF"/>
-                            </a:solidFill>
-                          </a14:hiddenFill>
-                        </a:ext>
-                        <a:ext uri="{91240B29-F687-4F45-9708-019B960494DF}">
-                          <a14:hiddenLine xmlns:a14="http://schemas.microsoft.com/office/drawing/2010/main" w="9525">
-                            <a:solidFill>
-                              <a:srgbClr val="000000"/>
-                            </a:solidFill>
-                            <a:miter lim="800000"/>
-                            <a:headEnd/>
-                            <a:tailEnd/>
-                          </a14:hiddenLine>
-                        </a:ext>
-                      </a:extLst>
+                      <a:extLst/>
                     </p:spPr>
                   </p:pic>
                 </p:oleObj>
               </mc:Fallback>
             </mc:AlternateContent>
+          </a:graphicData>
+        </a:graphic>
+      </p:graphicFrame>
+      <p:graphicFrame>
+        <p:nvGraphicFramePr>
+          <p:cNvPr id="4" name="Tabla 3">
+            <a:extLst>
+              <a:ext uri="{FF2B5EF4-FFF2-40B4-BE49-F238E27FC236}">
+                <a16:creationId xmlns:a16="http://schemas.microsoft.com/office/drawing/2014/main" id="{88E349BB-B6AF-438D-B4E1-957366320B38}"/>
+              </a:ext>
+            </a:extLst>
+          </p:cNvPr>
+          <p:cNvGraphicFramePr>
+            <a:graphicFrameLocks noGrp="1"/>
+          </p:cNvGraphicFramePr>
+          <p:nvPr>
+            <p:extLst>
+              <p:ext uri="{D42A27DB-BD31-4B8C-83A1-F6EECF244321}">
+                <p14:modId xmlns:p14="http://schemas.microsoft.com/office/powerpoint/2010/main" val="712024323"/>
+              </p:ext>
+            </p:extLst>
+          </p:nvPr>
+        </p:nvGraphicFramePr>
+        <p:xfrm>
+          <a:off x="5599511" y="4930936"/>
+          <a:ext cx="3839913" cy="796800"/>
+        </p:xfrm>
+        <a:graphic>
+          <a:graphicData uri="http://schemas.openxmlformats.org/drawingml/2006/table">
+            <a:tbl>
+              <a:tblPr/>
+              <a:tblGrid>
+                <a:gridCol w="1219173">
+                  <a:extLst>
+                    <a:ext uri="{9D8B030D-6E8A-4147-A177-3AD203B41FA5}">
+                      <a16:colId xmlns:a16="http://schemas.microsoft.com/office/drawing/2014/main" val="4278581145"/>
+                    </a:ext>
+                  </a:extLst>
+                </a:gridCol>
+                <a:gridCol w="866723">
+                  <a:extLst>
+                    <a:ext uri="{9D8B030D-6E8A-4147-A177-3AD203B41FA5}">
+                      <a16:colId xmlns:a16="http://schemas.microsoft.com/office/drawing/2014/main" val="2416125066"/>
+                    </a:ext>
+                  </a:extLst>
+                </a:gridCol>
+                <a:gridCol w="868094">
+                  <a:extLst>
+                    <a:ext uri="{9D8B030D-6E8A-4147-A177-3AD203B41FA5}">
+                      <a16:colId xmlns:a16="http://schemas.microsoft.com/office/drawing/2014/main" val="3864918377"/>
+                    </a:ext>
+                  </a:extLst>
+                </a:gridCol>
+                <a:gridCol w="885923">
+                  <a:extLst>
+                    <a:ext uri="{9D8B030D-6E8A-4147-A177-3AD203B41FA5}">
+                      <a16:colId xmlns:a16="http://schemas.microsoft.com/office/drawing/2014/main" val="3953009483"/>
+                    </a:ext>
+                  </a:extLst>
+                </a:gridCol>
+              </a:tblGrid>
+              <a:tr h="369640">
+                <a:tc>
+                  <a:txBody>
+                    <a:bodyPr/>
+                    <a:lstStyle/>
+                    <a:p>
+                      <a:pPr marL="0" marR="0" lvl="0" indent="0" algn="ctr" defTabSz="914400" rtl="0" eaLnBrk="1" fontAlgn="base" latinLnBrk="0" hangingPunct="1">
+                        <a:lnSpc>
+                          <a:spcPct val="100000"/>
+                        </a:lnSpc>
+                        <a:spcBef>
+                          <a:spcPct val="20000"/>
+                        </a:spcBef>
+                        <a:spcAft>
+                          <a:spcPct val="0"/>
+                        </a:spcAft>
+                        <a:buClr>
+                          <a:schemeClr val="bg2"/>
+                        </a:buClr>
+                        <a:buSzPct val="70000"/>
+                        <a:buFont typeface="Wingdings" pitchFamily="2" charset="2"/>
+                        <a:buNone/>
+                        <a:tabLst/>
+                      </a:pPr>
+                      <a:r>
+                        <a:rPr kumimoji="0" lang="es-ES" sz="2000" b="0" i="0" u="none" strike="noStrike" cap="none" normalizeH="0" baseline="0" dirty="0">
+                          <a:ln>
+                            <a:noFill/>
+                          </a:ln>
+                          <a:solidFill>
+                            <a:schemeClr val="tx1"/>
+                          </a:solidFill>
+                          <a:effectLst/>
+                          <a:latin typeface="Arial" charset="0"/>
+                          <a:sym typeface="Symbol" pitchFamily="18" charset="2"/>
+                        </a:rPr>
+                        <a:t>1- </a:t>
+                      </a:r>
+                    </a:p>
+                  </a:txBody>
+                  <a:tcPr marL="90000" marR="90000" marT="46800" marB="46800" anchor="ctr" horzOverflow="overflow">
+                    <a:lnL w="28575" cap="flat" cmpd="sng" algn="ctr">
+                      <a:solidFill>
+                        <a:schemeClr val="tx1"/>
+                      </a:solidFill>
+                      <a:prstDash val="solid"/>
+                      <a:round/>
+                      <a:headEnd type="none" w="med" len="med"/>
+                      <a:tailEnd type="none" w="med" len="med"/>
+                    </a:lnL>
+                    <a:lnR w="19050" cap="flat" cmpd="sng" algn="ctr">
+                      <a:solidFill>
+                        <a:schemeClr val="tx1"/>
+                      </a:solidFill>
+                      <a:prstDash val="solid"/>
+                      <a:round/>
+                      <a:headEnd type="none" w="med" len="med"/>
+                      <a:tailEnd type="none" w="med" len="med"/>
+                    </a:lnR>
+                    <a:lnT w="12700" cap="flat" cmpd="sng" algn="ctr">
+                      <a:solidFill>
+                        <a:schemeClr val="tx1"/>
+                      </a:solidFill>
+                      <a:prstDash val="solid"/>
+                      <a:round/>
+                      <a:headEnd type="none" w="med" len="med"/>
+                      <a:tailEnd type="none" w="med" len="med"/>
+                    </a:lnT>
+                    <a:lnB w="12700" cap="flat" cmpd="sng" algn="ctr">
+                      <a:solidFill>
+                        <a:schemeClr val="tx1"/>
+                      </a:solidFill>
+                      <a:prstDash val="solid"/>
+                      <a:round/>
+                      <a:headEnd type="none" w="med" len="med"/>
+                      <a:tailEnd type="none" w="med" len="med"/>
+                    </a:lnB>
+                    <a:lnTlToBr>
+                      <a:noFill/>
+                    </a:lnTlToBr>
+                    <a:lnBlToTr>
+                      <a:noFill/>
+                    </a:lnBlToTr>
+                    <a:solidFill>
+                      <a:srgbClr val="D7CBBF"/>
+                    </a:solidFill>
+                  </a:tcPr>
+                </a:tc>
+                <a:tc>
+                  <a:txBody>
+                    <a:bodyPr/>
+                    <a:lstStyle/>
+                    <a:p>
+                      <a:pPr marL="0" marR="0" lvl="0" indent="0" algn="ctr" defTabSz="914400" rtl="0" eaLnBrk="1" fontAlgn="base" latinLnBrk="0" hangingPunct="1">
+                        <a:lnSpc>
+                          <a:spcPct val="100000"/>
+                        </a:lnSpc>
+                        <a:spcBef>
+                          <a:spcPct val="20000"/>
+                        </a:spcBef>
+                        <a:spcAft>
+                          <a:spcPct val="0"/>
+                        </a:spcAft>
+                        <a:buClr>
+                          <a:schemeClr val="bg2"/>
+                        </a:buClr>
+                        <a:buSzPct val="70000"/>
+                        <a:buFont typeface="Wingdings" pitchFamily="2" charset="2"/>
+                        <a:buNone/>
+                        <a:tabLst/>
+                      </a:pPr>
+                      <a:r>
+                        <a:rPr kumimoji="0" lang="es-ES" sz="2000" b="0" i="0" u="none" strike="noStrike" cap="none" normalizeH="0" baseline="0">
+                          <a:ln>
+                            <a:noFill/>
+                          </a:ln>
+                          <a:solidFill>
+                            <a:schemeClr val="tx1"/>
+                          </a:solidFill>
+                          <a:effectLst/>
+                          <a:latin typeface="Arial" charset="0"/>
+                        </a:rPr>
+                        <a:t>0,90</a:t>
+                      </a:r>
+                    </a:p>
+                  </a:txBody>
+                  <a:tcPr marL="90000" marR="90000" marT="46800" marB="46800" anchor="ctr" horzOverflow="overflow">
+                    <a:lnL w="19050" cap="flat" cmpd="sng" algn="ctr">
+                      <a:solidFill>
+                        <a:schemeClr val="tx1"/>
+                      </a:solidFill>
+                      <a:prstDash val="solid"/>
+                      <a:round/>
+                      <a:headEnd type="none" w="med" len="med"/>
+                      <a:tailEnd type="none" w="med" len="med"/>
+                    </a:lnL>
+                    <a:lnR w="12700" cap="flat" cmpd="sng" algn="ctr">
+                      <a:solidFill>
+                        <a:schemeClr val="tx1"/>
+                      </a:solidFill>
+                      <a:prstDash val="solid"/>
+                      <a:round/>
+                      <a:headEnd type="none" w="med" len="med"/>
+                      <a:tailEnd type="none" w="med" len="med"/>
+                    </a:lnR>
+                    <a:lnT w="12700" cap="flat" cmpd="sng" algn="ctr">
+                      <a:solidFill>
+                        <a:schemeClr val="tx1"/>
+                      </a:solidFill>
+                      <a:prstDash val="solid"/>
+                      <a:round/>
+                      <a:headEnd type="none" w="med" len="med"/>
+                      <a:tailEnd type="none" w="med" len="med"/>
+                    </a:lnT>
+                    <a:lnB w="12700" cap="flat" cmpd="sng" algn="ctr">
+                      <a:solidFill>
+                        <a:schemeClr val="tx1"/>
+                      </a:solidFill>
+                      <a:prstDash val="solid"/>
+                      <a:round/>
+                      <a:headEnd type="none" w="med" len="med"/>
+                      <a:tailEnd type="none" w="med" len="med"/>
+                    </a:lnB>
+                    <a:lnTlToBr>
+                      <a:noFill/>
+                    </a:lnTlToBr>
+                    <a:lnBlToTr>
+                      <a:noFill/>
+                    </a:lnBlToTr>
+                    <a:solidFill>
+                      <a:srgbClr val="D7CBBF"/>
+                    </a:solidFill>
+                  </a:tcPr>
+                </a:tc>
+                <a:tc>
+                  <a:txBody>
+                    <a:bodyPr/>
+                    <a:lstStyle/>
+                    <a:p>
+                      <a:pPr marL="0" marR="0" lvl="0" indent="0" algn="ctr" defTabSz="914400" rtl="0" eaLnBrk="1" fontAlgn="base" latinLnBrk="0" hangingPunct="1">
+                        <a:lnSpc>
+                          <a:spcPct val="100000"/>
+                        </a:lnSpc>
+                        <a:spcBef>
+                          <a:spcPct val="20000"/>
+                        </a:spcBef>
+                        <a:spcAft>
+                          <a:spcPct val="0"/>
+                        </a:spcAft>
+                        <a:buClr>
+                          <a:schemeClr val="bg2"/>
+                        </a:buClr>
+                        <a:buSzPct val="70000"/>
+                        <a:buFont typeface="Wingdings" pitchFamily="2" charset="2"/>
+                        <a:buNone/>
+                        <a:tabLst/>
+                      </a:pPr>
+                      <a:r>
+                        <a:rPr kumimoji="0" lang="es-ES" sz="2000" b="0" i="0" u="none" strike="noStrike" cap="none" normalizeH="0" baseline="0">
+                          <a:ln>
+                            <a:noFill/>
+                          </a:ln>
+                          <a:solidFill>
+                            <a:schemeClr val="tx1"/>
+                          </a:solidFill>
+                          <a:effectLst/>
+                          <a:latin typeface="Arial" charset="0"/>
+                        </a:rPr>
+                        <a:t>0,95</a:t>
+                      </a:r>
+                    </a:p>
+                  </a:txBody>
+                  <a:tcPr marL="90000" marR="90000" marT="46800" marB="46800" anchor="ctr" horzOverflow="overflow">
+                    <a:lnL w="12700" cap="flat" cmpd="sng" algn="ctr">
+                      <a:solidFill>
+                        <a:schemeClr val="tx1"/>
+                      </a:solidFill>
+                      <a:prstDash val="solid"/>
+                      <a:round/>
+                      <a:headEnd type="none" w="med" len="med"/>
+                      <a:tailEnd type="none" w="med" len="med"/>
+                    </a:lnL>
+                    <a:lnR w="12700" cap="flat" cmpd="sng" algn="ctr">
+                      <a:solidFill>
+                        <a:schemeClr val="tx1"/>
+                      </a:solidFill>
+                      <a:prstDash val="solid"/>
+                      <a:round/>
+                      <a:headEnd type="none" w="med" len="med"/>
+                      <a:tailEnd type="none" w="med" len="med"/>
+                    </a:lnR>
+                    <a:lnT w="12700" cap="flat" cmpd="sng" algn="ctr">
+                      <a:solidFill>
+                        <a:schemeClr val="tx1"/>
+                      </a:solidFill>
+                      <a:prstDash val="solid"/>
+                      <a:round/>
+                      <a:headEnd type="none" w="med" len="med"/>
+                      <a:tailEnd type="none" w="med" len="med"/>
+                    </a:lnT>
+                    <a:lnB w="12700" cap="flat" cmpd="sng" algn="ctr">
+                      <a:solidFill>
+                        <a:schemeClr val="tx1"/>
+                      </a:solidFill>
+                      <a:prstDash val="solid"/>
+                      <a:round/>
+                      <a:headEnd type="none" w="med" len="med"/>
+                      <a:tailEnd type="none" w="med" len="med"/>
+                    </a:lnB>
+                    <a:lnTlToBr>
+                      <a:noFill/>
+                    </a:lnTlToBr>
+                    <a:lnBlToTr>
+                      <a:noFill/>
+                    </a:lnBlToTr>
+                    <a:solidFill>
+                      <a:srgbClr val="D7CBBF"/>
+                    </a:solidFill>
+                  </a:tcPr>
+                </a:tc>
+                <a:tc>
+                  <a:txBody>
+                    <a:bodyPr/>
+                    <a:lstStyle/>
+                    <a:p>
+                      <a:pPr marL="0" marR="0" lvl="0" indent="0" algn="ctr" defTabSz="914400" rtl="0" eaLnBrk="1" fontAlgn="base" latinLnBrk="0" hangingPunct="1">
+                        <a:lnSpc>
+                          <a:spcPct val="100000"/>
+                        </a:lnSpc>
+                        <a:spcBef>
+                          <a:spcPct val="20000"/>
+                        </a:spcBef>
+                        <a:spcAft>
+                          <a:spcPct val="0"/>
+                        </a:spcAft>
+                        <a:buClr>
+                          <a:schemeClr val="bg2"/>
+                        </a:buClr>
+                        <a:buSzPct val="70000"/>
+                        <a:buFont typeface="Wingdings" pitchFamily="2" charset="2"/>
+                        <a:buNone/>
+                        <a:tabLst/>
+                      </a:pPr>
+                      <a:r>
+                        <a:rPr kumimoji="0" lang="es-ES" sz="2000" b="0" i="0" u="none" strike="noStrike" cap="none" normalizeH="0" baseline="0">
+                          <a:ln>
+                            <a:noFill/>
+                          </a:ln>
+                          <a:solidFill>
+                            <a:schemeClr val="tx1"/>
+                          </a:solidFill>
+                          <a:effectLst/>
+                          <a:latin typeface="Arial" charset="0"/>
+                        </a:rPr>
+                        <a:t>0,99</a:t>
+                      </a:r>
+                    </a:p>
+                  </a:txBody>
+                  <a:tcPr marL="90000" marR="90000" marT="46800" marB="46800" anchor="ctr" horzOverflow="overflow">
+                    <a:lnL w="12700" cap="flat" cmpd="sng" algn="ctr">
+                      <a:solidFill>
+                        <a:schemeClr val="tx1"/>
+                      </a:solidFill>
+                      <a:prstDash val="solid"/>
+                      <a:round/>
+                      <a:headEnd type="none" w="med" len="med"/>
+                      <a:tailEnd type="none" w="med" len="med"/>
+                    </a:lnL>
+                    <a:lnR w="28575" cap="flat" cmpd="sng" algn="ctr">
+                      <a:solidFill>
+                        <a:schemeClr val="tx1"/>
+                      </a:solidFill>
+                      <a:prstDash val="solid"/>
+                      <a:round/>
+                      <a:headEnd type="none" w="med" len="med"/>
+                      <a:tailEnd type="none" w="med" len="med"/>
+                    </a:lnR>
+                    <a:lnT w="12700" cap="flat" cmpd="sng" algn="ctr">
+                      <a:solidFill>
+                        <a:schemeClr val="tx1"/>
+                      </a:solidFill>
+                      <a:prstDash val="solid"/>
+                      <a:round/>
+                      <a:headEnd type="none" w="med" len="med"/>
+                      <a:tailEnd type="none" w="med" len="med"/>
+                    </a:lnT>
+                    <a:lnB w="12700" cap="flat" cmpd="sng" algn="ctr">
+                      <a:solidFill>
+                        <a:schemeClr val="tx1"/>
+                      </a:solidFill>
+                      <a:prstDash val="solid"/>
+                      <a:round/>
+                      <a:headEnd type="none" w="med" len="med"/>
+                      <a:tailEnd type="none" w="med" len="med"/>
+                    </a:lnB>
+                    <a:lnTlToBr>
+                      <a:noFill/>
+                    </a:lnTlToBr>
+                    <a:lnBlToTr>
+                      <a:noFill/>
+                    </a:lnBlToTr>
+                    <a:solidFill>
+                      <a:srgbClr val="D7CBBF"/>
+                    </a:solidFill>
+                  </a:tcPr>
+                </a:tc>
+                <a:extLst>
+                  <a:ext uri="{0D108BD9-81ED-4DB2-BD59-A6C34878D82A}">
+                    <a16:rowId xmlns:a16="http://schemas.microsoft.com/office/drawing/2014/main" val="1678857178"/>
+                  </a:ext>
+                </a:extLst>
+              </a:tr>
+              <a:tr h="369640">
+                <a:tc>
+                  <a:txBody>
+                    <a:bodyPr/>
+                    <a:lstStyle/>
+                    <a:p>
+                      <a:pPr marL="0" marR="0" lvl="0" indent="0" algn="ctr" defTabSz="914400" rtl="0" eaLnBrk="1" fontAlgn="base" latinLnBrk="0" hangingPunct="1">
+                        <a:lnSpc>
+                          <a:spcPct val="100000"/>
+                        </a:lnSpc>
+                        <a:spcBef>
+                          <a:spcPct val="20000"/>
+                        </a:spcBef>
+                        <a:spcAft>
+                          <a:spcPct val="0"/>
+                        </a:spcAft>
+                        <a:buClr>
+                          <a:schemeClr val="bg2"/>
+                        </a:buClr>
+                        <a:buSzPct val="70000"/>
+                        <a:buFont typeface="Wingdings" pitchFamily="2" charset="2"/>
+                        <a:buNone/>
+                        <a:tabLst/>
+                      </a:pPr>
+                      <a:r>
+                        <a:rPr kumimoji="0" lang="es-ES" sz="2000" b="0" i="0" u="none" strike="noStrike" cap="none" normalizeH="0" baseline="0" dirty="0">
+                          <a:ln>
+                            <a:noFill/>
+                          </a:ln>
+                          <a:solidFill>
+                            <a:schemeClr val="tx1"/>
+                          </a:solidFill>
+                          <a:effectLst/>
+                          <a:latin typeface="Arial" charset="0"/>
+                          <a:sym typeface="Symbol" pitchFamily="18" charset="2"/>
+                        </a:rPr>
+                        <a:t>z</a:t>
+                      </a:r>
+                      <a:r>
+                        <a:rPr kumimoji="0" lang="es-ES" sz="2000" b="0" i="0" u="none" strike="noStrike" cap="none" normalizeH="0" baseline="-25000" dirty="0">
+                          <a:ln>
+                            <a:noFill/>
+                          </a:ln>
+                          <a:solidFill>
+                            <a:schemeClr val="tx1"/>
+                          </a:solidFill>
+                          <a:effectLst/>
+                          <a:latin typeface="Arial" charset="0"/>
+                          <a:sym typeface="Symbol" pitchFamily="18" charset="2"/>
+                        </a:rPr>
+                        <a:t>/2</a:t>
+                      </a:r>
+                    </a:p>
+                  </a:txBody>
+                  <a:tcPr marL="90000" marR="90000" marT="46800" marB="46800" anchor="ctr" horzOverflow="overflow">
+                    <a:lnL w="28575" cap="flat" cmpd="sng" algn="ctr">
+                      <a:solidFill>
+                        <a:schemeClr val="tx1"/>
+                      </a:solidFill>
+                      <a:prstDash val="solid"/>
+                      <a:round/>
+                      <a:headEnd type="none" w="med" len="med"/>
+                      <a:tailEnd type="none" w="med" len="med"/>
+                    </a:lnL>
+                    <a:lnR w="19050" cap="flat" cmpd="sng" algn="ctr">
+                      <a:solidFill>
+                        <a:schemeClr val="tx1"/>
+                      </a:solidFill>
+                      <a:prstDash val="solid"/>
+                      <a:round/>
+                      <a:headEnd type="none" w="med" len="med"/>
+                      <a:tailEnd type="none" w="med" len="med"/>
+                    </a:lnR>
+                    <a:lnT w="12700" cap="flat" cmpd="sng" algn="ctr">
+                      <a:solidFill>
+                        <a:schemeClr val="tx1"/>
+                      </a:solidFill>
+                      <a:prstDash val="solid"/>
+                      <a:round/>
+                      <a:headEnd type="none" w="med" len="med"/>
+                      <a:tailEnd type="none" w="med" len="med"/>
+                    </a:lnT>
+                    <a:lnB w="12700" cap="flat" cmpd="sng" algn="ctr">
+                      <a:solidFill>
+                        <a:schemeClr val="tx1"/>
+                      </a:solidFill>
+                      <a:prstDash val="solid"/>
+                      <a:round/>
+                      <a:headEnd type="none" w="med" len="med"/>
+                      <a:tailEnd type="none" w="med" len="med"/>
+                    </a:lnB>
+                    <a:lnTlToBr>
+                      <a:noFill/>
+                    </a:lnTlToBr>
+                    <a:lnBlToTr>
+                      <a:noFill/>
+                    </a:lnBlToTr>
+                    <a:solidFill>
+                      <a:srgbClr val="EEF470"/>
+                    </a:solidFill>
+                  </a:tcPr>
+                </a:tc>
+                <a:tc>
+                  <a:txBody>
+                    <a:bodyPr/>
+                    <a:lstStyle/>
+                    <a:p>
+                      <a:pPr marL="0" marR="0" lvl="0" indent="0" algn="ctr" defTabSz="914400" rtl="0" eaLnBrk="1" fontAlgn="base" latinLnBrk="0" hangingPunct="1">
+                        <a:lnSpc>
+                          <a:spcPct val="100000"/>
+                        </a:lnSpc>
+                        <a:spcBef>
+                          <a:spcPct val="20000"/>
+                        </a:spcBef>
+                        <a:spcAft>
+                          <a:spcPct val="0"/>
+                        </a:spcAft>
+                        <a:buClr>
+                          <a:schemeClr val="bg2"/>
+                        </a:buClr>
+                        <a:buSzPct val="70000"/>
+                        <a:buFont typeface="Wingdings" pitchFamily="2" charset="2"/>
+                        <a:buNone/>
+                        <a:tabLst/>
+                      </a:pPr>
+                      <a:r>
+                        <a:rPr kumimoji="0" lang="es-ES" sz="2000" b="0" i="0" u="none" strike="noStrike" cap="none" normalizeH="0" baseline="0" dirty="0">
+                          <a:ln>
+                            <a:noFill/>
+                          </a:ln>
+                          <a:solidFill>
+                            <a:schemeClr val="tx1"/>
+                          </a:solidFill>
+                          <a:effectLst/>
+                          <a:latin typeface="Arial" charset="0"/>
+                        </a:rPr>
+                        <a:t>1,64</a:t>
+                      </a:r>
+                      <a:endParaRPr kumimoji="0" lang="es-ES" sz="2000" b="1" i="0" u="none" strike="noStrike" cap="none" normalizeH="0" baseline="-25000" dirty="0">
+                        <a:ln>
+                          <a:noFill/>
+                        </a:ln>
+                        <a:solidFill>
+                          <a:schemeClr val="tx1"/>
+                        </a:solidFill>
+                        <a:effectLst/>
+                        <a:latin typeface="Arial" charset="0"/>
+                        <a:sym typeface="Symbol" pitchFamily="18" charset="2"/>
+                      </a:endParaRPr>
+                    </a:p>
+                  </a:txBody>
+                  <a:tcPr marL="90000" marR="90000" marT="46800" marB="46800" anchor="ctr" horzOverflow="overflow">
+                    <a:lnL w="19050" cap="flat" cmpd="sng" algn="ctr">
+                      <a:solidFill>
+                        <a:schemeClr val="tx1"/>
+                      </a:solidFill>
+                      <a:prstDash val="solid"/>
+                      <a:round/>
+                      <a:headEnd type="none" w="med" len="med"/>
+                      <a:tailEnd type="none" w="med" len="med"/>
+                    </a:lnL>
+                    <a:lnR w="12700" cap="flat" cmpd="sng" algn="ctr">
+                      <a:solidFill>
+                        <a:schemeClr val="tx1"/>
+                      </a:solidFill>
+                      <a:prstDash val="solid"/>
+                      <a:round/>
+                      <a:headEnd type="none" w="med" len="med"/>
+                      <a:tailEnd type="none" w="med" len="med"/>
+                    </a:lnR>
+                    <a:lnT w="12700" cap="flat" cmpd="sng" algn="ctr">
+                      <a:solidFill>
+                        <a:schemeClr val="tx1"/>
+                      </a:solidFill>
+                      <a:prstDash val="solid"/>
+                      <a:round/>
+                      <a:headEnd type="none" w="med" len="med"/>
+                      <a:tailEnd type="none" w="med" len="med"/>
+                    </a:lnT>
+                    <a:lnB w="12700" cap="flat" cmpd="sng" algn="ctr">
+                      <a:solidFill>
+                        <a:schemeClr val="tx1"/>
+                      </a:solidFill>
+                      <a:prstDash val="solid"/>
+                      <a:round/>
+                      <a:headEnd type="none" w="med" len="med"/>
+                      <a:tailEnd type="none" w="med" len="med"/>
+                    </a:lnB>
+                    <a:lnTlToBr>
+                      <a:noFill/>
+                    </a:lnTlToBr>
+                    <a:lnBlToTr>
+                      <a:noFill/>
+                    </a:lnBlToTr>
+                    <a:solidFill>
+                      <a:srgbClr val="EEF470"/>
+                    </a:solidFill>
+                  </a:tcPr>
+                </a:tc>
+                <a:tc>
+                  <a:txBody>
+                    <a:bodyPr/>
+                    <a:lstStyle/>
+                    <a:p>
+                      <a:pPr marL="0" marR="0" lvl="0" indent="0" algn="ctr" defTabSz="914400" rtl="0" eaLnBrk="1" fontAlgn="base" latinLnBrk="0" hangingPunct="1">
+                        <a:lnSpc>
+                          <a:spcPct val="100000"/>
+                        </a:lnSpc>
+                        <a:spcBef>
+                          <a:spcPct val="20000"/>
+                        </a:spcBef>
+                        <a:spcAft>
+                          <a:spcPct val="0"/>
+                        </a:spcAft>
+                        <a:buClr>
+                          <a:schemeClr val="bg2"/>
+                        </a:buClr>
+                        <a:buSzPct val="70000"/>
+                        <a:buFont typeface="Wingdings" pitchFamily="2" charset="2"/>
+                        <a:buNone/>
+                        <a:tabLst/>
+                      </a:pPr>
+                      <a:r>
+                        <a:rPr kumimoji="0" lang="es-ES" sz="2000" b="0" i="0" u="none" strike="noStrike" cap="none" normalizeH="0" baseline="0" dirty="0">
+                          <a:ln>
+                            <a:noFill/>
+                          </a:ln>
+                          <a:solidFill>
+                            <a:schemeClr val="tx1"/>
+                          </a:solidFill>
+                          <a:effectLst/>
+                          <a:latin typeface="Arial" charset="0"/>
+                        </a:rPr>
+                        <a:t>1,96</a:t>
+                      </a:r>
+                      <a:endParaRPr kumimoji="0" lang="es-ES" sz="2000" b="1" i="0" u="none" strike="noStrike" cap="none" normalizeH="0" baseline="-25000" dirty="0">
+                        <a:ln>
+                          <a:noFill/>
+                        </a:ln>
+                        <a:solidFill>
+                          <a:schemeClr val="tx1"/>
+                        </a:solidFill>
+                        <a:effectLst/>
+                        <a:latin typeface="Arial" charset="0"/>
+                        <a:sym typeface="Symbol" pitchFamily="18" charset="2"/>
+                      </a:endParaRPr>
+                    </a:p>
+                  </a:txBody>
+                  <a:tcPr marL="90000" marR="90000" marT="46800" marB="46800" anchor="ctr" horzOverflow="overflow">
+                    <a:lnL w="12700" cap="flat" cmpd="sng" algn="ctr">
+                      <a:solidFill>
+                        <a:schemeClr val="tx1"/>
+                      </a:solidFill>
+                      <a:prstDash val="solid"/>
+                      <a:round/>
+                      <a:headEnd type="none" w="med" len="med"/>
+                      <a:tailEnd type="none" w="med" len="med"/>
+                    </a:lnL>
+                    <a:lnR w="12700" cap="flat" cmpd="sng" algn="ctr">
+                      <a:solidFill>
+                        <a:schemeClr val="tx1"/>
+                      </a:solidFill>
+                      <a:prstDash val="solid"/>
+                      <a:round/>
+                      <a:headEnd type="none" w="med" len="med"/>
+                      <a:tailEnd type="none" w="med" len="med"/>
+                    </a:lnR>
+                    <a:lnT w="12700" cap="flat" cmpd="sng" algn="ctr">
+                      <a:solidFill>
+                        <a:schemeClr val="tx1"/>
+                      </a:solidFill>
+                      <a:prstDash val="solid"/>
+                      <a:round/>
+                      <a:headEnd type="none" w="med" len="med"/>
+                      <a:tailEnd type="none" w="med" len="med"/>
+                    </a:lnT>
+                    <a:lnB w="12700" cap="flat" cmpd="sng" algn="ctr">
+                      <a:solidFill>
+                        <a:schemeClr val="tx1"/>
+                      </a:solidFill>
+                      <a:prstDash val="solid"/>
+                      <a:round/>
+                      <a:headEnd type="none" w="med" len="med"/>
+                      <a:tailEnd type="none" w="med" len="med"/>
+                    </a:lnB>
+                    <a:lnTlToBr>
+                      <a:noFill/>
+                    </a:lnTlToBr>
+                    <a:lnBlToTr>
+                      <a:noFill/>
+                    </a:lnBlToTr>
+                    <a:solidFill>
+                      <a:srgbClr val="EEF470"/>
+                    </a:solidFill>
+                  </a:tcPr>
+                </a:tc>
+                <a:tc>
+                  <a:txBody>
+                    <a:bodyPr/>
+                    <a:lstStyle/>
+                    <a:p>
+                      <a:pPr marL="0" marR="0" lvl="0" indent="0" algn="ctr" defTabSz="914400" rtl="0" eaLnBrk="1" fontAlgn="base" latinLnBrk="0" hangingPunct="1">
+                        <a:lnSpc>
+                          <a:spcPct val="100000"/>
+                        </a:lnSpc>
+                        <a:spcBef>
+                          <a:spcPct val="20000"/>
+                        </a:spcBef>
+                        <a:spcAft>
+                          <a:spcPct val="0"/>
+                        </a:spcAft>
+                        <a:buClr>
+                          <a:schemeClr val="bg2"/>
+                        </a:buClr>
+                        <a:buSzPct val="70000"/>
+                        <a:buFont typeface="Wingdings" pitchFamily="2" charset="2"/>
+                        <a:buNone/>
+                        <a:tabLst/>
+                      </a:pPr>
+                      <a:r>
+                        <a:rPr kumimoji="0" lang="es-ES" sz="2000" b="0" i="0" u="none" strike="noStrike" cap="none" normalizeH="0" baseline="0" dirty="0">
+                          <a:ln>
+                            <a:noFill/>
+                          </a:ln>
+                          <a:solidFill>
+                            <a:schemeClr val="tx1"/>
+                          </a:solidFill>
+                          <a:effectLst/>
+                          <a:latin typeface="Arial" charset="0"/>
+                        </a:rPr>
+                        <a:t>2,58</a:t>
+                      </a:r>
+                    </a:p>
+                  </a:txBody>
+                  <a:tcPr marL="90000" marR="90000" marT="46800" marB="46800" anchor="ctr" horzOverflow="overflow">
+                    <a:lnL w="12700" cap="flat" cmpd="sng" algn="ctr">
+                      <a:solidFill>
+                        <a:schemeClr val="tx1"/>
+                      </a:solidFill>
+                      <a:prstDash val="solid"/>
+                      <a:round/>
+                      <a:headEnd type="none" w="med" len="med"/>
+                      <a:tailEnd type="none" w="med" len="med"/>
+                    </a:lnL>
+                    <a:lnR w="28575" cap="flat" cmpd="sng" algn="ctr">
+                      <a:solidFill>
+                        <a:schemeClr val="tx1"/>
+                      </a:solidFill>
+                      <a:prstDash val="solid"/>
+                      <a:round/>
+                      <a:headEnd type="none" w="med" len="med"/>
+                      <a:tailEnd type="none" w="med" len="med"/>
+                    </a:lnR>
+                    <a:lnT w="12700" cap="flat" cmpd="sng" algn="ctr">
+                      <a:solidFill>
+                        <a:schemeClr val="tx1"/>
+                      </a:solidFill>
+                      <a:prstDash val="solid"/>
+                      <a:round/>
+                      <a:headEnd type="none" w="med" len="med"/>
+                      <a:tailEnd type="none" w="med" len="med"/>
+                    </a:lnT>
+                    <a:lnB w="12700" cap="flat" cmpd="sng" algn="ctr">
+                      <a:solidFill>
+                        <a:schemeClr val="tx1"/>
+                      </a:solidFill>
+                      <a:prstDash val="solid"/>
+                      <a:round/>
+                      <a:headEnd type="none" w="med" len="med"/>
+                      <a:tailEnd type="none" w="med" len="med"/>
+                    </a:lnB>
+                    <a:lnTlToBr>
+                      <a:noFill/>
+                    </a:lnTlToBr>
+                    <a:lnBlToTr>
+                      <a:noFill/>
+                    </a:lnBlToTr>
+                    <a:solidFill>
+                      <a:srgbClr val="EEF470"/>
+                    </a:solidFill>
+                  </a:tcPr>
+                </a:tc>
+                <a:extLst>
+                  <a:ext uri="{0D108BD9-81ED-4DB2-BD59-A6C34878D82A}">
+                    <a16:rowId xmlns:a16="http://schemas.microsoft.com/office/drawing/2014/main" val="4232626816"/>
+                  </a:ext>
+                </a:extLst>
+              </a:tr>
+            </a:tbl>
           </a:graphicData>
         </a:graphic>
       </p:graphicFrame>

</xml_diff>

<commit_message>
Sample size presentation complete
Sample size presentation complete
</commit_message>
<xml_diff>
--- a/Sessio_5/EBB_2018_Session_5_Sample_Size_(1).pptx
+++ b/Sessio_5/EBB_2018_Session_5_Sample_Size_(1).pptx
@@ -5,7 +5,7 @@
     <p:sldMasterId id="2147483648" r:id="rId1"/>
   </p:sldMasterIdLst>
   <p:notesMasterIdLst>
-    <p:notesMasterId r:id="rId25"/>
+    <p:notesMasterId r:id="rId31"/>
   </p:notesMasterIdLst>
   <p:sldIdLst>
     <p:sldId id="341" r:id="rId2"/>
@@ -31,6 +31,12 @@
     <p:sldId id="426" r:id="rId22"/>
     <p:sldId id="427" r:id="rId23"/>
     <p:sldId id="428" r:id="rId24"/>
+    <p:sldId id="378" r:id="rId25"/>
+    <p:sldId id="429" r:id="rId26"/>
+    <p:sldId id="430" r:id="rId27"/>
+    <p:sldId id="431" r:id="rId28"/>
+    <p:sldId id="432" r:id="rId29"/>
+    <p:sldId id="433" r:id="rId30"/>
   </p:sldIdLst>
   <p:sldSz cx="9906000" cy="6858000" type="A4"/>
   <p:notesSz cx="7099300" cy="10234613"/>
@@ -9278,7 +9284,7 @@
           <a:graphicData uri="http://schemas.openxmlformats.org/presentationml/2006/ole">
             <mc:AlternateContent xmlns:mc="http://schemas.openxmlformats.org/markup-compatibility/2006">
               <mc:Choice xmlns:v="urn:schemas-microsoft-com:vml" Requires="v">
-                <p:oleObj spid="_x0000_s9263" name="Ecuación" r:id="rId3" imgW="2438400" imgH="444500" progId="Equation.3">
+                <p:oleObj spid="_x0000_s9278" name="Ecuación" r:id="rId3" imgW="2438400" imgH="444500" progId="Equation.3">
                   <p:embed/>
                 </p:oleObj>
               </mc:Choice>
@@ -9569,7 +9575,7 @@
           <a:graphicData uri="http://schemas.openxmlformats.org/presentationml/2006/ole">
             <mc:AlternateContent xmlns:mc="http://schemas.openxmlformats.org/markup-compatibility/2006">
               <mc:Choice xmlns:v="urn:schemas-microsoft-com:vml" Requires="v">
-                <p:oleObj spid="_x0000_s9264" name="Ecuación" r:id="rId5" imgW="1282700" imgH="203200" progId="Equation.3">
+                <p:oleObj spid="_x0000_s9279" name="Ecuación" r:id="rId5" imgW="1282700" imgH="203200" progId="Equation.3">
                   <p:embed/>
                 </p:oleObj>
               </mc:Choice>
@@ -9670,7 +9676,7 @@
           <a:graphicData uri="http://schemas.openxmlformats.org/presentationml/2006/ole">
             <mc:AlternateContent xmlns:mc="http://schemas.openxmlformats.org/markup-compatibility/2006">
               <mc:Choice xmlns:v="urn:schemas-microsoft-com:vml" Requires="v">
-                <p:oleObj spid="_x0000_s9265" name="Ecuación" r:id="rId7" imgW="952087" imgH="393529" progId="Equation.3">
+                <p:oleObj spid="_x0000_s9280" name="Ecuación" r:id="rId7" imgW="952087" imgH="393529" progId="Equation.3">
                   <p:embed/>
                 </p:oleObj>
               </mc:Choice>
@@ -12869,7 +12875,7 @@
           <a:graphicData uri="http://schemas.openxmlformats.org/presentationml/2006/ole">
             <mc:AlternateContent xmlns:mc="http://schemas.openxmlformats.org/markup-compatibility/2006">
               <mc:Choice xmlns:v="urn:schemas-microsoft-com:vml" Requires="v">
-                <p:oleObj spid="_x0000_s5152" name="Equation" r:id="rId3" imgW="2793960" imgH="1523880" progId="Equation.DSMT4">
+                <p:oleObj spid="_x0000_s5157" name="Equation" r:id="rId3" imgW="2793960" imgH="1523880" progId="Equation.DSMT4">
                   <p:embed/>
                 </p:oleObj>
               </mc:Choice>
@@ -15904,7 +15910,7 @@
           <a:graphicData uri="http://schemas.openxmlformats.org/presentationml/2006/ole">
             <mc:AlternateContent xmlns:mc="http://schemas.openxmlformats.org/markup-compatibility/2006">
               <mc:Choice xmlns:v="urn:schemas-microsoft-com:vml" Requires="v">
-                <p:oleObj spid="_x0000_s6176" name="Equation" r:id="rId4" imgW="2552400" imgH="1130040" progId="Equation.DSMT4">
+                <p:oleObj spid="_x0000_s6181" name="Equation" r:id="rId4" imgW="2552400" imgH="1130040" progId="Equation.DSMT4">
                   <p:embed/>
                 </p:oleObj>
               </mc:Choice>
@@ -30186,15 +30192,15 @@
             </a:r>
             <a:r>
               <a:rPr lang="ca-ES" dirty="0"/>
-              <a:t> to be </a:t>
+              <a:t> to be re-</a:t>
             </a:r>
             <a:r>
               <a:rPr lang="ca-ES" dirty="0" err="1"/>
-              <a:t>formulated</a:t>
+              <a:t>stated</a:t>
             </a:r>
             <a:r>
               <a:rPr lang="ca-ES" dirty="0"/>
-              <a:t> as</a:t>
+              <a:t> as:</a:t>
             </a:r>
           </a:p>
           <a:p>
@@ -30963,6 +30969,4089 @@
 </p:sld>
 </file>
 
+<file path=ppt/slides/slide24.xml><?xml version="1.0" encoding="utf-8"?>
+<p:sld xmlns:a="http://schemas.openxmlformats.org/drawingml/2006/main" xmlns:r="http://schemas.openxmlformats.org/officeDocument/2006/relationships" xmlns:p="http://schemas.openxmlformats.org/presentationml/2006/main">
+  <p:cSld>
+    <p:spTree>
+      <p:nvGrpSpPr>
+        <p:cNvPr id="1" name=""/>
+        <p:cNvGrpSpPr/>
+        <p:nvPr/>
+      </p:nvGrpSpPr>
+      <p:grpSpPr>
+        <a:xfrm>
+          <a:off x="0" y="0"/>
+          <a:ext cx="0" cy="0"/>
+          <a:chOff x="0" y="0"/>
+          <a:chExt cx="0" cy="0"/>
+        </a:xfrm>
+      </p:grpSpPr>
+      <p:graphicFrame>
+        <p:nvGraphicFramePr>
+          <p:cNvPr id="148515" name="Group 35">
+            <a:extLst>
+              <a:ext uri="{FF2B5EF4-FFF2-40B4-BE49-F238E27FC236}">
+                <a16:creationId xmlns:a16="http://schemas.microsoft.com/office/drawing/2014/main" id="{20C143D0-B729-4817-BBC7-51C14219E685}"/>
+              </a:ext>
+            </a:extLst>
+          </p:cNvPr>
+          <p:cNvGraphicFramePr>
+            <a:graphicFrameLocks noGrp="1"/>
+          </p:cNvGraphicFramePr>
+          <p:nvPr>
+            <p:extLst>
+              <p:ext uri="{D42A27DB-BD31-4B8C-83A1-F6EECF244321}">
+                <p14:modId xmlns:p14="http://schemas.microsoft.com/office/powerpoint/2010/main" val="2749898019"/>
+              </p:ext>
+            </p:extLst>
+          </p:nvPr>
+        </p:nvGraphicFramePr>
+        <p:xfrm>
+          <a:off x="1712913" y="1268413"/>
+          <a:ext cx="7264400" cy="4532259"/>
+        </p:xfrm>
+        <a:graphic>
+          <a:graphicData uri="http://schemas.openxmlformats.org/drawingml/2006/table">
+            <a:tbl>
+              <a:tblPr/>
+              <a:tblGrid>
+                <a:gridCol w="2554514">
+                  <a:extLst>
+                    <a:ext uri="{9D8B030D-6E8A-4147-A177-3AD203B41FA5}">
+                      <a16:colId xmlns:a16="http://schemas.microsoft.com/office/drawing/2014/main" val="20000"/>
+                    </a:ext>
+                  </a:extLst>
+                </a:gridCol>
+                <a:gridCol w="2288419">
+                  <a:extLst>
+                    <a:ext uri="{9D8B030D-6E8A-4147-A177-3AD203B41FA5}">
+                      <a16:colId xmlns:a16="http://schemas.microsoft.com/office/drawing/2014/main" val="20001"/>
+                    </a:ext>
+                  </a:extLst>
+                </a:gridCol>
+                <a:gridCol w="2421467">
+                  <a:extLst>
+                    <a:ext uri="{9D8B030D-6E8A-4147-A177-3AD203B41FA5}">
+                      <a16:colId xmlns:a16="http://schemas.microsoft.com/office/drawing/2014/main" val="20002"/>
+                    </a:ext>
+                  </a:extLst>
+                </a:gridCol>
+              </a:tblGrid>
+              <a:tr h="1058096">
+                <a:tc>
+                  <a:txBody>
+                    <a:bodyPr/>
+                    <a:lstStyle>
+                      <a:lvl1pPr algn="l">
+                        <a:spcBef>
+                          <a:spcPct val="20000"/>
+                        </a:spcBef>
+                        <a:buClr>
+                          <a:schemeClr val="bg2"/>
+                        </a:buClr>
+                        <a:buSzPct val="75000"/>
+                        <a:buFont typeface="Monotype Sorts" pitchFamily="2" charset="2"/>
+                        <a:defRPr sz="2800">
+                          <a:solidFill>
+                            <a:schemeClr val="tx1"/>
+                          </a:solidFill>
+                          <a:latin typeface="Times New Roman" pitchFamily="18" charset="0"/>
+                        </a:defRPr>
+                      </a:lvl1pPr>
+                      <a:lvl2pPr algn="l">
+                        <a:spcBef>
+                          <a:spcPct val="20000"/>
+                        </a:spcBef>
+                        <a:buClr>
+                          <a:schemeClr val="bg2"/>
+                        </a:buClr>
+                        <a:buSzPct val="75000"/>
+                        <a:defRPr sz="2400">
+                          <a:solidFill>
+                            <a:schemeClr val="tx1"/>
+                          </a:solidFill>
+                          <a:latin typeface="Times New Roman" pitchFamily="18" charset="0"/>
+                        </a:defRPr>
+                      </a:lvl2pPr>
+                      <a:lvl3pPr algn="l">
+                        <a:spcBef>
+                          <a:spcPct val="20000"/>
+                        </a:spcBef>
+                        <a:buClr>
+                          <a:schemeClr val="bg2"/>
+                        </a:buClr>
+                        <a:buSzPct val="75000"/>
+                        <a:buFont typeface="Monotype Sorts" pitchFamily="2" charset="2"/>
+                        <a:defRPr sz="2000">
+                          <a:solidFill>
+                            <a:schemeClr val="tx1"/>
+                          </a:solidFill>
+                          <a:latin typeface="Times New Roman" pitchFamily="18" charset="0"/>
+                        </a:defRPr>
+                      </a:lvl3pPr>
+                      <a:lvl4pPr algn="l">
+                        <a:spcBef>
+                          <a:spcPct val="20000"/>
+                        </a:spcBef>
+                        <a:buClr>
+                          <a:schemeClr val="bg2"/>
+                        </a:buClr>
+                        <a:buSzPct val="75000"/>
+                        <a:defRPr>
+                          <a:solidFill>
+                            <a:schemeClr val="tx1"/>
+                          </a:solidFill>
+                          <a:latin typeface="Times New Roman" pitchFamily="18" charset="0"/>
+                        </a:defRPr>
+                      </a:lvl4pPr>
+                      <a:lvl5pPr algn="l">
+                        <a:spcBef>
+                          <a:spcPct val="20000"/>
+                        </a:spcBef>
+                        <a:buClr>
+                          <a:schemeClr val="bg2"/>
+                        </a:buClr>
+                        <a:buSzPct val="75000"/>
+                        <a:defRPr>
+                          <a:solidFill>
+                            <a:schemeClr val="tx1"/>
+                          </a:solidFill>
+                          <a:latin typeface="Times New Roman" pitchFamily="18" charset="0"/>
+                        </a:defRPr>
+                      </a:lvl5pPr>
+                      <a:lvl6pPr eaLnBrk="0" fontAlgn="base" hangingPunct="0">
+                        <a:spcBef>
+                          <a:spcPct val="20000"/>
+                        </a:spcBef>
+                        <a:spcAft>
+                          <a:spcPct val="0"/>
+                        </a:spcAft>
+                        <a:buClr>
+                          <a:schemeClr val="bg2"/>
+                        </a:buClr>
+                        <a:buSzPct val="75000"/>
+                        <a:defRPr>
+                          <a:solidFill>
+                            <a:schemeClr val="tx1"/>
+                          </a:solidFill>
+                          <a:latin typeface="Times New Roman" pitchFamily="18" charset="0"/>
+                        </a:defRPr>
+                      </a:lvl6pPr>
+                      <a:lvl7pPr eaLnBrk="0" fontAlgn="base" hangingPunct="0">
+                        <a:spcBef>
+                          <a:spcPct val="20000"/>
+                        </a:spcBef>
+                        <a:spcAft>
+                          <a:spcPct val="0"/>
+                        </a:spcAft>
+                        <a:buClr>
+                          <a:schemeClr val="bg2"/>
+                        </a:buClr>
+                        <a:buSzPct val="75000"/>
+                        <a:defRPr>
+                          <a:solidFill>
+                            <a:schemeClr val="tx1"/>
+                          </a:solidFill>
+                          <a:latin typeface="Times New Roman" pitchFamily="18" charset="0"/>
+                        </a:defRPr>
+                      </a:lvl7pPr>
+                      <a:lvl8pPr eaLnBrk="0" fontAlgn="base" hangingPunct="0">
+                        <a:spcBef>
+                          <a:spcPct val="20000"/>
+                        </a:spcBef>
+                        <a:spcAft>
+                          <a:spcPct val="0"/>
+                        </a:spcAft>
+                        <a:buClr>
+                          <a:schemeClr val="bg2"/>
+                        </a:buClr>
+                        <a:buSzPct val="75000"/>
+                        <a:defRPr>
+                          <a:solidFill>
+                            <a:schemeClr val="tx1"/>
+                          </a:solidFill>
+                          <a:latin typeface="Times New Roman" pitchFamily="18" charset="0"/>
+                        </a:defRPr>
+                      </a:lvl8pPr>
+                      <a:lvl9pPr eaLnBrk="0" fontAlgn="base" hangingPunct="0">
+                        <a:spcBef>
+                          <a:spcPct val="20000"/>
+                        </a:spcBef>
+                        <a:spcAft>
+                          <a:spcPct val="0"/>
+                        </a:spcAft>
+                        <a:buClr>
+                          <a:schemeClr val="bg2"/>
+                        </a:buClr>
+                        <a:buSzPct val="75000"/>
+                        <a:defRPr>
+                          <a:solidFill>
+                            <a:schemeClr val="tx1"/>
+                          </a:solidFill>
+                          <a:latin typeface="Times New Roman" pitchFamily="18" charset="0"/>
+                        </a:defRPr>
+                      </a:lvl9pPr>
+                    </a:lstStyle>
+                    <a:p>
+                      <a:pPr marL="0" marR="0" lvl="0" indent="0" algn="r" defTabSz="914400" rtl="0" eaLnBrk="0" fontAlgn="base" latinLnBrk="0" hangingPunct="0">
+                        <a:lnSpc>
+                          <a:spcPct val="100000"/>
+                        </a:lnSpc>
+                        <a:spcBef>
+                          <a:spcPct val="20000"/>
+                        </a:spcBef>
+                        <a:spcAft>
+                          <a:spcPct val="0"/>
+                        </a:spcAft>
+                        <a:buClr>
+                          <a:schemeClr val="bg2"/>
+                        </a:buClr>
+                        <a:buSzPct val="75000"/>
+                        <a:buFont typeface="Monotype Sorts" pitchFamily="2" charset="2"/>
+                        <a:buNone/>
+                        <a:tabLst/>
+                      </a:pPr>
+                      <a:endParaRPr kumimoji="0" lang="es-ES" altLang="ca-ES" sz="2800" b="0" i="0" u="none" strike="noStrike" cap="none" normalizeH="0" baseline="0" dirty="0">
+                        <a:ln>
+                          <a:noFill/>
+                        </a:ln>
+                        <a:solidFill>
+                          <a:schemeClr val="bg1"/>
+                        </a:solidFill>
+                        <a:effectLst/>
+                        <a:latin typeface="+mn-lt"/>
+                      </a:endParaRPr>
+                    </a:p>
+                    <a:p>
+                      <a:pPr marL="0" marR="0" lvl="0" indent="0" algn="r" defTabSz="914400" rtl="0" eaLnBrk="0" fontAlgn="base" latinLnBrk="0" hangingPunct="0">
+                        <a:lnSpc>
+                          <a:spcPct val="100000"/>
+                        </a:lnSpc>
+                        <a:spcBef>
+                          <a:spcPct val="20000"/>
+                        </a:spcBef>
+                        <a:spcAft>
+                          <a:spcPct val="0"/>
+                        </a:spcAft>
+                        <a:buClr>
+                          <a:schemeClr val="bg2"/>
+                        </a:buClr>
+                        <a:buSzPct val="75000"/>
+                        <a:buFont typeface="Monotype Sorts" pitchFamily="2" charset="2"/>
+                        <a:buNone/>
+                        <a:tabLst/>
+                      </a:pPr>
+                      <a:r>
+                        <a:rPr kumimoji="0" lang="es-ES" altLang="ca-ES" sz="2800" b="0" i="0" u="none" strike="noStrike" cap="none" normalizeH="0" baseline="0" dirty="0">
+                          <a:ln>
+                            <a:noFill/>
+                          </a:ln>
+                          <a:solidFill>
+                            <a:schemeClr val="bg1"/>
+                          </a:solidFill>
+                          <a:effectLst/>
+                          <a:latin typeface="+mn-lt"/>
+                        </a:rPr>
+                        <a:t>TRUTH </a:t>
+                      </a:r>
+                      <a:r>
+                        <a:rPr kumimoji="0" lang="es-ES" altLang="ca-ES" sz="2800" b="0" i="0" u="none" strike="noStrike" cap="none" normalizeH="0" baseline="0" dirty="0">
+                          <a:ln>
+                            <a:noFill/>
+                          </a:ln>
+                          <a:solidFill>
+                            <a:schemeClr val="bg1"/>
+                          </a:solidFill>
+                          <a:effectLst/>
+                          <a:latin typeface="+mn-lt"/>
+                          <a:sym typeface="Wingdings" panose="05000000000000000000" pitchFamily="2" charset="2"/>
+                        </a:rPr>
+                        <a:t></a:t>
+                      </a:r>
+                    </a:p>
+                    <a:p>
+                      <a:pPr marL="0" marR="0" lvl="0" indent="0" algn="ctr" defTabSz="914400" rtl="0" eaLnBrk="0" fontAlgn="base" latinLnBrk="0" hangingPunct="0">
+                        <a:lnSpc>
+                          <a:spcPct val="100000"/>
+                        </a:lnSpc>
+                        <a:spcBef>
+                          <a:spcPct val="20000"/>
+                        </a:spcBef>
+                        <a:spcAft>
+                          <a:spcPct val="0"/>
+                        </a:spcAft>
+                        <a:buClr>
+                          <a:schemeClr val="bg2"/>
+                        </a:buClr>
+                        <a:buSzPct val="75000"/>
+                        <a:buFont typeface="Monotype Sorts" pitchFamily="2" charset="2"/>
+                        <a:buNone/>
+                        <a:tabLst/>
+                      </a:pPr>
+                      <a:r>
+                        <a:rPr kumimoji="0" lang="es-ES" altLang="ca-ES" sz="2800" b="0" i="0" u="none" strike="noStrike" cap="none" normalizeH="0" baseline="0" dirty="0">
+                          <a:ln>
+                            <a:noFill/>
+                          </a:ln>
+                          <a:solidFill>
+                            <a:schemeClr val="bg1"/>
+                          </a:solidFill>
+                          <a:effectLst/>
+                          <a:latin typeface="+mn-lt"/>
+                          <a:sym typeface="Wingdings" panose="05000000000000000000" pitchFamily="2" charset="2"/>
+                        </a:rPr>
+                        <a:t>DECISION </a:t>
+                      </a:r>
+                      <a:endParaRPr kumimoji="0" lang="es-ES" altLang="ca-ES" sz="2800" b="0" i="0" u="none" strike="noStrike" cap="none" normalizeH="0" baseline="0" dirty="0">
+                        <a:ln>
+                          <a:noFill/>
+                        </a:ln>
+                        <a:solidFill>
+                          <a:schemeClr val="bg1"/>
+                        </a:solidFill>
+                        <a:effectLst/>
+                        <a:latin typeface="+mn-lt"/>
+                      </a:endParaRPr>
+                    </a:p>
+                  </a:txBody>
+                  <a:tcPr marL="99062" marR="99062" marT="45716" marB="45716" horzOverflow="overflow">
+                    <a:lnL cap="flat">
+                      <a:noFill/>
+                    </a:lnL>
+                    <a:lnR w="12700" cap="flat" cmpd="sng" algn="ctr">
+                      <a:solidFill>
+                        <a:schemeClr val="tx1"/>
+                      </a:solidFill>
+                      <a:prstDash val="solid"/>
+                      <a:round/>
+                      <a:headEnd type="none" w="med" len="med"/>
+                      <a:tailEnd type="none" w="med" len="med"/>
+                    </a:lnR>
+                    <a:lnT cap="flat">
+                      <a:noFill/>
+                    </a:lnT>
+                    <a:lnB w="12700" cap="flat" cmpd="sng" algn="ctr">
+                      <a:solidFill>
+                        <a:schemeClr val="tx1"/>
+                      </a:solidFill>
+                      <a:prstDash val="solid"/>
+                      <a:round/>
+                      <a:headEnd type="none" w="med" len="med"/>
+                      <a:tailEnd type="none" w="med" len="med"/>
+                    </a:lnB>
+                    <a:lnTlToBr>
+                      <a:noFill/>
+                    </a:lnTlToBr>
+                    <a:lnBlToTr>
+                      <a:noFill/>
+                    </a:lnBlToTr>
+                    <a:solidFill>
+                      <a:schemeClr val="accent2"/>
+                    </a:solidFill>
+                  </a:tcPr>
+                </a:tc>
+                <a:tc>
+                  <a:txBody>
+                    <a:bodyPr/>
+                    <a:lstStyle>
+                      <a:lvl1pPr algn="l">
+                        <a:spcBef>
+                          <a:spcPct val="20000"/>
+                        </a:spcBef>
+                        <a:buClr>
+                          <a:schemeClr val="bg2"/>
+                        </a:buClr>
+                        <a:buSzPct val="75000"/>
+                        <a:buFont typeface="Monotype Sorts" pitchFamily="2" charset="2"/>
+                        <a:defRPr sz="2800">
+                          <a:solidFill>
+                            <a:schemeClr val="tx1"/>
+                          </a:solidFill>
+                          <a:latin typeface="Times New Roman" pitchFamily="18" charset="0"/>
+                        </a:defRPr>
+                      </a:lvl1pPr>
+                      <a:lvl2pPr algn="l">
+                        <a:spcBef>
+                          <a:spcPct val="20000"/>
+                        </a:spcBef>
+                        <a:buClr>
+                          <a:schemeClr val="bg2"/>
+                        </a:buClr>
+                        <a:buSzPct val="75000"/>
+                        <a:defRPr sz="2400">
+                          <a:solidFill>
+                            <a:schemeClr val="tx1"/>
+                          </a:solidFill>
+                          <a:latin typeface="Times New Roman" pitchFamily="18" charset="0"/>
+                        </a:defRPr>
+                      </a:lvl2pPr>
+                      <a:lvl3pPr algn="l">
+                        <a:spcBef>
+                          <a:spcPct val="20000"/>
+                        </a:spcBef>
+                        <a:buClr>
+                          <a:schemeClr val="bg2"/>
+                        </a:buClr>
+                        <a:buSzPct val="75000"/>
+                        <a:buFont typeface="Monotype Sorts" pitchFamily="2" charset="2"/>
+                        <a:defRPr sz="2000">
+                          <a:solidFill>
+                            <a:schemeClr val="tx1"/>
+                          </a:solidFill>
+                          <a:latin typeface="Times New Roman" pitchFamily="18" charset="0"/>
+                        </a:defRPr>
+                      </a:lvl3pPr>
+                      <a:lvl4pPr algn="l">
+                        <a:spcBef>
+                          <a:spcPct val="20000"/>
+                        </a:spcBef>
+                        <a:buClr>
+                          <a:schemeClr val="bg2"/>
+                        </a:buClr>
+                        <a:buSzPct val="75000"/>
+                        <a:defRPr>
+                          <a:solidFill>
+                            <a:schemeClr val="tx1"/>
+                          </a:solidFill>
+                          <a:latin typeface="Times New Roman" pitchFamily="18" charset="0"/>
+                        </a:defRPr>
+                      </a:lvl4pPr>
+                      <a:lvl5pPr algn="l">
+                        <a:spcBef>
+                          <a:spcPct val="20000"/>
+                        </a:spcBef>
+                        <a:buClr>
+                          <a:schemeClr val="bg2"/>
+                        </a:buClr>
+                        <a:buSzPct val="75000"/>
+                        <a:defRPr>
+                          <a:solidFill>
+                            <a:schemeClr val="tx1"/>
+                          </a:solidFill>
+                          <a:latin typeface="Times New Roman" pitchFamily="18" charset="0"/>
+                        </a:defRPr>
+                      </a:lvl5pPr>
+                      <a:lvl6pPr eaLnBrk="0" fontAlgn="base" hangingPunct="0">
+                        <a:spcBef>
+                          <a:spcPct val="20000"/>
+                        </a:spcBef>
+                        <a:spcAft>
+                          <a:spcPct val="0"/>
+                        </a:spcAft>
+                        <a:buClr>
+                          <a:schemeClr val="bg2"/>
+                        </a:buClr>
+                        <a:buSzPct val="75000"/>
+                        <a:defRPr>
+                          <a:solidFill>
+                            <a:schemeClr val="tx1"/>
+                          </a:solidFill>
+                          <a:latin typeface="Times New Roman" pitchFamily="18" charset="0"/>
+                        </a:defRPr>
+                      </a:lvl6pPr>
+                      <a:lvl7pPr eaLnBrk="0" fontAlgn="base" hangingPunct="0">
+                        <a:spcBef>
+                          <a:spcPct val="20000"/>
+                        </a:spcBef>
+                        <a:spcAft>
+                          <a:spcPct val="0"/>
+                        </a:spcAft>
+                        <a:buClr>
+                          <a:schemeClr val="bg2"/>
+                        </a:buClr>
+                        <a:buSzPct val="75000"/>
+                        <a:defRPr>
+                          <a:solidFill>
+                            <a:schemeClr val="tx1"/>
+                          </a:solidFill>
+                          <a:latin typeface="Times New Roman" pitchFamily="18" charset="0"/>
+                        </a:defRPr>
+                      </a:lvl7pPr>
+                      <a:lvl8pPr eaLnBrk="0" fontAlgn="base" hangingPunct="0">
+                        <a:spcBef>
+                          <a:spcPct val="20000"/>
+                        </a:spcBef>
+                        <a:spcAft>
+                          <a:spcPct val="0"/>
+                        </a:spcAft>
+                        <a:buClr>
+                          <a:schemeClr val="bg2"/>
+                        </a:buClr>
+                        <a:buSzPct val="75000"/>
+                        <a:defRPr>
+                          <a:solidFill>
+                            <a:schemeClr val="tx1"/>
+                          </a:solidFill>
+                          <a:latin typeface="Times New Roman" pitchFamily="18" charset="0"/>
+                        </a:defRPr>
+                      </a:lvl8pPr>
+                      <a:lvl9pPr eaLnBrk="0" fontAlgn="base" hangingPunct="0">
+                        <a:spcBef>
+                          <a:spcPct val="20000"/>
+                        </a:spcBef>
+                        <a:spcAft>
+                          <a:spcPct val="0"/>
+                        </a:spcAft>
+                        <a:buClr>
+                          <a:schemeClr val="bg2"/>
+                        </a:buClr>
+                        <a:buSzPct val="75000"/>
+                        <a:defRPr>
+                          <a:solidFill>
+                            <a:schemeClr val="tx1"/>
+                          </a:solidFill>
+                          <a:latin typeface="Times New Roman" pitchFamily="18" charset="0"/>
+                        </a:defRPr>
+                      </a:lvl9pPr>
+                    </a:lstStyle>
+                    <a:p>
+                      <a:pPr marL="0" marR="0" lvl="0" indent="0" algn="ctr" defTabSz="914400" rtl="0" eaLnBrk="0" fontAlgn="base" latinLnBrk="0" hangingPunct="0">
+                        <a:lnSpc>
+                          <a:spcPct val="100000"/>
+                        </a:lnSpc>
+                        <a:spcBef>
+                          <a:spcPct val="20000"/>
+                        </a:spcBef>
+                        <a:spcAft>
+                          <a:spcPct val="0"/>
+                        </a:spcAft>
+                        <a:buClr>
+                          <a:schemeClr val="bg2"/>
+                        </a:buClr>
+                        <a:buSzPct val="75000"/>
+                        <a:buFont typeface="Monotype Sorts" pitchFamily="2" charset="2"/>
+                        <a:buNone/>
+                        <a:tabLst/>
+                      </a:pPr>
+                      <a:r>
+                        <a:rPr kumimoji="0" lang="es-ES_tradnl" altLang="ca-ES" sz="2800" b="0" i="0" u="none" strike="noStrike" cap="none" normalizeH="0" baseline="0" dirty="0" err="1">
+                          <a:ln>
+                            <a:noFill/>
+                          </a:ln>
+                          <a:solidFill>
+                            <a:schemeClr val="tx1"/>
+                          </a:solidFill>
+                          <a:effectLst/>
+                          <a:latin typeface="+mn-lt"/>
+                        </a:rPr>
+                        <a:t>Null</a:t>
+                      </a:r>
+                      <a:r>
+                        <a:rPr kumimoji="0" lang="es-ES_tradnl" altLang="ca-ES" sz="2800" b="0" i="0" u="none" strike="noStrike" cap="none" normalizeH="0" baseline="0" dirty="0">
+                          <a:ln>
+                            <a:noFill/>
+                          </a:ln>
+                          <a:solidFill>
+                            <a:schemeClr val="tx1"/>
+                          </a:solidFill>
+                          <a:effectLst/>
+                          <a:latin typeface="+mn-lt"/>
+                        </a:rPr>
+                        <a:t> </a:t>
+                      </a:r>
+                      <a:r>
+                        <a:rPr kumimoji="0" lang="es-ES_tradnl" altLang="ca-ES" sz="2800" b="0" i="0" u="none" strike="noStrike" cap="none" normalizeH="0" baseline="0" dirty="0" err="1">
+                          <a:ln>
+                            <a:noFill/>
+                          </a:ln>
+                          <a:solidFill>
+                            <a:schemeClr val="tx1"/>
+                          </a:solidFill>
+                          <a:effectLst/>
+                          <a:latin typeface="+mn-lt"/>
+                        </a:rPr>
+                        <a:t>Hypothesis</a:t>
+                      </a:r>
+                      <a:r>
+                        <a:rPr kumimoji="0" lang="es-ES_tradnl" altLang="ca-ES" sz="2800" b="0" i="0" u="none" strike="noStrike" cap="none" normalizeH="0" baseline="0" dirty="0">
+                          <a:ln>
+                            <a:noFill/>
+                          </a:ln>
+                          <a:solidFill>
+                            <a:schemeClr val="tx1"/>
+                          </a:solidFill>
+                          <a:effectLst/>
+                          <a:latin typeface="+mn-lt"/>
+                        </a:rPr>
+                        <a:t> </a:t>
+                      </a:r>
+                      <a:r>
+                        <a:rPr kumimoji="0" lang="es-ES_tradnl" altLang="ca-ES" sz="2800" b="1" i="0" u="none" strike="noStrike" cap="none" normalizeH="0" baseline="0" dirty="0">
+                          <a:ln>
+                            <a:noFill/>
+                          </a:ln>
+                          <a:solidFill>
+                            <a:schemeClr val="tx1"/>
+                          </a:solidFill>
+                          <a:effectLst/>
+                          <a:latin typeface="+mn-lt"/>
+                        </a:rPr>
+                        <a:t>True</a:t>
+                      </a:r>
+                      <a:endParaRPr kumimoji="0" lang="es-ES" altLang="ca-ES" sz="2800" b="1" i="0" u="none" strike="noStrike" cap="none" normalizeH="0" baseline="0" dirty="0">
+                        <a:ln>
+                          <a:noFill/>
+                        </a:ln>
+                        <a:solidFill>
+                          <a:schemeClr val="tx1"/>
+                        </a:solidFill>
+                        <a:effectLst/>
+                        <a:latin typeface="+mn-lt"/>
+                      </a:endParaRPr>
+                    </a:p>
+                  </a:txBody>
+                  <a:tcPr marL="99062" marR="99062" marT="45716" marB="45716" horzOverflow="overflow">
+                    <a:lnL w="12700" cap="flat" cmpd="sng" algn="ctr">
+                      <a:solidFill>
+                        <a:schemeClr val="tx1"/>
+                      </a:solidFill>
+                      <a:prstDash val="solid"/>
+                      <a:round/>
+                      <a:headEnd type="none" w="med" len="med"/>
+                      <a:tailEnd type="none" w="med" len="med"/>
+                    </a:lnL>
+                    <a:lnR w="12700" cap="flat" cmpd="sng" algn="ctr">
+                      <a:solidFill>
+                        <a:schemeClr val="tx1"/>
+                      </a:solidFill>
+                      <a:prstDash val="solid"/>
+                      <a:round/>
+                      <a:headEnd type="none" w="med" len="med"/>
+                      <a:tailEnd type="none" w="med" len="med"/>
+                    </a:lnR>
+                    <a:lnT w="28575" cap="flat" cmpd="sng" algn="ctr">
+                      <a:solidFill>
+                        <a:schemeClr val="tx1"/>
+                      </a:solidFill>
+                      <a:prstDash val="solid"/>
+                      <a:round/>
+                      <a:headEnd type="none" w="med" len="med"/>
+                      <a:tailEnd type="none" w="med" len="med"/>
+                    </a:lnT>
+                    <a:lnB w="12700" cap="flat" cmpd="sng" algn="ctr">
+                      <a:solidFill>
+                        <a:schemeClr val="tx1"/>
+                      </a:solidFill>
+                      <a:prstDash val="solid"/>
+                      <a:round/>
+                      <a:headEnd type="none" w="med" len="med"/>
+                      <a:tailEnd type="none" w="med" len="med"/>
+                    </a:lnB>
+                    <a:lnTlToBr>
+                      <a:noFill/>
+                    </a:lnTlToBr>
+                    <a:lnBlToTr>
+                      <a:noFill/>
+                    </a:lnBlToTr>
+                    <a:solidFill>
+                      <a:srgbClr val="FFFF99"/>
+                    </a:solidFill>
+                  </a:tcPr>
+                </a:tc>
+                <a:tc>
+                  <a:txBody>
+                    <a:bodyPr/>
+                    <a:lstStyle>
+                      <a:lvl1pPr algn="l">
+                        <a:spcBef>
+                          <a:spcPct val="20000"/>
+                        </a:spcBef>
+                        <a:buClr>
+                          <a:schemeClr val="bg2"/>
+                        </a:buClr>
+                        <a:buSzPct val="75000"/>
+                        <a:buFont typeface="Monotype Sorts" pitchFamily="2" charset="2"/>
+                        <a:defRPr sz="2800">
+                          <a:solidFill>
+                            <a:schemeClr val="tx1"/>
+                          </a:solidFill>
+                          <a:latin typeface="Times New Roman" pitchFamily="18" charset="0"/>
+                        </a:defRPr>
+                      </a:lvl1pPr>
+                      <a:lvl2pPr algn="l">
+                        <a:spcBef>
+                          <a:spcPct val="20000"/>
+                        </a:spcBef>
+                        <a:buClr>
+                          <a:schemeClr val="bg2"/>
+                        </a:buClr>
+                        <a:buSzPct val="75000"/>
+                        <a:defRPr sz="2400">
+                          <a:solidFill>
+                            <a:schemeClr val="tx1"/>
+                          </a:solidFill>
+                          <a:latin typeface="Times New Roman" pitchFamily="18" charset="0"/>
+                        </a:defRPr>
+                      </a:lvl2pPr>
+                      <a:lvl3pPr algn="l">
+                        <a:spcBef>
+                          <a:spcPct val="20000"/>
+                        </a:spcBef>
+                        <a:buClr>
+                          <a:schemeClr val="bg2"/>
+                        </a:buClr>
+                        <a:buSzPct val="75000"/>
+                        <a:buFont typeface="Monotype Sorts" pitchFamily="2" charset="2"/>
+                        <a:defRPr sz="2000">
+                          <a:solidFill>
+                            <a:schemeClr val="tx1"/>
+                          </a:solidFill>
+                          <a:latin typeface="Times New Roman" pitchFamily="18" charset="0"/>
+                        </a:defRPr>
+                      </a:lvl3pPr>
+                      <a:lvl4pPr algn="l">
+                        <a:spcBef>
+                          <a:spcPct val="20000"/>
+                        </a:spcBef>
+                        <a:buClr>
+                          <a:schemeClr val="bg2"/>
+                        </a:buClr>
+                        <a:buSzPct val="75000"/>
+                        <a:defRPr>
+                          <a:solidFill>
+                            <a:schemeClr val="tx1"/>
+                          </a:solidFill>
+                          <a:latin typeface="Times New Roman" pitchFamily="18" charset="0"/>
+                        </a:defRPr>
+                      </a:lvl4pPr>
+                      <a:lvl5pPr algn="l">
+                        <a:spcBef>
+                          <a:spcPct val="20000"/>
+                        </a:spcBef>
+                        <a:buClr>
+                          <a:schemeClr val="bg2"/>
+                        </a:buClr>
+                        <a:buSzPct val="75000"/>
+                        <a:defRPr>
+                          <a:solidFill>
+                            <a:schemeClr val="tx1"/>
+                          </a:solidFill>
+                          <a:latin typeface="Times New Roman" pitchFamily="18" charset="0"/>
+                        </a:defRPr>
+                      </a:lvl5pPr>
+                      <a:lvl6pPr eaLnBrk="0" fontAlgn="base" hangingPunct="0">
+                        <a:spcBef>
+                          <a:spcPct val="20000"/>
+                        </a:spcBef>
+                        <a:spcAft>
+                          <a:spcPct val="0"/>
+                        </a:spcAft>
+                        <a:buClr>
+                          <a:schemeClr val="bg2"/>
+                        </a:buClr>
+                        <a:buSzPct val="75000"/>
+                        <a:defRPr>
+                          <a:solidFill>
+                            <a:schemeClr val="tx1"/>
+                          </a:solidFill>
+                          <a:latin typeface="Times New Roman" pitchFamily="18" charset="0"/>
+                        </a:defRPr>
+                      </a:lvl6pPr>
+                      <a:lvl7pPr eaLnBrk="0" fontAlgn="base" hangingPunct="0">
+                        <a:spcBef>
+                          <a:spcPct val="20000"/>
+                        </a:spcBef>
+                        <a:spcAft>
+                          <a:spcPct val="0"/>
+                        </a:spcAft>
+                        <a:buClr>
+                          <a:schemeClr val="bg2"/>
+                        </a:buClr>
+                        <a:buSzPct val="75000"/>
+                        <a:defRPr>
+                          <a:solidFill>
+                            <a:schemeClr val="tx1"/>
+                          </a:solidFill>
+                          <a:latin typeface="Times New Roman" pitchFamily="18" charset="0"/>
+                        </a:defRPr>
+                      </a:lvl7pPr>
+                      <a:lvl8pPr eaLnBrk="0" fontAlgn="base" hangingPunct="0">
+                        <a:spcBef>
+                          <a:spcPct val="20000"/>
+                        </a:spcBef>
+                        <a:spcAft>
+                          <a:spcPct val="0"/>
+                        </a:spcAft>
+                        <a:buClr>
+                          <a:schemeClr val="bg2"/>
+                        </a:buClr>
+                        <a:buSzPct val="75000"/>
+                        <a:defRPr>
+                          <a:solidFill>
+                            <a:schemeClr val="tx1"/>
+                          </a:solidFill>
+                          <a:latin typeface="Times New Roman" pitchFamily="18" charset="0"/>
+                        </a:defRPr>
+                      </a:lvl8pPr>
+                      <a:lvl9pPr eaLnBrk="0" fontAlgn="base" hangingPunct="0">
+                        <a:spcBef>
+                          <a:spcPct val="20000"/>
+                        </a:spcBef>
+                        <a:spcAft>
+                          <a:spcPct val="0"/>
+                        </a:spcAft>
+                        <a:buClr>
+                          <a:schemeClr val="bg2"/>
+                        </a:buClr>
+                        <a:buSzPct val="75000"/>
+                        <a:defRPr>
+                          <a:solidFill>
+                            <a:schemeClr val="tx1"/>
+                          </a:solidFill>
+                          <a:latin typeface="Times New Roman" pitchFamily="18" charset="0"/>
+                        </a:defRPr>
+                      </a:lvl9pPr>
+                    </a:lstStyle>
+                    <a:p>
+                      <a:pPr marL="0" marR="0" lvl="0" indent="0" algn="ctr" defTabSz="914400" rtl="0" eaLnBrk="0" fontAlgn="base" latinLnBrk="0" hangingPunct="0">
+                        <a:lnSpc>
+                          <a:spcPct val="100000"/>
+                        </a:lnSpc>
+                        <a:spcBef>
+                          <a:spcPct val="20000"/>
+                        </a:spcBef>
+                        <a:spcAft>
+                          <a:spcPct val="0"/>
+                        </a:spcAft>
+                        <a:buClr>
+                          <a:schemeClr val="bg2"/>
+                        </a:buClr>
+                        <a:buSzPct val="75000"/>
+                        <a:buFont typeface="Monotype Sorts" pitchFamily="2" charset="2"/>
+                        <a:buNone/>
+                        <a:tabLst/>
+                        <a:defRPr/>
+                      </a:pPr>
+                      <a:r>
+                        <a:rPr kumimoji="0" lang="es-ES_tradnl" altLang="ca-ES" sz="2800" b="0" i="0" u="none" strike="noStrike" kern="1200" cap="none" normalizeH="0" baseline="0" dirty="0" err="1">
+                          <a:ln>
+                            <a:noFill/>
+                          </a:ln>
+                          <a:solidFill>
+                            <a:schemeClr val="tx1"/>
+                          </a:solidFill>
+                          <a:effectLst/>
+                          <a:latin typeface="+mn-lt"/>
+                          <a:ea typeface="+mn-ea"/>
+                          <a:cs typeface="+mn-cs"/>
+                        </a:rPr>
+                        <a:t>Null</a:t>
+                      </a:r>
+                      <a:r>
+                        <a:rPr kumimoji="0" lang="es-ES_tradnl" altLang="ca-ES" sz="2800" b="0" i="0" u="none" strike="noStrike" kern="1200" cap="none" normalizeH="0" baseline="0" dirty="0">
+                          <a:ln>
+                            <a:noFill/>
+                          </a:ln>
+                          <a:solidFill>
+                            <a:schemeClr val="tx1"/>
+                          </a:solidFill>
+                          <a:effectLst/>
+                          <a:latin typeface="+mn-lt"/>
+                          <a:ea typeface="+mn-ea"/>
+                          <a:cs typeface="+mn-cs"/>
+                        </a:rPr>
+                        <a:t> </a:t>
+                      </a:r>
+                      <a:r>
+                        <a:rPr kumimoji="0" lang="es-ES_tradnl" altLang="ca-ES" sz="2800" b="0" i="0" u="none" strike="noStrike" kern="1200" cap="none" normalizeH="0" baseline="0" dirty="0" err="1">
+                          <a:ln>
+                            <a:noFill/>
+                          </a:ln>
+                          <a:solidFill>
+                            <a:schemeClr val="tx1"/>
+                          </a:solidFill>
+                          <a:effectLst/>
+                          <a:latin typeface="+mn-lt"/>
+                          <a:ea typeface="+mn-ea"/>
+                          <a:cs typeface="+mn-cs"/>
+                        </a:rPr>
+                        <a:t>Hypothesis</a:t>
+                      </a:r>
+                      <a:r>
+                        <a:rPr kumimoji="0" lang="es-ES_tradnl" altLang="ca-ES" sz="2800" b="0" i="0" u="none" strike="noStrike" kern="1200" cap="none" normalizeH="0" baseline="0" dirty="0">
+                          <a:ln>
+                            <a:noFill/>
+                          </a:ln>
+                          <a:solidFill>
+                            <a:schemeClr val="tx1"/>
+                          </a:solidFill>
+                          <a:effectLst/>
+                          <a:latin typeface="+mn-lt"/>
+                          <a:ea typeface="+mn-ea"/>
+                          <a:cs typeface="+mn-cs"/>
+                        </a:rPr>
+                        <a:t> </a:t>
+                      </a:r>
+                      <a:r>
+                        <a:rPr kumimoji="0" lang="ca-ES" altLang="ca-ES" sz="2800" b="1" i="0" u="none" strike="noStrike" kern="1200" cap="none" normalizeH="0" baseline="0" dirty="0" err="1">
+                          <a:ln>
+                            <a:noFill/>
+                          </a:ln>
+                          <a:solidFill>
+                            <a:schemeClr val="tx1"/>
+                          </a:solidFill>
+                          <a:effectLst/>
+                          <a:latin typeface="+mn-lt"/>
+                          <a:ea typeface="+mn-ea"/>
+                          <a:cs typeface="+mn-cs"/>
+                        </a:rPr>
+                        <a:t>False</a:t>
+                      </a:r>
+                      <a:endParaRPr kumimoji="0" lang="es-ES" altLang="ca-ES" sz="2800" b="1" i="0" u="none" strike="noStrike" kern="1200" cap="none" normalizeH="0" baseline="0" dirty="0">
+                        <a:ln>
+                          <a:noFill/>
+                        </a:ln>
+                        <a:solidFill>
+                          <a:schemeClr val="tx1"/>
+                        </a:solidFill>
+                        <a:effectLst/>
+                        <a:latin typeface="+mn-lt"/>
+                        <a:ea typeface="+mn-ea"/>
+                        <a:cs typeface="+mn-cs"/>
+                      </a:endParaRPr>
+                    </a:p>
+                  </a:txBody>
+                  <a:tcPr marL="99062" marR="99062" marT="45716" marB="45716" horzOverflow="overflow">
+                    <a:lnL w="12700" cap="flat" cmpd="sng" algn="ctr">
+                      <a:solidFill>
+                        <a:schemeClr val="tx1"/>
+                      </a:solidFill>
+                      <a:prstDash val="solid"/>
+                      <a:round/>
+                      <a:headEnd type="none" w="med" len="med"/>
+                      <a:tailEnd type="none" w="med" len="med"/>
+                    </a:lnL>
+                    <a:lnR w="28575" cap="flat" cmpd="sng" algn="ctr">
+                      <a:solidFill>
+                        <a:schemeClr val="tx1"/>
+                      </a:solidFill>
+                      <a:prstDash val="solid"/>
+                      <a:round/>
+                      <a:headEnd type="none" w="med" len="med"/>
+                      <a:tailEnd type="none" w="med" len="med"/>
+                    </a:lnR>
+                    <a:lnT w="28575" cap="flat" cmpd="sng" algn="ctr">
+                      <a:solidFill>
+                        <a:schemeClr val="tx1"/>
+                      </a:solidFill>
+                      <a:prstDash val="solid"/>
+                      <a:round/>
+                      <a:headEnd type="none" w="med" len="med"/>
+                      <a:tailEnd type="none" w="med" len="med"/>
+                    </a:lnT>
+                    <a:lnB w="12700" cap="flat" cmpd="sng" algn="ctr">
+                      <a:solidFill>
+                        <a:schemeClr val="tx1"/>
+                      </a:solidFill>
+                      <a:prstDash val="solid"/>
+                      <a:round/>
+                      <a:headEnd type="none" w="med" len="med"/>
+                      <a:tailEnd type="none" w="med" len="med"/>
+                    </a:lnB>
+                    <a:lnTlToBr>
+                      <a:noFill/>
+                    </a:lnTlToBr>
+                    <a:lnBlToTr>
+                      <a:noFill/>
+                    </a:lnBlToTr>
+                    <a:solidFill>
+                      <a:srgbClr val="FFFF99"/>
+                    </a:solidFill>
+                  </a:tcPr>
+                </a:tc>
+                <a:extLst>
+                  <a:ext uri="{0D108BD9-81ED-4DB2-BD59-A6C34878D82A}">
+                    <a16:rowId xmlns:a16="http://schemas.microsoft.com/office/drawing/2014/main" val="10000"/>
+                  </a:ext>
+                </a:extLst>
+              </a:tr>
+              <a:tr h="1318187">
+                <a:tc>
+                  <a:txBody>
+                    <a:bodyPr/>
+                    <a:lstStyle>
+                      <a:lvl1pPr algn="l">
+                        <a:spcBef>
+                          <a:spcPct val="20000"/>
+                        </a:spcBef>
+                        <a:buClr>
+                          <a:schemeClr val="bg2"/>
+                        </a:buClr>
+                        <a:buSzPct val="75000"/>
+                        <a:buFont typeface="Monotype Sorts" pitchFamily="2" charset="2"/>
+                        <a:defRPr sz="2800">
+                          <a:solidFill>
+                            <a:schemeClr val="tx1"/>
+                          </a:solidFill>
+                          <a:latin typeface="Times New Roman" pitchFamily="18" charset="0"/>
+                        </a:defRPr>
+                      </a:lvl1pPr>
+                      <a:lvl2pPr algn="l">
+                        <a:spcBef>
+                          <a:spcPct val="20000"/>
+                        </a:spcBef>
+                        <a:buClr>
+                          <a:schemeClr val="bg2"/>
+                        </a:buClr>
+                        <a:buSzPct val="75000"/>
+                        <a:defRPr sz="2400">
+                          <a:solidFill>
+                            <a:schemeClr val="tx1"/>
+                          </a:solidFill>
+                          <a:latin typeface="Times New Roman" pitchFamily="18" charset="0"/>
+                        </a:defRPr>
+                      </a:lvl2pPr>
+                      <a:lvl3pPr algn="l">
+                        <a:spcBef>
+                          <a:spcPct val="20000"/>
+                        </a:spcBef>
+                        <a:buClr>
+                          <a:schemeClr val="bg2"/>
+                        </a:buClr>
+                        <a:buSzPct val="75000"/>
+                        <a:buFont typeface="Monotype Sorts" pitchFamily="2" charset="2"/>
+                        <a:defRPr sz="2000">
+                          <a:solidFill>
+                            <a:schemeClr val="tx1"/>
+                          </a:solidFill>
+                          <a:latin typeface="Times New Roman" pitchFamily="18" charset="0"/>
+                        </a:defRPr>
+                      </a:lvl3pPr>
+                      <a:lvl4pPr algn="l">
+                        <a:spcBef>
+                          <a:spcPct val="20000"/>
+                        </a:spcBef>
+                        <a:buClr>
+                          <a:schemeClr val="bg2"/>
+                        </a:buClr>
+                        <a:buSzPct val="75000"/>
+                        <a:defRPr>
+                          <a:solidFill>
+                            <a:schemeClr val="tx1"/>
+                          </a:solidFill>
+                          <a:latin typeface="Times New Roman" pitchFamily="18" charset="0"/>
+                        </a:defRPr>
+                      </a:lvl4pPr>
+                      <a:lvl5pPr algn="l">
+                        <a:spcBef>
+                          <a:spcPct val="20000"/>
+                        </a:spcBef>
+                        <a:buClr>
+                          <a:schemeClr val="bg2"/>
+                        </a:buClr>
+                        <a:buSzPct val="75000"/>
+                        <a:defRPr>
+                          <a:solidFill>
+                            <a:schemeClr val="tx1"/>
+                          </a:solidFill>
+                          <a:latin typeface="Times New Roman" pitchFamily="18" charset="0"/>
+                        </a:defRPr>
+                      </a:lvl5pPr>
+                      <a:lvl6pPr eaLnBrk="0" fontAlgn="base" hangingPunct="0">
+                        <a:spcBef>
+                          <a:spcPct val="20000"/>
+                        </a:spcBef>
+                        <a:spcAft>
+                          <a:spcPct val="0"/>
+                        </a:spcAft>
+                        <a:buClr>
+                          <a:schemeClr val="bg2"/>
+                        </a:buClr>
+                        <a:buSzPct val="75000"/>
+                        <a:defRPr>
+                          <a:solidFill>
+                            <a:schemeClr val="tx1"/>
+                          </a:solidFill>
+                          <a:latin typeface="Times New Roman" pitchFamily="18" charset="0"/>
+                        </a:defRPr>
+                      </a:lvl6pPr>
+                      <a:lvl7pPr eaLnBrk="0" fontAlgn="base" hangingPunct="0">
+                        <a:spcBef>
+                          <a:spcPct val="20000"/>
+                        </a:spcBef>
+                        <a:spcAft>
+                          <a:spcPct val="0"/>
+                        </a:spcAft>
+                        <a:buClr>
+                          <a:schemeClr val="bg2"/>
+                        </a:buClr>
+                        <a:buSzPct val="75000"/>
+                        <a:defRPr>
+                          <a:solidFill>
+                            <a:schemeClr val="tx1"/>
+                          </a:solidFill>
+                          <a:latin typeface="Times New Roman" pitchFamily="18" charset="0"/>
+                        </a:defRPr>
+                      </a:lvl7pPr>
+                      <a:lvl8pPr eaLnBrk="0" fontAlgn="base" hangingPunct="0">
+                        <a:spcBef>
+                          <a:spcPct val="20000"/>
+                        </a:spcBef>
+                        <a:spcAft>
+                          <a:spcPct val="0"/>
+                        </a:spcAft>
+                        <a:buClr>
+                          <a:schemeClr val="bg2"/>
+                        </a:buClr>
+                        <a:buSzPct val="75000"/>
+                        <a:defRPr>
+                          <a:solidFill>
+                            <a:schemeClr val="tx1"/>
+                          </a:solidFill>
+                          <a:latin typeface="Times New Roman" pitchFamily="18" charset="0"/>
+                        </a:defRPr>
+                      </a:lvl8pPr>
+                      <a:lvl9pPr eaLnBrk="0" fontAlgn="base" hangingPunct="0">
+                        <a:spcBef>
+                          <a:spcPct val="20000"/>
+                        </a:spcBef>
+                        <a:spcAft>
+                          <a:spcPct val="0"/>
+                        </a:spcAft>
+                        <a:buClr>
+                          <a:schemeClr val="bg2"/>
+                        </a:buClr>
+                        <a:buSzPct val="75000"/>
+                        <a:defRPr>
+                          <a:solidFill>
+                            <a:schemeClr val="tx1"/>
+                          </a:solidFill>
+                          <a:latin typeface="Times New Roman" pitchFamily="18" charset="0"/>
+                        </a:defRPr>
+                      </a:lvl9pPr>
+                    </a:lstStyle>
+                    <a:p>
+                      <a:pPr marL="0" marR="0" lvl="0" indent="0" algn="ctr" defTabSz="914400" rtl="0" eaLnBrk="0" fontAlgn="base" latinLnBrk="0" hangingPunct="0">
+                        <a:lnSpc>
+                          <a:spcPct val="100000"/>
+                        </a:lnSpc>
+                        <a:spcBef>
+                          <a:spcPct val="20000"/>
+                        </a:spcBef>
+                        <a:spcAft>
+                          <a:spcPct val="0"/>
+                        </a:spcAft>
+                        <a:buClr>
+                          <a:schemeClr val="bg2"/>
+                        </a:buClr>
+                        <a:buSzPct val="75000"/>
+                        <a:buFont typeface="Monotype Sorts" pitchFamily="2" charset="2"/>
+                        <a:buNone/>
+                        <a:tabLst/>
+                      </a:pPr>
+                      <a:r>
+                        <a:rPr kumimoji="0" lang="es-ES_tradnl" altLang="ca-ES" sz="2400" b="0" i="1" u="none" strike="noStrike" cap="none" normalizeH="0" baseline="0" dirty="0">
+                          <a:ln>
+                            <a:noFill/>
+                          </a:ln>
+                          <a:solidFill>
+                            <a:schemeClr val="tx1"/>
+                          </a:solidFill>
+                          <a:effectLst/>
+                          <a:latin typeface="+mn-lt"/>
+                        </a:rPr>
+                        <a:t>Test </a:t>
+                      </a:r>
+                      <a:r>
+                        <a:rPr kumimoji="0" lang="es-ES_tradnl" altLang="ca-ES" sz="2400" b="0" i="1" u="none" strike="noStrike" cap="none" normalizeH="0" baseline="0" dirty="0" err="1">
+                          <a:ln>
+                            <a:noFill/>
+                          </a:ln>
+                          <a:solidFill>
+                            <a:schemeClr val="tx1"/>
+                          </a:solidFill>
+                          <a:effectLst/>
+                          <a:latin typeface="+mn-lt"/>
+                        </a:rPr>
+                        <a:t>does</a:t>
+                      </a:r>
+                      <a:r>
+                        <a:rPr kumimoji="0" lang="es-ES_tradnl" altLang="ca-ES" sz="2400" b="0" i="1" u="none" strike="noStrike" cap="none" normalizeH="0" baseline="0" dirty="0">
+                          <a:ln>
+                            <a:noFill/>
+                          </a:ln>
+                          <a:solidFill>
+                            <a:schemeClr val="tx1"/>
+                          </a:solidFill>
+                          <a:effectLst/>
+                          <a:latin typeface="+mn-lt"/>
+                        </a:rPr>
+                        <a:t> </a:t>
+                      </a:r>
+                      <a:r>
+                        <a:rPr kumimoji="0" lang="es-ES_tradnl" altLang="ca-ES" sz="2400" b="0" i="1" u="none" strike="noStrike" cap="none" normalizeH="0" baseline="0" dirty="0" err="1">
+                          <a:ln>
+                            <a:noFill/>
+                          </a:ln>
+                          <a:solidFill>
+                            <a:schemeClr val="tx1"/>
+                          </a:solidFill>
+                          <a:effectLst/>
+                          <a:latin typeface="+mn-lt"/>
+                        </a:rPr>
+                        <a:t>not</a:t>
+                      </a:r>
+                      <a:r>
+                        <a:rPr kumimoji="0" lang="es-ES_tradnl" altLang="ca-ES" sz="2400" b="0" i="1" u="none" strike="noStrike" cap="none" normalizeH="0" baseline="0" dirty="0">
+                          <a:ln>
+                            <a:noFill/>
+                          </a:ln>
+                          <a:solidFill>
+                            <a:schemeClr val="tx1"/>
+                          </a:solidFill>
+                          <a:effectLst/>
+                          <a:latin typeface="+mn-lt"/>
+                        </a:rPr>
+                        <a:t> </a:t>
+                      </a:r>
+                      <a:r>
+                        <a:rPr kumimoji="0" lang="es-ES_tradnl" altLang="ca-ES" sz="2400" b="0" i="1" u="none" strike="noStrike" cap="none" normalizeH="0" baseline="0" dirty="0" err="1">
+                          <a:ln>
+                            <a:noFill/>
+                          </a:ln>
+                          <a:solidFill>
+                            <a:schemeClr val="tx1"/>
+                          </a:solidFill>
+                          <a:effectLst/>
+                          <a:latin typeface="+mn-lt"/>
+                        </a:rPr>
+                        <a:t>reject</a:t>
+                      </a:r>
+                      <a:r>
+                        <a:rPr kumimoji="0" lang="es-ES_tradnl" altLang="ca-ES" sz="2400" b="0" i="1" u="none" strike="noStrike" cap="none" normalizeH="0" baseline="0" dirty="0">
+                          <a:ln>
+                            <a:noFill/>
+                          </a:ln>
+                          <a:solidFill>
+                            <a:schemeClr val="tx1"/>
+                          </a:solidFill>
+                          <a:effectLst/>
+                          <a:latin typeface="+mn-lt"/>
+                        </a:rPr>
+                        <a:t> </a:t>
+                      </a:r>
+                      <a:r>
+                        <a:rPr kumimoji="0" lang="es-ES_tradnl" altLang="ca-ES" sz="2400" b="0" i="1" u="none" strike="noStrike" cap="none" normalizeH="0" baseline="0" dirty="0" err="1">
+                          <a:ln>
+                            <a:noFill/>
+                          </a:ln>
+                          <a:solidFill>
+                            <a:schemeClr val="tx1"/>
+                          </a:solidFill>
+                          <a:effectLst/>
+                          <a:latin typeface="+mn-lt"/>
+                        </a:rPr>
+                        <a:t>null</a:t>
+                      </a:r>
+                      <a:r>
+                        <a:rPr kumimoji="0" lang="es-ES_tradnl" altLang="ca-ES" sz="2400" b="0" i="1" u="none" strike="noStrike" cap="none" normalizeH="0" baseline="0" dirty="0">
+                          <a:ln>
+                            <a:noFill/>
+                          </a:ln>
+                          <a:solidFill>
+                            <a:schemeClr val="tx1"/>
+                          </a:solidFill>
+                          <a:effectLst/>
+                          <a:latin typeface="+mn-lt"/>
+                        </a:rPr>
+                        <a:t> </a:t>
+                      </a:r>
+                      <a:r>
+                        <a:rPr kumimoji="0" lang="es-ES_tradnl" altLang="ca-ES" sz="2400" b="0" i="1" u="none" strike="noStrike" cap="none" normalizeH="0" baseline="0" dirty="0" err="1">
+                          <a:ln>
+                            <a:noFill/>
+                          </a:ln>
+                          <a:solidFill>
+                            <a:schemeClr val="tx1"/>
+                          </a:solidFill>
+                          <a:effectLst/>
+                          <a:latin typeface="+mn-lt"/>
+                        </a:rPr>
+                        <a:t>hypothesis</a:t>
+                      </a:r>
+                      <a:endParaRPr kumimoji="0" lang="es-ES" altLang="ca-ES" sz="2400" b="0" i="1" u="none" strike="noStrike" cap="none" normalizeH="0" baseline="0" dirty="0">
+                        <a:ln>
+                          <a:noFill/>
+                        </a:ln>
+                        <a:solidFill>
+                          <a:schemeClr val="tx1"/>
+                        </a:solidFill>
+                        <a:effectLst/>
+                        <a:latin typeface="+mn-lt"/>
+                      </a:endParaRPr>
+                    </a:p>
+                  </a:txBody>
+                  <a:tcPr marL="99062" marR="99062" marT="45716" marB="45716" horzOverflow="overflow">
+                    <a:lnL w="28575" cap="flat" cmpd="sng" algn="ctr">
+                      <a:solidFill>
+                        <a:schemeClr val="tx1"/>
+                      </a:solidFill>
+                      <a:prstDash val="solid"/>
+                      <a:round/>
+                      <a:headEnd type="none" w="med" len="med"/>
+                      <a:tailEnd type="none" w="med" len="med"/>
+                    </a:lnL>
+                    <a:lnR w="12700" cap="flat" cmpd="sng" algn="ctr">
+                      <a:solidFill>
+                        <a:schemeClr val="tx1"/>
+                      </a:solidFill>
+                      <a:prstDash val="solid"/>
+                      <a:round/>
+                      <a:headEnd type="none" w="med" len="med"/>
+                      <a:tailEnd type="none" w="med" len="med"/>
+                    </a:lnR>
+                    <a:lnT w="12700" cap="flat" cmpd="sng" algn="ctr">
+                      <a:solidFill>
+                        <a:schemeClr val="tx1"/>
+                      </a:solidFill>
+                      <a:prstDash val="solid"/>
+                      <a:round/>
+                      <a:headEnd type="none" w="med" len="med"/>
+                      <a:tailEnd type="none" w="med" len="med"/>
+                    </a:lnT>
+                    <a:lnB w="12700" cap="flat" cmpd="sng" algn="ctr">
+                      <a:solidFill>
+                        <a:schemeClr val="tx1"/>
+                      </a:solidFill>
+                      <a:prstDash val="solid"/>
+                      <a:round/>
+                      <a:headEnd type="none" w="med" len="med"/>
+                      <a:tailEnd type="none" w="med" len="med"/>
+                    </a:lnB>
+                    <a:lnTlToBr>
+                      <a:noFill/>
+                    </a:lnTlToBr>
+                    <a:lnBlToTr>
+                      <a:noFill/>
+                    </a:lnBlToTr>
+                    <a:solidFill>
+                      <a:srgbClr val="FFFF99"/>
+                    </a:solidFill>
+                  </a:tcPr>
+                </a:tc>
+                <a:tc>
+                  <a:txBody>
+                    <a:bodyPr/>
+                    <a:lstStyle>
+                      <a:lvl1pPr algn="l">
+                        <a:spcBef>
+                          <a:spcPct val="20000"/>
+                        </a:spcBef>
+                        <a:buClr>
+                          <a:schemeClr val="bg2"/>
+                        </a:buClr>
+                        <a:buSzPct val="75000"/>
+                        <a:buFont typeface="Monotype Sorts" pitchFamily="2" charset="2"/>
+                        <a:defRPr sz="2800">
+                          <a:solidFill>
+                            <a:schemeClr val="tx1"/>
+                          </a:solidFill>
+                          <a:latin typeface="Times New Roman" pitchFamily="18" charset="0"/>
+                        </a:defRPr>
+                      </a:lvl1pPr>
+                      <a:lvl2pPr algn="l">
+                        <a:spcBef>
+                          <a:spcPct val="20000"/>
+                        </a:spcBef>
+                        <a:buClr>
+                          <a:schemeClr val="bg2"/>
+                        </a:buClr>
+                        <a:buSzPct val="75000"/>
+                        <a:defRPr sz="2400">
+                          <a:solidFill>
+                            <a:schemeClr val="tx1"/>
+                          </a:solidFill>
+                          <a:latin typeface="Times New Roman" pitchFamily="18" charset="0"/>
+                        </a:defRPr>
+                      </a:lvl2pPr>
+                      <a:lvl3pPr algn="l">
+                        <a:spcBef>
+                          <a:spcPct val="20000"/>
+                        </a:spcBef>
+                        <a:buClr>
+                          <a:schemeClr val="bg2"/>
+                        </a:buClr>
+                        <a:buSzPct val="75000"/>
+                        <a:buFont typeface="Monotype Sorts" pitchFamily="2" charset="2"/>
+                        <a:defRPr sz="2000">
+                          <a:solidFill>
+                            <a:schemeClr val="tx1"/>
+                          </a:solidFill>
+                          <a:latin typeface="Times New Roman" pitchFamily="18" charset="0"/>
+                        </a:defRPr>
+                      </a:lvl3pPr>
+                      <a:lvl4pPr algn="l">
+                        <a:spcBef>
+                          <a:spcPct val="20000"/>
+                        </a:spcBef>
+                        <a:buClr>
+                          <a:schemeClr val="bg2"/>
+                        </a:buClr>
+                        <a:buSzPct val="75000"/>
+                        <a:defRPr>
+                          <a:solidFill>
+                            <a:schemeClr val="tx1"/>
+                          </a:solidFill>
+                          <a:latin typeface="Times New Roman" pitchFamily="18" charset="0"/>
+                        </a:defRPr>
+                      </a:lvl4pPr>
+                      <a:lvl5pPr algn="l">
+                        <a:spcBef>
+                          <a:spcPct val="20000"/>
+                        </a:spcBef>
+                        <a:buClr>
+                          <a:schemeClr val="bg2"/>
+                        </a:buClr>
+                        <a:buSzPct val="75000"/>
+                        <a:defRPr>
+                          <a:solidFill>
+                            <a:schemeClr val="tx1"/>
+                          </a:solidFill>
+                          <a:latin typeface="Times New Roman" pitchFamily="18" charset="0"/>
+                        </a:defRPr>
+                      </a:lvl5pPr>
+                      <a:lvl6pPr eaLnBrk="0" fontAlgn="base" hangingPunct="0">
+                        <a:spcBef>
+                          <a:spcPct val="20000"/>
+                        </a:spcBef>
+                        <a:spcAft>
+                          <a:spcPct val="0"/>
+                        </a:spcAft>
+                        <a:buClr>
+                          <a:schemeClr val="bg2"/>
+                        </a:buClr>
+                        <a:buSzPct val="75000"/>
+                        <a:defRPr>
+                          <a:solidFill>
+                            <a:schemeClr val="tx1"/>
+                          </a:solidFill>
+                          <a:latin typeface="Times New Roman" pitchFamily="18" charset="0"/>
+                        </a:defRPr>
+                      </a:lvl6pPr>
+                      <a:lvl7pPr eaLnBrk="0" fontAlgn="base" hangingPunct="0">
+                        <a:spcBef>
+                          <a:spcPct val="20000"/>
+                        </a:spcBef>
+                        <a:spcAft>
+                          <a:spcPct val="0"/>
+                        </a:spcAft>
+                        <a:buClr>
+                          <a:schemeClr val="bg2"/>
+                        </a:buClr>
+                        <a:buSzPct val="75000"/>
+                        <a:defRPr>
+                          <a:solidFill>
+                            <a:schemeClr val="tx1"/>
+                          </a:solidFill>
+                          <a:latin typeface="Times New Roman" pitchFamily="18" charset="0"/>
+                        </a:defRPr>
+                      </a:lvl7pPr>
+                      <a:lvl8pPr eaLnBrk="0" fontAlgn="base" hangingPunct="0">
+                        <a:spcBef>
+                          <a:spcPct val="20000"/>
+                        </a:spcBef>
+                        <a:spcAft>
+                          <a:spcPct val="0"/>
+                        </a:spcAft>
+                        <a:buClr>
+                          <a:schemeClr val="bg2"/>
+                        </a:buClr>
+                        <a:buSzPct val="75000"/>
+                        <a:defRPr>
+                          <a:solidFill>
+                            <a:schemeClr val="tx1"/>
+                          </a:solidFill>
+                          <a:latin typeface="Times New Roman" pitchFamily="18" charset="0"/>
+                        </a:defRPr>
+                      </a:lvl8pPr>
+                      <a:lvl9pPr eaLnBrk="0" fontAlgn="base" hangingPunct="0">
+                        <a:spcBef>
+                          <a:spcPct val="20000"/>
+                        </a:spcBef>
+                        <a:spcAft>
+                          <a:spcPct val="0"/>
+                        </a:spcAft>
+                        <a:buClr>
+                          <a:schemeClr val="bg2"/>
+                        </a:buClr>
+                        <a:buSzPct val="75000"/>
+                        <a:defRPr>
+                          <a:solidFill>
+                            <a:schemeClr val="tx1"/>
+                          </a:solidFill>
+                          <a:latin typeface="Times New Roman" pitchFamily="18" charset="0"/>
+                        </a:defRPr>
+                      </a:lvl9pPr>
+                    </a:lstStyle>
+                    <a:p>
+                      <a:pPr marL="0" marR="0" lvl="0" indent="0" algn="ctr" defTabSz="914400" rtl="0" eaLnBrk="0" fontAlgn="base" latinLnBrk="0" hangingPunct="0">
+                        <a:lnSpc>
+                          <a:spcPct val="100000"/>
+                        </a:lnSpc>
+                        <a:spcBef>
+                          <a:spcPct val="20000"/>
+                        </a:spcBef>
+                        <a:spcAft>
+                          <a:spcPct val="0"/>
+                        </a:spcAft>
+                        <a:buClr>
+                          <a:schemeClr val="bg2"/>
+                        </a:buClr>
+                        <a:buSzPct val="75000"/>
+                        <a:buFont typeface="Monotype Sorts" pitchFamily="2" charset="2"/>
+                        <a:buNone/>
+                        <a:tabLst/>
+                      </a:pPr>
+                      <a:r>
+                        <a:rPr kumimoji="0" lang="es-ES_tradnl" altLang="ca-ES" sz="2400" b="0" i="0" u="none" strike="noStrike" cap="none" normalizeH="0" baseline="0" dirty="0" err="1">
+                          <a:ln>
+                            <a:noFill/>
+                          </a:ln>
+                          <a:solidFill>
+                            <a:schemeClr val="tx1"/>
+                          </a:solidFill>
+                          <a:effectLst/>
+                          <a:latin typeface="+mn-lt"/>
+                          <a:sym typeface="Wingdings" pitchFamily="2" charset="2"/>
+                        </a:rPr>
+                        <a:t>Significance</a:t>
+                      </a:r>
+                      <a:r>
+                        <a:rPr kumimoji="0" lang="es-ES_tradnl" altLang="ca-ES" sz="2400" b="0" i="0" u="none" strike="noStrike" cap="none" normalizeH="0" baseline="0" dirty="0">
+                          <a:ln>
+                            <a:noFill/>
+                          </a:ln>
+                          <a:solidFill>
+                            <a:schemeClr val="tx1"/>
+                          </a:solidFill>
+                          <a:effectLst/>
+                          <a:latin typeface="+mn-lt"/>
+                          <a:sym typeface="Wingdings" pitchFamily="2" charset="2"/>
+                        </a:rPr>
+                        <a:t> </a:t>
+                      </a:r>
+                      <a:r>
+                        <a:rPr kumimoji="0" lang="es-ES_tradnl" altLang="ca-ES" sz="2400" b="0" i="0" u="none" strike="noStrike" cap="none" normalizeH="0" baseline="0" dirty="0" err="1">
+                          <a:ln>
+                            <a:noFill/>
+                          </a:ln>
+                          <a:solidFill>
+                            <a:schemeClr val="tx1"/>
+                          </a:solidFill>
+                          <a:effectLst/>
+                          <a:latin typeface="+mn-lt"/>
+                          <a:sym typeface="Wingdings" pitchFamily="2" charset="2"/>
+                        </a:rPr>
+                        <a:t>level</a:t>
+                      </a:r>
+                      <a:endParaRPr kumimoji="0" lang="es-ES_tradnl" altLang="ca-ES" sz="2400" b="0" i="0" u="none" strike="noStrike" cap="none" normalizeH="0" baseline="0" dirty="0">
+                        <a:ln>
+                          <a:noFill/>
+                        </a:ln>
+                        <a:solidFill>
+                          <a:schemeClr val="tx1"/>
+                        </a:solidFill>
+                        <a:effectLst/>
+                        <a:latin typeface="+mn-lt"/>
+                        <a:sym typeface="Wingdings" pitchFamily="2" charset="2"/>
+                      </a:endParaRPr>
+                    </a:p>
+                    <a:p>
+                      <a:pPr marL="0" marR="0" lvl="0" indent="0" algn="ctr" defTabSz="914400" rtl="0" eaLnBrk="0" fontAlgn="base" latinLnBrk="0" hangingPunct="0">
+                        <a:lnSpc>
+                          <a:spcPct val="100000"/>
+                        </a:lnSpc>
+                        <a:spcBef>
+                          <a:spcPct val="20000"/>
+                        </a:spcBef>
+                        <a:spcAft>
+                          <a:spcPct val="0"/>
+                        </a:spcAft>
+                        <a:buClr>
+                          <a:schemeClr val="bg2"/>
+                        </a:buClr>
+                        <a:buSzPct val="75000"/>
+                        <a:buFont typeface="Monotype Sorts" pitchFamily="2" charset="2"/>
+                        <a:buNone/>
+                        <a:tabLst/>
+                      </a:pPr>
+                      <a:r>
+                        <a:rPr kumimoji="0" lang="es-ES" altLang="ca-ES" sz="4400" b="0" i="0" u="none" strike="noStrike" cap="none" normalizeH="0" baseline="0" dirty="0">
+                          <a:ln>
+                            <a:noFill/>
+                          </a:ln>
+                          <a:solidFill>
+                            <a:schemeClr val="tx1"/>
+                          </a:solidFill>
+                          <a:effectLst/>
+                          <a:latin typeface="+mn-lt"/>
+                          <a:sym typeface="Wingdings" pitchFamily="2" charset="2"/>
+                        </a:rPr>
+                        <a:t></a:t>
+                      </a:r>
+                      <a:endParaRPr kumimoji="0" lang="es-ES" altLang="ca-ES" sz="4400" b="0" i="0" u="none" strike="noStrike" cap="none" normalizeH="0" baseline="0" dirty="0">
+                        <a:ln>
+                          <a:noFill/>
+                        </a:ln>
+                        <a:solidFill>
+                          <a:schemeClr val="tx1"/>
+                        </a:solidFill>
+                        <a:effectLst/>
+                        <a:latin typeface="+mn-lt"/>
+                      </a:endParaRPr>
+                    </a:p>
+                  </a:txBody>
+                  <a:tcPr marL="99062" marR="99062" marT="45716" marB="45716" horzOverflow="overflow">
+                    <a:lnL w="12700" cap="flat" cmpd="sng" algn="ctr">
+                      <a:solidFill>
+                        <a:schemeClr val="tx1"/>
+                      </a:solidFill>
+                      <a:prstDash val="solid"/>
+                      <a:round/>
+                      <a:headEnd type="none" w="med" len="med"/>
+                      <a:tailEnd type="none" w="med" len="med"/>
+                    </a:lnL>
+                    <a:lnR w="12700" cap="flat" cmpd="sng" algn="ctr">
+                      <a:solidFill>
+                        <a:schemeClr val="tx1"/>
+                      </a:solidFill>
+                      <a:prstDash val="solid"/>
+                      <a:round/>
+                      <a:headEnd type="none" w="med" len="med"/>
+                      <a:tailEnd type="none" w="med" len="med"/>
+                    </a:lnR>
+                    <a:lnT w="12700" cap="flat" cmpd="sng" algn="ctr">
+                      <a:solidFill>
+                        <a:schemeClr val="tx1"/>
+                      </a:solidFill>
+                      <a:prstDash val="solid"/>
+                      <a:round/>
+                      <a:headEnd type="none" w="med" len="med"/>
+                      <a:tailEnd type="none" w="med" len="med"/>
+                    </a:lnT>
+                    <a:lnB w="12700" cap="flat" cmpd="sng" algn="ctr">
+                      <a:solidFill>
+                        <a:schemeClr val="tx1"/>
+                      </a:solidFill>
+                      <a:prstDash val="solid"/>
+                      <a:round/>
+                      <a:headEnd type="none" w="med" len="med"/>
+                      <a:tailEnd type="none" w="med" len="med"/>
+                    </a:lnB>
+                    <a:lnTlToBr>
+                      <a:noFill/>
+                    </a:lnTlToBr>
+                    <a:lnBlToTr>
+                      <a:noFill/>
+                    </a:lnBlToTr>
+                    <a:solidFill>
+                      <a:srgbClr val="FFFF99"/>
+                    </a:solidFill>
+                  </a:tcPr>
+                </a:tc>
+                <a:tc>
+                  <a:txBody>
+                    <a:bodyPr/>
+                    <a:lstStyle>
+                      <a:lvl1pPr algn="l">
+                        <a:spcBef>
+                          <a:spcPct val="20000"/>
+                        </a:spcBef>
+                        <a:buClr>
+                          <a:schemeClr val="bg2"/>
+                        </a:buClr>
+                        <a:buSzPct val="75000"/>
+                        <a:buFont typeface="Monotype Sorts" pitchFamily="2" charset="2"/>
+                        <a:defRPr sz="2800">
+                          <a:solidFill>
+                            <a:schemeClr val="tx1"/>
+                          </a:solidFill>
+                          <a:latin typeface="Times New Roman" pitchFamily="18" charset="0"/>
+                        </a:defRPr>
+                      </a:lvl1pPr>
+                      <a:lvl2pPr algn="l">
+                        <a:spcBef>
+                          <a:spcPct val="20000"/>
+                        </a:spcBef>
+                        <a:buClr>
+                          <a:schemeClr val="bg2"/>
+                        </a:buClr>
+                        <a:buSzPct val="75000"/>
+                        <a:defRPr sz="2400">
+                          <a:solidFill>
+                            <a:schemeClr val="tx1"/>
+                          </a:solidFill>
+                          <a:latin typeface="Times New Roman" pitchFamily="18" charset="0"/>
+                        </a:defRPr>
+                      </a:lvl2pPr>
+                      <a:lvl3pPr algn="l">
+                        <a:spcBef>
+                          <a:spcPct val="20000"/>
+                        </a:spcBef>
+                        <a:buClr>
+                          <a:schemeClr val="bg2"/>
+                        </a:buClr>
+                        <a:buSzPct val="75000"/>
+                        <a:buFont typeface="Monotype Sorts" pitchFamily="2" charset="2"/>
+                        <a:defRPr sz="2000">
+                          <a:solidFill>
+                            <a:schemeClr val="tx1"/>
+                          </a:solidFill>
+                          <a:latin typeface="Times New Roman" pitchFamily="18" charset="0"/>
+                        </a:defRPr>
+                      </a:lvl3pPr>
+                      <a:lvl4pPr algn="l">
+                        <a:spcBef>
+                          <a:spcPct val="20000"/>
+                        </a:spcBef>
+                        <a:buClr>
+                          <a:schemeClr val="bg2"/>
+                        </a:buClr>
+                        <a:buSzPct val="75000"/>
+                        <a:defRPr>
+                          <a:solidFill>
+                            <a:schemeClr val="tx1"/>
+                          </a:solidFill>
+                          <a:latin typeface="Times New Roman" pitchFamily="18" charset="0"/>
+                        </a:defRPr>
+                      </a:lvl4pPr>
+                      <a:lvl5pPr algn="l">
+                        <a:spcBef>
+                          <a:spcPct val="20000"/>
+                        </a:spcBef>
+                        <a:buClr>
+                          <a:schemeClr val="bg2"/>
+                        </a:buClr>
+                        <a:buSzPct val="75000"/>
+                        <a:defRPr>
+                          <a:solidFill>
+                            <a:schemeClr val="tx1"/>
+                          </a:solidFill>
+                          <a:latin typeface="Times New Roman" pitchFamily="18" charset="0"/>
+                        </a:defRPr>
+                      </a:lvl5pPr>
+                      <a:lvl6pPr eaLnBrk="0" fontAlgn="base" hangingPunct="0">
+                        <a:spcBef>
+                          <a:spcPct val="20000"/>
+                        </a:spcBef>
+                        <a:spcAft>
+                          <a:spcPct val="0"/>
+                        </a:spcAft>
+                        <a:buClr>
+                          <a:schemeClr val="bg2"/>
+                        </a:buClr>
+                        <a:buSzPct val="75000"/>
+                        <a:defRPr>
+                          <a:solidFill>
+                            <a:schemeClr val="tx1"/>
+                          </a:solidFill>
+                          <a:latin typeface="Times New Roman" pitchFamily="18" charset="0"/>
+                        </a:defRPr>
+                      </a:lvl6pPr>
+                      <a:lvl7pPr eaLnBrk="0" fontAlgn="base" hangingPunct="0">
+                        <a:spcBef>
+                          <a:spcPct val="20000"/>
+                        </a:spcBef>
+                        <a:spcAft>
+                          <a:spcPct val="0"/>
+                        </a:spcAft>
+                        <a:buClr>
+                          <a:schemeClr val="bg2"/>
+                        </a:buClr>
+                        <a:buSzPct val="75000"/>
+                        <a:defRPr>
+                          <a:solidFill>
+                            <a:schemeClr val="tx1"/>
+                          </a:solidFill>
+                          <a:latin typeface="Times New Roman" pitchFamily="18" charset="0"/>
+                        </a:defRPr>
+                      </a:lvl7pPr>
+                      <a:lvl8pPr eaLnBrk="0" fontAlgn="base" hangingPunct="0">
+                        <a:spcBef>
+                          <a:spcPct val="20000"/>
+                        </a:spcBef>
+                        <a:spcAft>
+                          <a:spcPct val="0"/>
+                        </a:spcAft>
+                        <a:buClr>
+                          <a:schemeClr val="bg2"/>
+                        </a:buClr>
+                        <a:buSzPct val="75000"/>
+                        <a:defRPr>
+                          <a:solidFill>
+                            <a:schemeClr val="tx1"/>
+                          </a:solidFill>
+                          <a:latin typeface="Times New Roman" pitchFamily="18" charset="0"/>
+                        </a:defRPr>
+                      </a:lvl8pPr>
+                      <a:lvl9pPr eaLnBrk="0" fontAlgn="base" hangingPunct="0">
+                        <a:spcBef>
+                          <a:spcPct val="20000"/>
+                        </a:spcBef>
+                        <a:spcAft>
+                          <a:spcPct val="0"/>
+                        </a:spcAft>
+                        <a:buClr>
+                          <a:schemeClr val="bg2"/>
+                        </a:buClr>
+                        <a:buSzPct val="75000"/>
+                        <a:defRPr>
+                          <a:solidFill>
+                            <a:schemeClr val="tx1"/>
+                          </a:solidFill>
+                          <a:latin typeface="Times New Roman" pitchFamily="18" charset="0"/>
+                        </a:defRPr>
+                      </a:lvl9pPr>
+                    </a:lstStyle>
+                    <a:p>
+                      <a:pPr marL="0" marR="0" lvl="0" indent="0" algn="ctr" defTabSz="914400" rtl="0" eaLnBrk="0" fontAlgn="base" latinLnBrk="0" hangingPunct="0">
+                        <a:lnSpc>
+                          <a:spcPct val="100000"/>
+                        </a:lnSpc>
+                        <a:spcBef>
+                          <a:spcPct val="20000"/>
+                        </a:spcBef>
+                        <a:spcAft>
+                          <a:spcPct val="0"/>
+                        </a:spcAft>
+                        <a:buClr>
+                          <a:schemeClr val="bg2"/>
+                        </a:buClr>
+                        <a:buSzPct val="75000"/>
+                        <a:buFont typeface="Monotype Sorts" pitchFamily="2" charset="2"/>
+                        <a:buNone/>
+                        <a:tabLst/>
+                      </a:pPr>
+                      <a:r>
+                        <a:rPr kumimoji="0" lang="es-ES_tradnl" altLang="ca-ES" sz="2400" b="0" i="0" u="none" strike="noStrike" cap="none" normalizeH="0" baseline="0" dirty="0" err="1">
+                          <a:ln>
+                            <a:noFill/>
+                          </a:ln>
+                          <a:solidFill>
+                            <a:schemeClr val="tx1"/>
+                          </a:solidFill>
+                          <a:effectLst/>
+                          <a:latin typeface="+mn-lt"/>
+                        </a:rPr>
+                        <a:t>Type</a:t>
+                      </a:r>
+                      <a:r>
+                        <a:rPr kumimoji="0" lang="es-ES_tradnl" altLang="ca-ES" sz="2400" b="0" i="0" u="none" strike="noStrike" cap="none" normalizeH="0" baseline="0" dirty="0">
+                          <a:ln>
+                            <a:noFill/>
+                          </a:ln>
+                          <a:solidFill>
+                            <a:schemeClr val="tx1"/>
+                          </a:solidFill>
+                          <a:effectLst/>
+                          <a:latin typeface="+mn-lt"/>
+                        </a:rPr>
+                        <a:t> II Error</a:t>
+                      </a:r>
+                    </a:p>
+                    <a:p>
+                      <a:pPr marL="0" marR="0" lvl="0" indent="0" algn="ctr" defTabSz="914400" rtl="0" eaLnBrk="0" fontAlgn="base" latinLnBrk="0" hangingPunct="0">
+                        <a:lnSpc>
+                          <a:spcPct val="100000"/>
+                        </a:lnSpc>
+                        <a:spcBef>
+                          <a:spcPct val="20000"/>
+                        </a:spcBef>
+                        <a:spcAft>
+                          <a:spcPct val="0"/>
+                        </a:spcAft>
+                        <a:buClr>
+                          <a:schemeClr val="bg2"/>
+                        </a:buClr>
+                        <a:buSzPct val="75000"/>
+                        <a:buFont typeface="Monotype Sorts" pitchFamily="2" charset="2"/>
+                        <a:buNone/>
+                        <a:tabLst/>
+                      </a:pPr>
+                      <a:r>
+                        <a:rPr kumimoji="0" lang="es-ES_tradnl" altLang="ca-ES" sz="2400" b="0" i="0" u="none" strike="noStrike" cap="none" normalizeH="0" baseline="0" dirty="0">
+                          <a:ln>
+                            <a:noFill/>
+                          </a:ln>
+                          <a:solidFill>
+                            <a:schemeClr val="tx1"/>
+                          </a:solidFill>
+                          <a:effectLst/>
+                          <a:latin typeface="+mn-lt"/>
+                          <a:sym typeface="Symbol" pitchFamily="18" charset="2"/>
+                        </a:rPr>
+                        <a:t></a:t>
+                      </a:r>
+                      <a:endParaRPr kumimoji="0" lang="es-ES" altLang="ca-ES" sz="2400" b="0" i="0" u="none" strike="noStrike" cap="none" normalizeH="0" baseline="0" dirty="0">
+                        <a:ln>
+                          <a:noFill/>
+                        </a:ln>
+                        <a:solidFill>
+                          <a:schemeClr val="tx1"/>
+                        </a:solidFill>
+                        <a:effectLst/>
+                        <a:latin typeface="+mn-lt"/>
+                      </a:endParaRPr>
+                    </a:p>
+                  </a:txBody>
+                  <a:tcPr marL="99062" marR="99062" marT="45716" marB="45716" horzOverflow="overflow">
+                    <a:lnL w="12700" cap="flat" cmpd="sng" algn="ctr">
+                      <a:solidFill>
+                        <a:schemeClr val="tx1"/>
+                      </a:solidFill>
+                      <a:prstDash val="solid"/>
+                      <a:round/>
+                      <a:headEnd type="none" w="med" len="med"/>
+                      <a:tailEnd type="none" w="med" len="med"/>
+                    </a:lnL>
+                    <a:lnR w="28575" cap="flat" cmpd="sng" algn="ctr">
+                      <a:solidFill>
+                        <a:schemeClr val="tx1"/>
+                      </a:solidFill>
+                      <a:prstDash val="solid"/>
+                      <a:round/>
+                      <a:headEnd type="none" w="med" len="med"/>
+                      <a:tailEnd type="none" w="med" len="med"/>
+                    </a:lnR>
+                    <a:lnT w="12700" cap="flat" cmpd="sng" algn="ctr">
+                      <a:solidFill>
+                        <a:schemeClr val="tx1"/>
+                      </a:solidFill>
+                      <a:prstDash val="solid"/>
+                      <a:round/>
+                      <a:headEnd type="none" w="med" len="med"/>
+                      <a:tailEnd type="none" w="med" len="med"/>
+                    </a:lnT>
+                    <a:lnB w="12700" cap="flat" cmpd="sng" algn="ctr">
+                      <a:solidFill>
+                        <a:schemeClr val="tx1"/>
+                      </a:solidFill>
+                      <a:prstDash val="solid"/>
+                      <a:round/>
+                      <a:headEnd type="none" w="med" len="med"/>
+                      <a:tailEnd type="none" w="med" len="med"/>
+                    </a:lnB>
+                    <a:lnTlToBr>
+                      <a:noFill/>
+                    </a:lnTlToBr>
+                    <a:lnBlToTr>
+                      <a:noFill/>
+                    </a:lnBlToTr>
+                    <a:solidFill>
+                      <a:srgbClr val="FFFF99"/>
+                    </a:solidFill>
+                  </a:tcPr>
+                </a:tc>
+                <a:extLst>
+                  <a:ext uri="{0D108BD9-81ED-4DB2-BD59-A6C34878D82A}">
+                    <a16:rowId xmlns:a16="http://schemas.microsoft.com/office/drawing/2014/main" val="10001"/>
+                  </a:ext>
+                </a:extLst>
+              </a:tr>
+              <a:tr h="1362355">
+                <a:tc>
+                  <a:txBody>
+                    <a:bodyPr/>
+                    <a:lstStyle>
+                      <a:lvl1pPr algn="l">
+                        <a:spcBef>
+                          <a:spcPct val="20000"/>
+                        </a:spcBef>
+                        <a:buClr>
+                          <a:schemeClr val="bg2"/>
+                        </a:buClr>
+                        <a:buSzPct val="75000"/>
+                        <a:buFont typeface="Monotype Sorts" pitchFamily="2" charset="2"/>
+                        <a:defRPr sz="2800">
+                          <a:solidFill>
+                            <a:schemeClr val="tx1"/>
+                          </a:solidFill>
+                          <a:latin typeface="Times New Roman" pitchFamily="18" charset="0"/>
+                        </a:defRPr>
+                      </a:lvl1pPr>
+                      <a:lvl2pPr algn="l">
+                        <a:spcBef>
+                          <a:spcPct val="20000"/>
+                        </a:spcBef>
+                        <a:buClr>
+                          <a:schemeClr val="bg2"/>
+                        </a:buClr>
+                        <a:buSzPct val="75000"/>
+                        <a:defRPr sz="2400">
+                          <a:solidFill>
+                            <a:schemeClr val="tx1"/>
+                          </a:solidFill>
+                          <a:latin typeface="Times New Roman" pitchFamily="18" charset="0"/>
+                        </a:defRPr>
+                      </a:lvl2pPr>
+                      <a:lvl3pPr algn="l">
+                        <a:spcBef>
+                          <a:spcPct val="20000"/>
+                        </a:spcBef>
+                        <a:buClr>
+                          <a:schemeClr val="bg2"/>
+                        </a:buClr>
+                        <a:buSzPct val="75000"/>
+                        <a:buFont typeface="Monotype Sorts" pitchFamily="2" charset="2"/>
+                        <a:defRPr sz="2000">
+                          <a:solidFill>
+                            <a:schemeClr val="tx1"/>
+                          </a:solidFill>
+                          <a:latin typeface="Times New Roman" pitchFamily="18" charset="0"/>
+                        </a:defRPr>
+                      </a:lvl3pPr>
+                      <a:lvl4pPr algn="l">
+                        <a:spcBef>
+                          <a:spcPct val="20000"/>
+                        </a:spcBef>
+                        <a:buClr>
+                          <a:schemeClr val="bg2"/>
+                        </a:buClr>
+                        <a:buSzPct val="75000"/>
+                        <a:defRPr>
+                          <a:solidFill>
+                            <a:schemeClr val="tx1"/>
+                          </a:solidFill>
+                          <a:latin typeface="Times New Roman" pitchFamily="18" charset="0"/>
+                        </a:defRPr>
+                      </a:lvl4pPr>
+                      <a:lvl5pPr algn="l">
+                        <a:spcBef>
+                          <a:spcPct val="20000"/>
+                        </a:spcBef>
+                        <a:buClr>
+                          <a:schemeClr val="bg2"/>
+                        </a:buClr>
+                        <a:buSzPct val="75000"/>
+                        <a:defRPr>
+                          <a:solidFill>
+                            <a:schemeClr val="tx1"/>
+                          </a:solidFill>
+                          <a:latin typeface="Times New Roman" pitchFamily="18" charset="0"/>
+                        </a:defRPr>
+                      </a:lvl5pPr>
+                      <a:lvl6pPr eaLnBrk="0" fontAlgn="base" hangingPunct="0">
+                        <a:spcBef>
+                          <a:spcPct val="20000"/>
+                        </a:spcBef>
+                        <a:spcAft>
+                          <a:spcPct val="0"/>
+                        </a:spcAft>
+                        <a:buClr>
+                          <a:schemeClr val="bg2"/>
+                        </a:buClr>
+                        <a:buSzPct val="75000"/>
+                        <a:defRPr>
+                          <a:solidFill>
+                            <a:schemeClr val="tx1"/>
+                          </a:solidFill>
+                          <a:latin typeface="Times New Roman" pitchFamily="18" charset="0"/>
+                        </a:defRPr>
+                      </a:lvl6pPr>
+                      <a:lvl7pPr eaLnBrk="0" fontAlgn="base" hangingPunct="0">
+                        <a:spcBef>
+                          <a:spcPct val="20000"/>
+                        </a:spcBef>
+                        <a:spcAft>
+                          <a:spcPct val="0"/>
+                        </a:spcAft>
+                        <a:buClr>
+                          <a:schemeClr val="bg2"/>
+                        </a:buClr>
+                        <a:buSzPct val="75000"/>
+                        <a:defRPr>
+                          <a:solidFill>
+                            <a:schemeClr val="tx1"/>
+                          </a:solidFill>
+                          <a:latin typeface="Times New Roman" pitchFamily="18" charset="0"/>
+                        </a:defRPr>
+                      </a:lvl7pPr>
+                      <a:lvl8pPr eaLnBrk="0" fontAlgn="base" hangingPunct="0">
+                        <a:spcBef>
+                          <a:spcPct val="20000"/>
+                        </a:spcBef>
+                        <a:spcAft>
+                          <a:spcPct val="0"/>
+                        </a:spcAft>
+                        <a:buClr>
+                          <a:schemeClr val="bg2"/>
+                        </a:buClr>
+                        <a:buSzPct val="75000"/>
+                        <a:defRPr>
+                          <a:solidFill>
+                            <a:schemeClr val="tx1"/>
+                          </a:solidFill>
+                          <a:latin typeface="Times New Roman" pitchFamily="18" charset="0"/>
+                        </a:defRPr>
+                      </a:lvl8pPr>
+                      <a:lvl9pPr eaLnBrk="0" fontAlgn="base" hangingPunct="0">
+                        <a:spcBef>
+                          <a:spcPct val="20000"/>
+                        </a:spcBef>
+                        <a:spcAft>
+                          <a:spcPct val="0"/>
+                        </a:spcAft>
+                        <a:buClr>
+                          <a:schemeClr val="bg2"/>
+                        </a:buClr>
+                        <a:buSzPct val="75000"/>
+                        <a:defRPr>
+                          <a:solidFill>
+                            <a:schemeClr val="tx1"/>
+                          </a:solidFill>
+                          <a:latin typeface="Times New Roman" pitchFamily="18" charset="0"/>
+                        </a:defRPr>
+                      </a:lvl9pPr>
+                    </a:lstStyle>
+                    <a:p>
+                      <a:pPr marL="0" marR="0" lvl="0" indent="0" algn="ctr" defTabSz="914400" rtl="0" eaLnBrk="0" fontAlgn="base" latinLnBrk="0" hangingPunct="0">
+                        <a:lnSpc>
+                          <a:spcPct val="100000"/>
+                        </a:lnSpc>
+                        <a:spcBef>
+                          <a:spcPct val="20000"/>
+                        </a:spcBef>
+                        <a:spcAft>
+                          <a:spcPct val="0"/>
+                        </a:spcAft>
+                        <a:buClr>
+                          <a:schemeClr val="bg2"/>
+                        </a:buClr>
+                        <a:buSzPct val="75000"/>
+                        <a:buFont typeface="Monotype Sorts" pitchFamily="2" charset="2"/>
+                        <a:buNone/>
+                        <a:tabLst/>
+                      </a:pPr>
+                      <a:r>
+                        <a:rPr kumimoji="0" lang="es-ES_tradnl" altLang="ca-ES" sz="2400" b="0" i="1" u="none" strike="noStrike" cap="none" normalizeH="0" baseline="0" dirty="0">
+                          <a:ln>
+                            <a:noFill/>
+                          </a:ln>
+                          <a:solidFill>
+                            <a:schemeClr val="tx1"/>
+                          </a:solidFill>
+                          <a:effectLst/>
+                          <a:latin typeface="+mn-lt"/>
+                        </a:rPr>
+                        <a:t>Test </a:t>
+                      </a:r>
+                      <a:r>
+                        <a:rPr kumimoji="0" lang="es-ES_tradnl" altLang="ca-ES" sz="2400" b="0" i="1" u="none" strike="noStrike" cap="none" normalizeH="0" baseline="0" dirty="0" err="1">
+                          <a:ln>
+                            <a:noFill/>
+                          </a:ln>
+                          <a:solidFill>
+                            <a:schemeClr val="tx1"/>
+                          </a:solidFill>
+                          <a:effectLst/>
+                          <a:latin typeface="+mn-lt"/>
+                        </a:rPr>
+                        <a:t>rejects</a:t>
+                      </a:r>
+                      <a:r>
+                        <a:rPr kumimoji="0" lang="es-ES_tradnl" altLang="ca-ES" sz="2400" b="0" i="1" u="none" strike="noStrike" cap="none" normalizeH="0" baseline="0" dirty="0">
+                          <a:ln>
+                            <a:noFill/>
+                          </a:ln>
+                          <a:solidFill>
+                            <a:schemeClr val="tx1"/>
+                          </a:solidFill>
+                          <a:effectLst/>
+                          <a:latin typeface="+mn-lt"/>
+                        </a:rPr>
+                        <a:t> </a:t>
+                      </a:r>
+                      <a:r>
+                        <a:rPr kumimoji="0" lang="es-ES_tradnl" altLang="ca-ES" sz="2400" b="0" i="1" u="none" strike="noStrike" cap="none" normalizeH="0" baseline="0" dirty="0" err="1">
+                          <a:ln>
+                            <a:noFill/>
+                          </a:ln>
+                          <a:solidFill>
+                            <a:schemeClr val="tx1"/>
+                          </a:solidFill>
+                          <a:effectLst/>
+                          <a:latin typeface="+mn-lt"/>
+                        </a:rPr>
+                        <a:t>null</a:t>
+                      </a:r>
+                      <a:r>
+                        <a:rPr kumimoji="0" lang="es-ES_tradnl" altLang="ca-ES" sz="2400" b="0" i="1" u="none" strike="noStrike" cap="none" normalizeH="0" baseline="0" dirty="0">
+                          <a:ln>
+                            <a:noFill/>
+                          </a:ln>
+                          <a:solidFill>
+                            <a:schemeClr val="tx1"/>
+                          </a:solidFill>
+                          <a:effectLst/>
+                          <a:latin typeface="+mn-lt"/>
+                        </a:rPr>
+                        <a:t> </a:t>
+                      </a:r>
+                      <a:r>
+                        <a:rPr kumimoji="0" lang="es-ES_tradnl" altLang="ca-ES" sz="2400" b="0" i="1" u="none" strike="noStrike" cap="none" normalizeH="0" baseline="0" dirty="0" err="1">
+                          <a:ln>
+                            <a:noFill/>
+                          </a:ln>
+                          <a:solidFill>
+                            <a:schemeClr val="tx1"/>
+                          </a:solidFill>
+                          <a:effectLst/>
+                          <a:latin typeface="+mn-lt"/>
+                        </a:rPr>
+                        <a:t>hypothesis</a:t>
+                      </a:r>
+                      <a:endParaRPr kumimoji="0" lang="es-ES" altLang="ca-ES" sz="2400" b="0" i="1" u="none" strike="noStrike" cap="none" normalizeH="0" baseline="0" dirty="0">
+                        <a:ln>
+                          <a:noFill/>
+                        </a:ln>
+                        <a:solidFill>
+                          <a:schemeClr val="tx1"/>
+                        </a:solidFill>
+                        <a:effectLst/>
+                        <a:latin typeface="+mn-lt"/>
+                      </a:endParaRPr>
+                    </a:p>
+                  </a:txBody>
+                  <a:tcPr marL="99062" marR="99062" marT="45716" marB="45716" horzOverflow="overflow">
+                    <a:lnL w="28575" cap="flat" cmpd="sng" algn="ctr">
+                      <a:solidFill>
+                        <a:schemeClr val="tx1"/>
+                      </a:solidFill>
+                      <a:prstDash val="solid"/>
+                      <a:round/>
+                      <a:headEnd type="none" w="med" len="med"/>
+                      <a:tailEnd type="none" w="med" len="med"/>
+                    </a:lnL>
+                    <a:lnR w="12700" cap="flat" cmpd="sng" algn="ctr">
+                      <a:solidFill>
+                        <a:schemeClr val="tx1"/>
+                      </a:solidFill>
+                      <a:prstDash val="solid"/>
+                      <a:round/>
+                      <a:headEnd type="none" w="med" len="med"/>
+                      <a:tailEnd type="none" w="med" len="med"/>
+                    </a:lnR>
+                    <a:lnT w="12700" cap="flat" cmpd="sng" algn="ctr">
+                      <a:solidFill>
+                        <a:schemeClr val="tx1"/>
+                      </a:solidFill>
+                      <a:prstDash val="solid"/>
+                      <a:round/>
+                      <a:headEnd type="none" w="med" len="med"/>
+                      <a:tailEnd type="none" w="med" len="med"/>
+                    </a:lnT>
+                    <a:lnB w="28575" cap="flat" cmpd="sng" algn="ctr">
+                      <a:solidFill>
+                        <a:schemeClr val="tx1"/>
+                      </a:solidFill>
+                      <a:prstDash val="solid"/>
+                      <a:round/>
+                      <a:headEnd type="none" w="med" len="med"/>
+                      <a:tailEnd type="none" w="med" len="med"/>
+                    </a:lnB>
+                    <a:lnTlToBr>
+                      <a:noFill/>
+                    </a:lnTlToBr>
+                    <a:lnBlToTr>
+                      <a:noFill/>
+                    </a:lnBlToTr>
+                    <a:solidFill>
+                      <a:srgbClr val="FFFF99"/>
+                    </a:solidFill>
+                  </a:tcPr>
+                </a:tc>
+                <a:tc>
+                  <a:txBody>
+                    <a:bodyPr/>
+                    <a:lstStyle>
+                      <a:lvl1pPr algn="l">
+                        <a:spcBef>
+                          <a:spcPct val="20000"/>
+                        </a:spcBef>
+                        <a:buClr>
+                          <a:schemeClr val="bg2"/>
+                        </a:buClr>
+                        <a:buSzPct val="75000"/>
+                        <a:buFont typeface="Monotype Sorts" pitchFamily="2" charset="2"/>
+                        <a:defRPr sz="2800">
+                          <a:solidFill>
+                            <a:schemeClr val="tx1"/>
+                          </a:solidFill>
+                          <a:latin typeface="Times New Roman" pitchFamily="18" charset="0"/>
+                        </a:defRPr>
+                      </a:lvl1pPr>
+                      <a:lvl2pPr algn="l">
+                        <a:spcBef>
+                          <a:spcPct val="20000"/>
+                        </a:spcBef>
+                        <a:buClr>
+                          <a:schemeClr val="bg2"/>
+                        </a:buClr>
+                        <a:buSzPct val="75000"/>
+                        <a:defRPr sz="2400">
+                          <a:solidFill>
+                            <a:schemeClr val="tx1"/>
+                          </a:solidFill>
+                          <a:latin typeface="Times New Roman" pitchFamily="18" charset="0"/>
+                        </a:defRPr>
+                      </a:lvl2pPr>
+                      <a:lvl3pPr algn="l">
+                        <a:spcBef>
+                          <a:spcPct val="20000"/>
+                        </a:spcBef>
+                        <a:buClr>
+                          <a:schemeClr val="bg2"/>
+                        </a:buClr>
+                        <a:buSzPct val="75000"/>
+                        <a:buFont typeface="Monotype Sorts" pitchFamily="2" charset="2"/>
+                        <a:defRPr sz="2000">
+                          <a:solidFill>
+                            <a:schemeClr val="tx1"/>
+                          </a:solidFill>
+                          <a:latin typeface="Times New Roman" pitchFamily="18" charset="0"/>
+                        </a:defRPr>
+                      </a:lvl3pPr>
+                      <a:lvl4pPr algn="l">
+                        <a:spcBef>
+                          <a:spcPct val="20000"/>
+                        </a:spcBef>
+                        <a:buClr>
+                          <a:schemeClr val="bg2"/>
+                        </a:buClr>
+                        <a:buSzPct val="75000"/>
+                        <a:defRPr>
+                          <a:solidFill>
+                            <a:schemeClr val="tx1"/>
+                          </a:solidFill>
+                          <a:latin typeface="Times New Roman" pitchFamily="18" charset="0"/>
+                        </a:defRPr>
+                      </a:lvl4pPr>
+                      <a:lvl5pPr algn="l">
+                        <a:spcBef>
+                          <a:spcPct val="20000"/>
+                        </a:spcBef>
+                        <a:buClr>
+                          <a:schemeClr val="bg2"/>
+                        </a:buClr>
+                        <a:buSzPct val="75000"/>
+                        <a:defRPr>
+                          <a:solidFill>
+                            <a:schemeClr val="tx1"/>
+                          </a:solidFill>
+                          <a:latin typeface="Times New Roman" pitchFamily="18" charset="0"/>
+                        </a:defRPr>
+                      </a:lvl5pPr>
+                      <a:lvl6pPr eaLnBrk="0" fontAlgn="base" hangingPunct="0">
+                        <a:spcBef>
+                          <a:spcPct val="20000"/>
+                        </a:spcBef>
+                        <a:spcAft>
+                          <a:spcPct val="0"/>
+                        </a:spcAft>
+                        <a:buClr>
+                          <a:schemeClr val="bg2"/>
+                        </a:buClr>
+                        <a:buSzPct val="75000"/>
+                        <a:defRPr>
+                          <a:solidFill>
+                            <a:schemeClr val="tx1"/>
+                          </a:solidFill>
+                          <a:latin typeface="Times New Roman" pitchFamily="18" charset="0"/>
+                        </a:defRPr>
+                      </a:lvl6pPr>
+                      <a:lvl7pPr eaLnBrk="0" fontAlgn="base" hangingPunct="0">
+                        <a:spcBef>
+                          <a:spcPct val="20000"/>
+                        </a:spcBef>
+                        <a:spcAft>
+                          <a:spcPct val="0"/>
+                        </a:spcAft>
+                        <a:buClr>
+                          <a:schemeClr val="bg2"/>
+                        </a:buClr>
+                        <a:buSzPct val="75000"/>
+                        <a:defRPr>
+                          <a:solidFill>
+                            <a:schemeClr val="tx1"/>
+                          </a:solidFill>
+                          <a:latin typeface="Times New Roman" pitchFamily="18" charset="0"/>
+                        </a:defRPr>
+                      </a:lvl7pPr>
+                      <a:lvl8pPr eaLnBrk="0" fontAlgn="base" hangingPunct="0">
+                        <a:spcBef>
+                          <a:spcPct val="20000"/>
+                        </a:spcBef>
+                        <a:spcAft>
+                          <a:spcPct val="0"/>
+                        </a:spcAft>
+                        <a:buClr>
+                          <a:schemeClr val="bg2"/>
+                        </a:buClr>
+                        <a:buSzPct val="75000"/>
+                        <a:defRPr>
+                          <a:solidFill>
+                            <a:schemeClr val="tx1"/>
+                          </a:solidFill>
+                          <a:latin typeface="Times New Roman" pitchFamily="18" charset="0"/>
+                        </a:defRPr>
+                      </a:lvl8pPr>
+                      <a:lvl9pPr eaLnBrk="0" fontAlgn="base" hangingPunct="0">
+                        <a:spcBef>
+                          <a:spcPct val="20000"/>
+                        </a:spcBef>
+                        <a:spcAft>
+                          <a:spcPct val="0"/>
+                        </a:spcAft>
+                        <a:buClr>
+                          <a:schemeClr val="bg2"/>
+                        </a:buClr>
+                        <a:buSzPct val="75000"/>
+                        <a:defRPr>
+                          <a:solidFill>
+                            <a:schemeClr val="tx1"/>
+                          </a:solidFill>
+                          <a:latin typeface="Times New Roman" pitchFamily="18" charset="0"/>
+                        </a:defRPr>
+                      </a:lvl9pPr>
+                    </a:lstStyle>
+                    <a:p>
+                      <a:pPr marL="0" marR="0" lvl="0" indent="0" algn="ctr" defTabSz="914400" rtl="0" eaLnBrk="0" fontAlgn="base" latinLnBrk="0" hangingPunct="0">
+                        <a:lnSpc>
+                          <a:spcPct val="100000"/>
+                        </a:lnSpc>
+                        <a:spcBef>
+                          <a:spcPct val="20000"/>
+                        </a:spcBef>
+                        <a:spcAft>
+                          <a:spcPct val="0"/>
+                        </a:spcAft>
+                        <a:buClr>
+                          <a:schemeClr val="bg2"/>
+                        </a:buClr>
+                        <a:buSzPct val="75000"/>
+                        <a:buFont typeface="Monotype Sorts" pitchFamily="2" charset="2"/>
+                        <a:buNone/>
+                        <a:tabLst/>
+                      </a:pPr>
+                      <a:r>
+                        <a:rPr kumimoji="0" lang="es-ES_tradnl" altLang="ca-ES" sz="2400" b="0" i="0" u="none" strike="noStrike" cap="none" normalizeH="0" baseline="0" dirty="0" err="1">
+                          <a:ln>
+                            <a:noFill/>
+                          </a:ln>
+                          <a:solidFill>
+                            <a:schemeClr val="tx1"/>
+                          </a:solidFill>
+                          <a:effectLst/>
+                          <a:latin typeface="+mn-lt"/>
+                        </a:rPr>
+                        <a:t>Type</a:t>
+                      </a:r>
+                      <a:r>
+                        <a:rPr kumimoji="0" lang="es-ES_tradnl" altLang="ca-ES" sz="2400" b="0" i="0" u="none" strike="noStrike" cap="none" normalizeH="0" baseline="0" dirty="0">
+                          <a:ln>
+                            <a:noFill/>
+                          </a:ln>
+                          <a:solidFill>
+                            <a:schemeClr val="tx1"/>
+                          </a:solidFill>
+                          <a:effectLst/>
+                          <a:latin typeface="+mn-lt"/>
+                        </a:rPr>
+                        <a:t> I Error</a:t>
+                      </a:r>
+                    </a:p>
+                    <a:p>
+                      <a:pPr marL="0" marR="0" lvl="0" indent="0" algn="ctr" defTabSz="914400" rtl="0" eaLnBrk="0" fontAlgn="base" latinLnBrk="0" hangingPunct="0">
+                        <a:lnSpc>
+                          <a:spcPct val="100000"/>
+                        </a:lnSpc>
+                        <a:spcBef>
+                          <a:spcPct val="20000"/>
+                        </a:spcBef>
+                        <a:spcAft>
+                          <a:spcPct val="0"/>
+                        </a:spcAft>
+                        <a:buClr>
+                          <a:schemeClr val="bg2"/>
+                        </a:buClr>
+                        <a:buSzPct val="75000"/>
+                        <a:buFont typeface="Monotype Sorts" pitchFamily="2" charset="2"/>
+                        <a:buNone/>
+                        <a:tabLst/>
+                      </a:pPr>
+                      <a:r>
+                        <a:rPr kumimoji="0" lang="es-ES_tradnl" altLang="ca-ES" sz="2400" b="0" i="0" u="none" strike="noStrike" cap="none" normalizeH="0" baseline="0" dirty="0">
+                          <a:ln>
+                            <a:noFill/>
+                          </a:ln>
+                          <a:solidFill>
+                            <a:schemeClr val="tx1"/>
+                          </a:solidFill>
+                          <a:effectLst/>
+                          <a:latin typeface="+mn-lt"/>
+                          <a:sym typeface="Symbol" pitchFamily="18" charset="2"/>
+                        </a:rPr>
+                        <a:t></a:t>
+                      </a:r>
+                      <a:endParaRPr kumimoji="0" lang="es-ES" altLang="ca-ES" sz="2400" b="0" i="0" u="none" strike="noStrike" cap="none" normalizeH="0" baseline="0" dirty="0">
+                        <a:ln>
+                          <a:noFill/>
+                        </a:ln>
+                        <a:solidFill>
+                          <a:schemeClr val="tx1"/>
+                        </a:solidFill>
+                        <a:effectLst/>
+                        <a:latin typeface="+mn-lt"/>
+                      </a:endParaRPr>
+                    </a:p>
+                  </a:txBody>
+                  <a:tcPr marL="99062" marR="99062" marT="45716" marB="45716" horzOverflow="overflow">
+                    <a:lnL w="12700" cap="flat" cmpd="sng" algn="ctr">
+                      <a:solidFill>
+                        <a:schemeClr val="tx1"/>
+                      </a:solidFill>
+                      <a:prstDash val="solid"/>
+                      <a:round/>
+                      <a:headEnd type="none" w="med" len="med"/>
+                      <a:tailEnd type="none" w="med" len="med"/>
+                    </a:lnL>
+                    <a:lnR w="12700" cap="flat" cmpd="sng" algn="ctr">
+                      <a:solidFill>
+                        <a:schemeClr val="tx1"/>
+                      </a:solidFill>
+                      <a:prstDash val="solid"/>
+                      <a:round/>
+                      <a:headEnd type="none" w="med" len="med"/>
+                      <a:tailEnd type="none" w="med" len="med"/>
+                    </a:lnR>
+                    <a:lnT w="12700" cap="flat" cmpd="sng" algn="ctr">
+                      <a:solidFill>
+                        <a:schemeClr val="tx1"/>
+                      </a:solidFill>
+                      <a:prstDash val="solid"/>
+                      <a:round/>
+                      <a:headEnd type="none" w="med" len="med"/>
+                      <a:tailEnd type="none" w="med" len="med"/>
+                    </a:lnT>
+                    <a:lnB w="28575" cap="flat" cmpd="sng" algn="ctr">
+                      <a:solidFill>
+                        <a:schemeClr val="tx1"/>
+                      </a:solidFill>
+                      <a:prstDash val="solid"/>
+                      <a:round/>
+                      <a:headEnd type="none" w="med" len="med"/>
+                      <a:tailEnd type="none" w="med" len="med"/>
+                    </a:lnB>
+                    <a:lnTlToBr>
+                      <a:noFill/>
+                    </a:lnTlToBr>
+                    <a:lnBlToTr>
+                      <a:noFill/>
+                    </a:lnBlToTr>
+                    <a:solidFill>
+                      <a:srgbClr val="FFFF99"/>
+                    </a:solidFill>
+                  </a:tcPr>
+                </a:tc>
+                <a:tc>
+                  <a:txBody>
+                    <a:bodyPr/>
+                    <a:lstStyle>
+                      <a:lvl1pPr algn="l">
+                        <a:spcBef>
+                          <a:spcPct val="20000"/>
+                        </a:spcBef>
+                        <a:buClr>
+                          <a:schemeClr val="bg2"/>
+                        </a:buClr>
+                        <a:buSzPct val="75000"/>
+                        <a:buFont typeface="Monotype Sorts" pitchFamily="2" charset="2"/>
+                        <a:defRPr sz="2800">
+                          <a:solidFill>
+                            <a:schemeClr val="tx1"/>
+                          </a:solidFill>
+                          <a:latin typeface="Times New Roman" pitchFamily="18" charset="0"/>
+                        </a:defRPr>
+                      </a:lvl1pPr>
+                      <a:lvl2pPr algn="l">
+                        <a:spcBef>
+                          <a:spcPct val="20000"/>
+                        </a:spcBef>
+                        <a:buClr>
+                          <a:schemeClr val="bg2"/>
+                        </a:buClr>
+                        <a:buSzPct val="75000"/>
+                        <a:defRPr sz="2400">
+                          <a:solidFill>
+                            <a:schemeClr val="tx1"/>
+                          </a:solidFill>
+                          <a:latin typeface="Times New Roman" pitchFamily="18" charset="0"/>
+                        </a:defRPr>
+                      </a:lvl2pPr>
+                      <a:lvl3pPr algn="l">
+                        <a:spcBef>
+                          <a:spcPct val="20000"/>
+                        </a:spcBef>
+                        <a:buClr>
+                          <a:schemeClr val="bg2"/>
+                        </a:buClr>
+                        <a:buSzPct val="75000"/>
+                        <a:buFont typeface="Monotype Sorts" pitchFamily="2" charset="2"/>
+                        <a:defRPr sz="2000">
+                          <a:solidFill>
+                            <a:schemeClr val="tx1"/>
+                          </a:solidFill>
+                          <a:latin typeface="Times New Roman" pitchFamily="18" charset="0"/>
+                        </a:defRPr>
+                      </a:lvl3pPr>
+                      <a:lvl4pPr algn="l">
+                        <a:spcBef>
+                          <a:spcPct val="20000"/>
+                        </a:spcBef>
+                        <a:buClr>
+                          <a:schemeClr val="bg2"/>
+                        </a:buClr>
+                        <a:buSzPct val="75000"/>
+                        <a:defRPr>
+                          <a:solidFill>
+                            <a:schemeClr val="tx1"/>
+                          </a:solidFill>
+                          <a:latin typeface="Times New Roman" pitchFamily="18" charset="0"/>
+                        </a:defRPr>
+                      </a:lvl4pPr>
+                      <a:lvl5pPr algn="l">
+                        <a:spcBef>
+                          <a:spcPct val="20000"/>
+                        </a:spcBef>
+                        <a:buClr>
+                          <a:schemeClr val="bg2"/>
+                        </a:buClr>
+                        <a:buSzPct val="75000"/>
+                        <a:defRPr>
+                          <a:solidFill>
+                            <a:schemeClr val="tx1"/>
+                          </a:solidFill>
+                          <a:latin typeface="Times New Roman" pitchFamily="18" charset="0"/>
+                        </a:defRPr>
+                      </a:lvl5pPr>
+                      <a:lvl6pPr eaLnBrk="0" fontAlgn="base" hangingPunct="0">
+                        <a:spcBef>
+                          <a:spcPct val="20000"/>
+                        </a:spcBef>
+                        <a:spcAft>
+                          <a:spcPct val="0"/>
+                        </a:spcAft>
+                        <a:buClr>
+                          <a:schemeClr val="bg2"/>
+                        </a:buClr>
+                        <a:buSzPct val="75000"/>
+                        <a:defRPr>
+                          <a:solidFill>
+                            <a:schemeClr val="tx1"/>
+                          </a:solidFill>
+                          <a:latin typeface="Times New Roman" pitchFamily="18" charset="0"/>
+                        </a:defRPr>
+                      </a:lvl6pPr>
+                      <a:lvl7pPr eaLnBrk="0" fontAlgn="base" hangingPunct="0">
+                        <a:spcBef>
+                          <a:spcPct val="20000"/>
+                        </a:spcBef>
+                        <a:spcAft>
+                          <a:spcPct val="0"/>
+                        </a:spcAft>
+                        <a:buClr>
+                          <a:schemeClr val="bg2"/>
+                        </a:buClr>
+                        <a:buSzPct val="75000"/>
+                        <a:defRPr>
+                          <a:solidFill>
+                            <a:schemeClr val="tx1"/>
+                          </a:solidFill>
+                          <a:latin typeface="Times New Roman" pitchFamily="18" charset="0"/>
+                        </a:defRPr>
+                      </a:lvl7pPr>
+                      <a:lvl8pPr eaLnBrk="0" fontAlgn="base" hangingPunct="0">
+                        <a:spcBef>
+                          <a:spcPct val="20000"/>
+                        </a:spcBef>
+                        <a:spcAft>
+                          <a:spcPct val="0"/>
+                        </a:spcAft>
+                        <a:buClr>
+                          <a:schemeClr val="bg2"/>
+                        </a:buClr>
+                        <a:buSzPct val="75000"/>
+                        <a:defRPr>
+                          <a:solidFill>
+                            <a:schemeClr val="tx1"/>
+                          </a:solidFill>
+                          <a:latin typeface="Times New Roman" pitchFamily="18" charset="0"/>
+                        </a:defRPr>
+                      </a:lvl8pPr>
+                      <a:lvl9pPr eaLnBrk="0" fontAlgn="base" hangingPunct="0">
+                        <a:spcBef>
+                          <a:spcPct val="20000"/>
+                        </a:spcBef>
+                        <a:spcAft>
+                          <a:spcPct val="0"/>
+                        </a:spcAft>
+                        <a:buClr>
+                          <a:schemeClr val="bg2"/>
+                        </a:buClr>
+                        <a:buSzPct val="75000"/>
+                        <a:defRPr>
+                          <a:solidFill>
+                            <a:schemeClr val="tx1"/>
+                          </a:solidFill>
+                          <a:latin typeface="Times New Roman" pitchFamily="18" charset="0"/>
+                        </a:defRPr>
+                      </a:lvl9pPr>
+                    </a:lstStyle>
+                    <a:p>
+                      <a:pPr marL="0" marR="0" lvl="0" indent="0" algn="ctr" defTabSz="914400" rtl="0" eaLnBrk="0" fontAlgn="base" latinLnBrk="0" hangingPunct="0">
+                        <a:lnSpc>
+                          <a:spcPct val="100000"/>
+                        </a:lnSpc>
+                        <a:spcBef>
+                          <a:spcPct val="20000"/>
+                        </a:spcBef>
+                        <a:spcAft>
+                          <a:spcPct val="0"/>
+                        </a:spcAft>
+                        <a:buClr>
+                          <a:schemeClr val="bg2"/>
+                        </a:buClr>
+                        <a:buSzPct val="75000"/>
+                        <a:buFont typeface="Monotype Sorts" pitchFamily="2" charset="2"/>
+                        <a:buNone/>
+                        <a:tabLst/>
+                      </a:pPr>
+                      <a:r>
+                        <a:rPr kumimoji="0" lang="es-ES" altLang="ca-ES" sz="4400" b="0" i="0" u="none" strike="noStrike" cap="none" normalizeH="0" baseline="0" dirty="0">
+                          <a:ln>
+                            <a:noFill/>
+                          </a:ln>
+                          <a:solidFill>
+                            <a:schemeClr val="tx1"/>
+                          </a:solidFill>
+                          <a:effectLst/>
+                          <a:latin typeface="+mn-lt"/>
+                          <a:sym typeface="Wingdings" pitchFamily="2" charset="2"/>
+                        </a:rPr>
+                        <a:t></a:t>
+                      </a:r>
+                      <a:endParaRPr kumimoji="0" lang="es-ES_tradnl" altLang="ca-ES" sz="4400" b="0" i="0" u="none" strike="noStrike" cap="none" normalizeH="0" baseline="0" dirty="0">
+                        <a:ln>
+                          <a:noFill/>
+                        </a:ln>
+                        <a:solidFill>
+                          <a:schemeClr val="tx1"/>
+                        </a:solidFill>
+                        <a:effectLst/>
+                        <a:latin typeface="+mn-lt"/>
+                        <a:sym typeface="Wingdings" pitchFamily="2" charset="2"/>
+                      </a:endParaRPr>
+                    </a:p>
+                    <a:p>
+                      <a:pPr marL="0" marR="0" lvl="0" indent="0" algn="ctr" defTabSz="914400" rtl="0" eaLnBrk="0" fontAlgn="base" latinLnBrk="0" hangingPunct="0">
+                        <a:lnSpc>
+                          <a:spcPct val="100000"/>
+                        </a:lnSpc>
+                        <a:spcBef>
+                          <a:spcPct val="20000"/>
+                        </a:spcBef>
+                        <a:spcAft>
+                          <a:spcPct val="0"/>
+                        </a:spcAft>
+                        <a:buClr>
+                          <a:schemeClr val="bg2"/>
+                        </a:buClr>
+                        <a:buSzPct val="75000"/>
+                        <a:buFont typeface="Monotype Sorts" pitchFamily="2" charset="2"/>
+                        <a:buNone/>
+                        <a:tabLst/>
+                      </a:pPr>
+                      <a:r>
+                        <a:rPr kumimoji="0" lang="es-ES_tradnl" altLang="ca-ES" sz="2400" b="0" i="0" u="none" strike="noStrike" cap="none" normalizeH="0" baseline="0" dirty="0" err="1">
+                          <a:ln>
+                            <a:noFill/>
+                          </a:ln>
+                          <a:solidFill>
+                            <a:schemeClr val="tx1"/>
+                          </a:solidFill>
+                          <a:effectLst/>
+                          <a:latin typeface="+mn-lt"/>
+                          <a:sym typeface="Wingdings" pitchFamily="2" charset="2"/>
+                        </a:rPr>
+                        <a:t>Power</a:t>
+                      </a:r>
+                      <a:r>
+                        <a:rPr kumimoji="0" lang="es-ES_tradnl" altLang="ca-ES" sz="2400" b="0" i="0" u="none" strike="noStrike" cap="none" normalizeH="0" baseline="0" dirty="0">
+                          <a:ln>
+                            <a:noFill/>
+                          </a:ln>
+                          <a:solidFill>
+                            <a:schemeClr val="tx1"/>
+                          </a:solidFill>
+                          <a:effectLst/>
+                          <a:latin typeface="+mn-lt"/>
+                          <a:sym typeface="Wingdings" pitchFamily="2" charset="2"/>
+                        </a:rPr>
+                        <a:t> (1- </a:t>
+                      </a:r>
+                      <a:r>
+                        <a:rPr kumimoji="0" lang="es-ES_tradnl" altLang="ca-ES" sz="2400" b="0" i="0" u="none" strike="noStrike" cap="none" normalizeH="0" baseline="0" dirty="0">
+                          <a:ln>
+                            <a:noFill/>
+                          </a:ln>
+                          <a:solidFill>
+                            <a:schemeClr val="tx1"/>
+                          </a:solidFill>
+                          <a:effectLst/>
+                          <a:latin typeface="+mn-lt"/>
+                          <a:sym typeface="Symbol" pitchFamily="18" charset="2"/>
+                        </a:rPr>
+                        <a:t>)</a:t>
+                      </a:r>
+                      <a:endParaRPr kumimoji="0" lang="es-ES" altLang="ca-ES" sz="2400" b="0" i="0" u="none" strike="noStrike" cap="none" normalizeH="0" baseline="0" dirty="0">
+                        <a:ln>
+                          <a:noFill/>
+                        </a:ln>
+                        <a:solidFill>
+                          <a:schemeClr val="tx1"/>
+                        </a:solidFill>
+                        <a:effectLst/>
+                        <a:latin typeface="+mn-lt"/>
+                        <a:sym typeface="Symbol" pitchFamily="18" charset="2"/>
+                      </a:endParaRPr>
+                    </a:p>
+                  </a:txBody>
+                  <a:tcPr marL="99062" marR="99062" marT="45716" marB="45716" horzOverflow="overflow">
+                    <a:lnL w="12700" cap="flat" cmpd="sng" algn="ctr">
+                      <a:solidFill>
+                        <a:schemeClr val="tx1"/>
+                      </a:solidFill>
+                      <a:prstDash val="solid"/>
+                      <a:round/>
+                      <a:headEnd type="none" w="med" len="med"/>
+                      <a:tailEnd type="none" w="med" len="med"/>
+                    </a:lnL>
+                    <a:lnR w="28575" cap="flat" cmpd="sng" algn="ctr">
+                      <a:solidFill>
+                        <a:schemeClr val="tx1"/>
+                      </a:solidFill>
+                      <a:prstDash val="solid"/>
+                      <a:round/>
+                      <a:headEnd type="none" w="med" len="med"/>
+                      <a:tailEnd type="none" w="med" len="med"/>
+                    </a:lnR>
+                    <a:lnT w="12700" cap="flat" cmpd="sng" algn="ctr">
+                      <a:solidFill>
+                        <a:schemeClr val="tx1"/>
+                      </a:solidFill>
+                      <a:prstDash val="solid"/>
+                      <a:round/>
+                      <a:headEnd type="none" w="med" len="med"/>
+                      <a:tailEnd type="none" w="med" len="med"/>
+                    </a:lnT>
+                    <a:lnB w="28575" cap="flat" cmpd="sng" algn="ctr">
+                      <a:solidFill>
+                        <a:schemeClr val="tx1"/>
+                      </a:solidFill>
+                      <a:prstDash val="solid"/>
+                      <a:round/>
+                      <a:headEnd type="none" w="med" len="med"/>
+                      <a:tailEnd type="none" w="med" len="med"/>
+                    </a:lnB>
+                    <a:lnTlToBr>
+                      <a:noFill/>
+                    </a:lnTlToBr>
+                    <a:lnBlToTr>
+                      <a:noFill/>
+                    </a:lnBlToTr>
+                    <a:solidFill>
+                      <a:srgbClr val="FFFF99"/>
+                    </a:solidFill>
+                  </a:tcPr>
+                </a:tc>
+                <a:extLst>
+                  <a:ext uri="{0D108BD9-81ED-4DB2-BD59-A6C34878D82A}">
+                    <a16:rowId xmlns:a16="http://schemas.microsoft.com/office/drawing/2014/main" val="10002"/>
+                  </a:ext>
+                </a:extLst>
+              </a:tr>
+            </a:tbl>
+          </a:graphicData>
+        </a:graphic>
+      </p:graphicFrame>
+      <p:sp>
+        <p:nvSpPr>
+          <p:cNvPr id="53268" name="Títol 1">
+            <a:extLst>
+              <a:ext uri="{FF2B5EF4-FFF2-40B4-BE49-F238E27FC236}">
+                <a16:creationId xmlns:a16="http://schemas.microsoft.com/office/drawing/2014/main" id="{C249668B-5206-4AC3-8FBD-ED0FE3B14BBF}"/>
+              </a:ext>
+            </a:extLst>
+          </p:cNvPr>
+          <p:cNvSpPr>
+            <a:spLocks noGrp="1"/>
+          </p:cNvSpPr>
+          <p:nvPr>
+            <p:ph type="title"/>
+          </p:nvPr>
+        </p:nvSpPr>
+        <p:spPr bwMode="auto">
+          <a:noFill/>
+          <a:extLst>
+            <a:ext uri="{909E8E84-426E-40DD-AFC4-6F175D3DCCD1}">
+              <a14:hiddenFill xmlns:a14="http://schemas.microsoft.com/office/drawing/2010/main">
+                <a:solidFill>
+                  <a:srgbClr val="FFFFFF"/>
+                </a:solidFill>
+              </a14:hiddenFill>
+            </a:ext>
+            <a:ext uri="{91240B29-F687-4F45-9708-019B960494DF}">
+              <a14:hiddenLine xmlns:a14="http://schemas.microsoft.com/office/drawing/2010/main" w="9525">
+                <a:solidFill>
+                  <a:srgbClr val="000000"/>
+                </a:solidFill>
+                <a:miter lim="800000"/>
+                <a:headEnd/>
+                <a:tailEnd/>
+              </a14:hiddenLine>
+            </a:ext>
+          </a:extLst>
+        </p:spPr>
+        <p:txBody>
+          <a:bodyPr vert="horz" wrap="square" lIns="91440" tIns="45720" rIns="91440" bIns="45720" numCol="1" anchor="t" anchorCtr="0" compatLnSpc="1">
+            <a:prstTxWarp prst="textNoShape">
+              <a:avLst/>
+            </a:prstTxWarp>
+          </a:bodyPr>
+          <a:lstStyle/>
+          <a:p>
+            <a:r>
+              <a:rPr lang="ca-ES" altLang="ca-ES" dirty="0" err="1"/>
+              <a:t>Recall</a:t>
+            </a:r>
+            <a:r>
+              <a:rPr lang="ca-ES" altLang="ca-ES" dirty="0"/>
+              <a:t>: </a:t>
+            </a:r>
+            <a:r>
+              <a:rPr lang="ca-ES" altLang="ca-ES" dirty="0" err="1"/>
+              <a:t>Truth</a:t>
+            </a:r>
+            <a:r>
+              <a:rPr lang="ca-ES" altLang="ca-ES" dirty="0"/>
+              <a:t>, </a:t>
+            </a:r>
+            <a:r>
+              <a:rPr lang="ca-ES" altLang="ca-ES" dirty="0" err="1"/>
+              <a:t>Decision</a:t>
+            </a:r>
+            <a:r>
+              <a:rPr lang="ca-ES" altLang="ca-ES" dirty="0"/>
+              <a:t>, Errors</a:t>
+            </a:r>
+          </a:p>
+        </p:txBody>
+      </p:sp>
+      <p:cxnSp>
+        <p:nvCxnSpPr>
+          <p:cNvPr id="3" name="Conector recto de flecha 2">
+            <a:extLst>
+              <a:ext uri="{FF2B5EF4-FFF2-40B4-BE49-F238E27FC236}">
+                <a16:creationId xmlns:a16="http://schemas.microsoft.com/office/drawing/2014/main" id="{82B2DB22-0AC9-428A-8BE3-51F90DA96E98}"/>
+              </a:ext>
+            </a:extLst>
+          </p:cNvPr>
+          <p:cNvCxnSpPr/>
+          <p:nvPr/>
+        </p:nvCxnSpPr>
+        <p:spPr bwMode="auto">
+          <a:xfrm>
+            <a:off x="4088904" y="2420888"/>
+            <a:ext cx="0" cy="360040"/>
+          </a:xfrm>
+          <a:prstGeom prst="straightConnector1">
+            <a:avLst/>
+          </a:prstGeom>
+          <a:noFill/>
+          <a:ln w="19050" cap="flat" cmpd="sng" algn="ctr">
+            <a:solidFill>
+              <a:schemeClr val="bg1"/>
+            </a:solidFill>
+            <a:prstDash val="solid"/>
+            <a:round/>
+            <a:headEnd type="none" w="med" len="med"/>
+            <a:tailEnd type="triangle"/>
+          </a:ln>
+          <a:effectLst/>
+        </p:spPr>
+      </p:cxnSp>
+    </p:spTree>
+  </p:cSld>
+  <p:clrMapOvr>
+    <a:masterClrMapping/>
+  </p:clrMapOvr>
+</p:sld>
+</file>
+
+<file path=ppt/slides/slide25.xml><?xml version="1.0" encoding="utf-8"?>
+<p:sld xmlns:a="http://schemas.openxmlformats.org/drawingml/2006/main" xmlns:r="http://schemas.openxmlformats.org/officeDocument/2006/relationships" xmlns:p="http://schemas.openxmlformats.org/presentationml/2006/main">
+  <p:cSld>
+    <p:spTree>
+      <p:nvGrpSpPr>
+        <p:cNvPr id="1" name=""/>
+        <p:cNvGrpSpPr/>
+        <p:nvPr/>
+      </p:nvGrpSpPr>
+      <p:grpSpPr>
+        <a:xfrm>
+          <a:off x="0" y="0"/>
+          <a:ext cx="0" cy="0"/>
+          <a:chOff x="0" y="0"/>
+          <a:chExt cx="0" cy="0"/>
+        </a:xfrm>
+      </p:grpSpPr>
+      <p:sp>
+        <p:nvSpPr>
+          <p:cNvPr id="4" name="Marcador de contenido 3">
+            <a:extLst>
+              <a:ext uri="{FF2B5EF4-FFF2-40B4-BE49-F238E27FC236}">
+                <a16:creationId xmlns:a16="http://schemas.microsoft.com/office/drawing/2014/main" id="{75A2F289-C7DC-450A-A3D6-BBE4E6670C3C}"/>
+              </a:ext>
+            </a:extLst>
+          </p:cNvPr>
+          <p:cNvSpPr>
+            <a:spLocks noGrp="1"/>
+          </p:cNvSpPr>
+          <p:nvPr>
+            <p:ph idx="1"/>
+          </p:nvPr>
+        </p:nvSpPr>
+        <p:spPr>
+          <a:xfrm>
+            <a:off x="495300" y="1417638"/>
+            <a:ext cx="8915400" cy="4708525"/>
+          </a:xfrm>
+        </p:spPr>
+        <p:txBody>
+          <a:bodyPr/>
+          <a:lstStyle/>
+          <a:p>
+            <a:r>
+              <a:rPr lang="en-US" dirty="0"/>
+              <a:t>The power of a test describes the probability of correctly rejecting the null hypothesis that is, rejecting H</a:t>
+            </a:r>
+            <a:r>
+              <a:rPr lang="en-US" baseline="-25000" dirty="0"/>
+              <a:t>0</a:t>
+            </a:r>
+            <a:r>
+              <a:rPr lang="en-US" dirty="0"/>
+              <a:t> when it is false.</a:t>
+            </a:r>
+          </a:p>
+          <a:p>
+            <a:r>
+              <a:rPr lang="en-US" dirty="0"/>
+              <a:t>A good test “controls” the probability of type I error and has a power “as big as possible”.</a:t>
+            </a:r>
+          </a:p>
+          <a:p>
+            <a:pPr lvl="1"/>
+            <a:r>
+              <a:rPr lang="en-US" dirty="0"/>
+              <a:t>Control of type I error is warranted by the way the test is built (with a given high confidence).</a:t>
+            </a:r>
+          </a:p>
+          <a:p>
+            <a:pPr lvl="1"/>
+            <a:r>
+              <a:rPr lang="en-US" dirty="0"/>
+              <a:t>Power cannot be warranted but it depends on</a:t>
+            </a:r>
+          </a:p>
+          <a:p>
+            <a:pPr lvl="2"/>
+            <a:r>
+              <a:rPr lang="en-US" dirty="0"/>
+              <a:t>The minimum difference to be detected by the test</a:t>
+            </a:r>
+          </a:p>
+          <a:p>
+            <a:pPr lvl="2"/>
+            <a:r>
+              <a:rPr lang="en-US" dirty="0"/>
+              <a:t>The sample size</a:t>
+            </a:r>
+          </a:p>
+          <a:p>
+            <a:pPr lvl="2"/>
+            <a:r>
+              <a:rPr lang="en-US" dirty="0"/>
+              <a:t>The population variability</a:t>
+            </a:r>
+          </a:p>
+        </p:txBody>
+      </p:sp>
+      <p:sp>
+        <p:nvSpPr>
+          <p:cNvPr id="3" name="Título 2">
+            <a:extLst>
+              <a:ext uri="{FF2B5EF4-FFF2-40B4-BE49-F238E27FC236}">
+                <a16:creationId xmlns:a16="http://schemas.microsoft.com/office/drawing/2014/main" id="{CA6C149F-FE10-4F73-A3C9-650C9CB500D6}"/>
+              </a:ext>
+            </a:extLst>
+          </p:cNvPr>
+          <p:cNvSpPr>
+            <a:spLocks noGrp="1"/>
+          </p:cNvSpPr>
+          <p:nvPr>
+            <p:ph type="title"/>
+          </p:nvPr>
+        </p:nvSpPr>
+        <p:spPr/>
+        <p:txBody>
+          <a:bodyPr/>
+          <a:lstStyle/>
+          <a:p>
+            <a:r>
+              <a:rPr lang="ca-ES" dirty="0" err="1"/>
+              <a:t>Concept</a:t>
+            </a:r>
+            <a:r>
+              <a:rPr lang="ca-ES" dirty="0"/>
+              <a:t> </a:t>
+            </a:r>
+            <a:r>
+              <a:rPr lang="ca-ES" dirty="0" err="1"/>
+              <a:t>review</a:t>
+            </a:r>
+            <a:r>
+              <a:rPr lang="ca-ES" dirty="0"/>
+              <a:t>: </a:t>
+            </a:r>
+            <a:r>
+              <a:rPr lang="ca-ES" dirty="0" err="1"/>
+              <a:t>Power</a:t>
+            </a:r>
+            <a:endParaRPr lang="ca-ES" dirty="0"/>
+          </a:p>
+        </p:txBody>
+      </p:sp>
+    </p:spTree>
+    <p:extLst>
+      <p:ext uri="{BB962C8B-B14F-4D97-AF65-F5344CB8AC3E}">
+        <p14:creationId xmlns:p14="http://schemas.microsoft.com/office/powerpoint/2010/main" val="94835319"/>
+      </p:ext>
+    </p:extLst>
+  </p:cSld>
+  <p:clrMapOvr>
+    <a:masterClrMapping/>
+  </p:clrMapOvr>
+</p:sld>
+</file>
+
+<file path=ppt/slides/slide26.xml><?xml version="1.0" encoding="utf-8"?>
+<p:sld xmlns:a="http://schemas.openxmlformats.org/drawingml/2006/main" xmlns:r="http://schemas.openxmlformats.org/officeDocument/2006/relationships" xmlns:p="http://schemas.openxmlformats.org/presentationml/2006/main">
+  <p:cSld>
+    <p:spTree>
+      <p:nvGrpSpPr>
+        <p:cNvPr id="1" name=""/>
+        <p:cNvGrpSpPr/>
+        <p:nvPr/>
+      </p:nvGrpSpPr>
+      <p:grpSpPr>
+        <a:xfrm>
+          <a:off x="0" y="0"/>
+          <a:ext cx="0" cy="0"/>
+          <a:chOff x="0" y="0"/>
+          <a:chExt cx="0" cy="0"/>
+        </a:xfrm>
+      </p:grpSpPr>
+      <p:sp>
+        <p:nvSpPr>
+          <p:cNvPr id="2" name="Marcador de contenido 1">
+            <a:extLst>
+              <a:ext uri="{FF2B5EF4-FFF2-40B4-BE49-F238E27FC236}">
+                <a16:creationId xmlns:a16="http://schemas.microsoft.com/office/drawing/2014/main" id="{14C9049A-6E88-4591-AF4F-98483222855B}"/>
+              </a:ext>
+            </a:extLst>
+          </p:cNvPr>
+          <p:cNvSpPr>
+            <a:spLocks noGrp="1"/>
+          </p:cNvSpPr>
+          <p:nvPr>
+            <p:ph idx="1"/>
+          </p:nvPr>
+        </p:nvSpPr>
+        <p:spPr>
+          <a:xfrm>
+            <a:off x="495300" y="1268760"/>
+            <a:ext cx="9138220" cy="4857403"/>
+          </a:xfrm>
+        </p:spPr>
+        <p:txBody>
+          <a:bodyPr/>
+          <a:lstStyle/>
+          <a:p>
+            <a:r>
+              <a:rPr lang="en-US" dirty="0"/>
+              <a:t>Power cannot be warranted simultaneously with type I error but it depends on:</a:t>
+            </a:r>
+          </a:p>
+          <a:p>
+            <a:pPr lvl="1"/>
+            <a:r>
+              <a:rPr lang="en-US" dirty="0"/>
+              <a:t>The minimum difference to be detected by the test</a:t>
+            </a:r>
+          </a:p>
+          <a:p>
+            <a:pPr lvl="2"/>
+            <a:r>
+              <a:rPr lang="en-US" i="1" dirty="0"/>
+              <a:t>The bigger the minimum difference </a:t>
+            </a:r>
+            <a:r>
+              <a:rPr lang="en-US" i="1" dirty="0">
+                <a:sym typeface="Wingdings" panose="05000000000000000000" pitchFamily="2" charset="2"/>
+              </a:rPr>
+              <a:t></a:t>
+            </a:r>
+            <a:r>
+              <a:rPr lang="en-US" i="1" dirty="0"/>
+              <a:t> the bigger the power</a:t>
+            </a:r>
+          </a:p>
+          <a:p>
+            <a:pPr lvl="1"/>
+            <a:r>
+              <a:rPr lang="en-US" dirty="0"/>
+              <a:t>The sample size</a:t>
+            </a:r>
+          </a:p>
+          <a:p>
+            <a:pPr lvl="2"/>
+            <a:r>
+              <a:rPr lang="en-US" i="1" dirty="0"/>
+              <a:t>The bigger the sample size </a:t>
+            </a:r>
+            <a:r>
+              <a:rPr lang="en-US" i="1" dirty="0">
+                <a:sym typeface="Wingdings" panose="05000000000000000000" pitchFamily="2" charset="2"/>
+              </a:rPr>
+              <a:t> The bigger the power</a:t>
+            </a:r>
+            <a:endParaRPr lang="en-US" i="1" dirty="0"/>
+          </a:p>
+          <a:p>
+            <a:pPr lvl="1"/>
+            <a:r>
+              <a:rPr lang="en-US" dirty="0"/>
+              <a:t>The population variability</a:t>
+            </a:r>
+          </a:p>
+          <a:p>
+            <a:pPr lvl="2"/>
+            <a:r>
+              <a:rPr lang="en-US" i="1" dirty="0"/>
+              <a:t>The bigger the variability </a:t>
+            </a:r>
+            <a:r>
+              <a:rPr lang="en-US" i="1" dirty="0">
+                <a:sym typeface="Wingdings" panose="05000000000000000000" pitchFamily="2" charset="2"/>
+              </a:rPr>
+              <a:t> The smaller the power</a:t>
+            </a:r>
+          </a:p>
+          <a:p>
+            <a:r>
+              <a:rPr lang="en-US" dirty="0">
+                <a:sym typeface="Wingdings" panose="05000000000000000000" pitchFamily="2" charset="2"/>
+              </a:rPr>
+              <a:t>Usually three of the previous four are set and the fourth is computed. 	</a:t>
+            </a:r>
+          </a:p>
+          <a:p>
+            <a:pPr lvl="1"/>
+            <a:r>
+              <a:rPr lang="en-US" dirty="0">
+                <a:sym typeface="Wingdings" panose="05000000000000000000" pitchFamily="2" charset="2"/>
+              </a:rPr>
+              <a:t>This is called </a:t>
+            </a:r>
+            <a:r>
+              <a:rPr lang="en-US" b="1" dirty="0">
+                <a:sym typeface="Wingdings" panose="05000000000000000000" pitchFamily="2" charset="2"/>
+              </a:rPr>
+              <a:t>“power analysis”</a:t>
+            </a:r>
+            <a:endParaRPr lang="en-US" b="1" dirty="0"/>
+          </a:p>
+          <a:p>
+            <a:endParaRPr lang="ca-ES" dirty="0"/>
+          </a:p>
+        </p:txBody>
+      </p:sp>
+      <p:sp>
+        <p:nvSpPr>
+          <p:cNvPr id="3" name="Título 2">
+            <a:extLst>
+              <a:ext uri="{FF2B5EF4-FFF2-40B4-BE49-F238E27FC236}">
+                <a16:creationId xmlns:a16="http://schemas.microsoft.com/office/drawing/2014/main" id="{0D051E2B-787A-4E2B-8022-3E0AFC61A60E}"/>
+              </a:ext>
+            </a:extLst>
+          </p:cNvPr>
+          <p:cNvSpPr>
+            <a:spLocks noGrp="1"/>
+          </p:cNvSpPr>
+          <p:nvPr>
+            <p:ph type="title"/>
+          </p:nvPr>
+        </p:nvSpPr>
+        <p:spPr/>
+        <p:txBody>
+          <a:bodyPr/>
+          <a:lstStyle/>
+          <a:p>
+            <a:r>
+              <a:rPr lang="en-US" dirty="0"/>
+              <a:t>Factors affecting power</a:t>
+            </a:r>
+          </a:p>
+        </p:txBody>
+      </p:sp>
+    </p:spTree>
+    <p:extLst>
+      <p:ext uri="{BB962C8B-B14F-4D97-AF65-F5344CB8AC3E}">
+        <p14:creationId xmlns:p14="http://schemas.microsoft.com/office/powerpoint/2010/main" val="3919149160"/>
+      </p:ext>
+    </p:extLst>
+  </p:cSld>
+  <p:clrMapOvr>
+    <a:masterClrMapping/>
+  </p:clrMapOvr>
+</p:sld>
+</file>
+
+<file path=ppt/slides/slide27.xml><?xml version="1.0" encoding="utf-8"?>
+<p:sld xmlns:a="http://schemas.openxmlformats.org/drawingml/2006/main" xmlns:r="http://schemas.openxmlformats.org/officeDocument/2006/relationships" xmlns:p="http://schemas.openxmlformats.org/presentationml/2006/main">
+  <p:cSld>
+    <p:spTree>
+      <p:nvGrpSpPr>
+        <p:cNvPr id="1" name=""/>
+        <p:cNvGrpSpPr/>
+        <p:nvPr/>
+      </p:nvGrpSpPr>
+      <p:grpSpPr>
+        <a:xfrm>
+          <a:off x="0" y="0"/>
+          <a:ext cx="0" cy="0"/>
+          <a:chOff x="0" y="0"/>
+          <a:chExt cx="0" cy="0"/>
+        </a:xfrm>
+      </p:grpSpPr>
+      <p:sp>
+        <p:nvSpPr>
+          <p:cNvPr id="2" name="Marcador de contenido 1">
+            <a:extLst>
+              <a:ext uri="{FF2B5EF4-FFF2-40B4-BE49-F238E27FC236}">
+                <a16:creationId xmlns:a16="http://schemas.microsoft.com/office/drawing/2014/main" id="{29EB119F-3898-43B9-B9A0-FB342095A87C}"/>
+              </a:ext>
+            </a:extLst>
+          </p:cNvPr>
+          <p:cNvSpPr>
+            <a:spLocks noGrp="1"/>
+          </p:cNvSpPr>
+          <p:nvPr>
+            <p:ph idx="1"/>
+          </p:nvPr>
+        </p:nvSpPr>
+        <p:spPr>
+          <a:xfrm>
+            <a:off x="495300" y="1268760"/>
+            <a:ext cx="8915400" cy="4857403"/>
+          </a:xfrm>
+        </p:spPr>
+        <p:txBody>
+          <a:bodyPr/>
+          <a:lstStyle/>
+          <a:p>
+            <a:r>
+              <a:rPr lang="en-US" b="1" dirty="0"/>
+              <a:t>What is the minimum sample size needed </a:t>
+            </a:r>
+            <a:r>
+              <a:rPr lang="en-US" dirty="0"/>
+              <a:t>to detect </a:t>
+            </a:r>
+            <a:r>
+              <a:rPr lang="en-US" i="1" dirty="0"/>
+              <a:t>a difference of at least 5 </a:t>
+            </a:r>
+            <a:r>
+              <a:rPr lang="en-US" dirty="0"/>
+              <a:t>among two groups whose </a:t>
+            </a:r>
+            <a:r>
+              <a:rPr lang="en-US" i="1" dirty="0"/>
+              <a:t>standard deviation is 10 </a:t>
+            </a:r>
+            <a:r>
+              <a:rPr lang="en-US" dirty="0"/>
+              <a:t>if one wishes </a:t>
+            </a:r>
+            <a:r>
+              <a:rPr lang="en-US" i="1" dirty="0"/>
+              <a:t>to attain a power of 0.75</a:t>
+            </a:r>
+            <a:r>
+              <a:rPr lang="en-US" dirty="0"/>
+              <a:t>?</a:t>
+            </a:r>
+          </a:p>
+          <a:p>
+            <a:r>
+              <a:rPr lang="en-US" b="1" dirty="0"/>
+              <a:t>What is the power attained </a:t>
+            </a:r>
+            <a:r>
+              <a:rPr lang="en-US" dirty="0"/>
+              <a:t>if one uses a </a:t>
+            </a:r>
+            <a:r>
+              <a:rPr lang="en-US" i="1" dirty="0"/>
+              <a:t>sample size of 20 </a:t>
+            </a:r>
+            <a:r>
+              <a:rPr lang="en-US" dirty="0"/>
+              <a:t>(per group) to detect a </a:t>
+            </a:r>
+            <a:r>
+              <a:rPr lang="en-US" i="1" dirty="0"/>
+              <a:t>minimum difference of 5 </a:t>
+            </a:r>
+            <a:r>
+              <a:rPr lang="en-US" dirty="0"/>
+              <a:t>between two groups assuming that </a:t>
+            </a:r>
+            <a:r>
+              <a:rPr lang="en-US" i="1" dirty="0"/>
+              <a:t>the standard deviation (in both groups) is 10</a:t>
+            </a:r>
+            <a:r>
+              <a:rPr lang="en-US" dirty="0"/>
+              <a:t>.</a:t>
+            </a:r>
+          </a:p>
+        </p:txBody>
+      </p:sp>
+      <p:sp>
+        <p:nvSpPr>
+          <p:cNvPr id="3" name="Título 2">
+            <a:extLst>
+              <a:ext uri="{FF2B5EF4-FFF2-40B4-BE49-F238E27FC236}">
+                <a16:creationId xmlns:a16="http://schemas.microsoft.com/office/drawing/2014/main" id="{D68D4490-F77E-45BC-9DEE-6F3AED4162D8}"/>
+              </a:ext>
+            </a:extLst>
+          </p:cNvPr>
+          <p:cNvSpPr>
+            <a:spLocks noGrp="1"/>
+          </p:cNvSpPr>
+          <p:nvPr>
+            <p:ph type="title"/>
+          </p:nvPr>
+        </p:nvSpPr>
+        <p:spPr>
+          <a:xfrm>
+            <a:off x="495300" y="274638"/>
+            <a:ext cx="8915400" cy="922114"/>
+          </a:xfrm>
+        </p:spPr>
+        <p:txBody>
+          <a:bodyPr/>
+          <a:lstStyle/>
+          <a:p>
+            <a:r>
+              <a:rPr lang="en-US" dirty="0"/>
+              <a:t>Some examples using R</a:t>
+            </a:r>
+          </a:p>
+        </p:txBody>
+      </p:sp>
+    </p:spTree>
+    <p:extLst>
+      <p:ext uri="{BB962C8B-B14F-4D97-AF65-F5344CB8AC3E}">
+        <p14:creationId xmlns:p14="http://schemas.microsoft.com/office/powerpoint/2010/main" val="1110342653"/>
+      </p:ext>
+    </p:extLst>
+  </p:cSld>
+  <p:clrMapOvr>
+    <a:masterClrMapping/>
+  </p:clrMapOvr>
+</p:sld>
+</file>
+
+<file path=ppt/slides/slide28.xml><?xml version="1.0" encoding="utf-8"?>
+<p:sld xmlns:a="http://schemas.openxmlformats.org/drawingml/2006/main" xmlns:r="http://schemas.openxmlformats.org/officeDocument/2006/relationships" xmlns:p="http://schemas.openxmlformats.org/presentationml/2006/main">
+  <p:cSld>
+    <p:spTree>
+      <p:nvGrpSpPr>
+        <p:cNvPr id="1" name=""/>
+        <p:cNvGrpSpPr/>
+        <p:nvPr/>
+      </p:nvGrpSpPr>
+      <p:grpSpPr>
+        <a:xfrm>
+          <a:off x="0" y="0"/>
+          <a:ext cx="0" cy="0"/>
+          <a:chOff x="0" y="0"/>
+          <a:chExt cx="0" cy="0"/>
+        </a:xfrm>
+      </p:grpSpPr>
+      <p:sp>
+        <p:nvSpPr>
+          <p:cNvPr id="3" name="Título 2">
+            <a:extLst>
+              <a:ext uri="{FF2B5EF4-FFF2-40B4-BE49-F238E27FC236}">
+                <a16:creationId xmlns:a16="http://schemas.microsoft.com/office/drawing/2014/main" id="{A568C9BD-1C10-4529-A532-FE645B48FC58}"/>
+              </a:ext>
+            </a:extLst>
+          </p:cNvPr>
+          <p:cNvSpPr>
+            <a:spLocks noGrp="1"/>
+          </p:cNvSpPr>
+          <p:nvPr>
+            <p:ph type="title"/>
+          </p:nvPr>
+        </p:nvSpPr>
+        <p:spPr/>
+        <p:txBody>
+          <a:bodyPr/>
+          <a:lstStyle/>
+          <a:p>
+            <a:r>
+              <a:rPr lang="en-US" dirty="0"/>
+              <a:t>Some examples using R</a:t>
+            </a:r>
+          </a:p>
+        </p:txBody>
+      </p:sp>
+      <p:sp>
+        <p:nvSpPr>
+          <p:cNvPr id="5" name="Marcador de texto 4">
+            <a:extLst>
+              <a:ext uri="{FF2B5EF4-FFF2-40B4-BE49-F238E27FC236}">
+                <a16:creationId xmlns:a16="http://schemas.microsoft.com/office/drawing/2014/main" id="{7FEDFCC6-2391-4A9D-9252-A5EE06A32D1E}"/>
+              </a:ext>
+            </a:extLst>
+          </p:cNvPr>
+          <p:cNvSpPr>
+            <a:spLocks noGrp="1"/>
+          </p:cNvSpPr>
+          <p:nvPr>
+            <p:ph type="body" idx="1"/>
+          </p:nvPr>
+        </p:nvSpPr>
+        <p:spPr>
+          <a:xfrm>
+            <a:off x="606095" y="1114420"/>
+            <a:ext cx="4376738" cy="442372"/>
+          </a:xfrm>
+        </p:spPr>
+        <p:txBody>
+          <a:bodyPr/>
+          <a:lstStyle/>
+          <a:p>
+            <a:r>
+              <a:rPr lang="en-US" dirty="0"/>
+              <a:t>Sample size from power</a:t>
+            </a:r>
+          </a:p>
+        </p:txBody>
+      </p:sp>
+      <p:pic>
+        <p:nvPicPr>
+          <p:cNvPr id="4" name="Imagen 3">
+            <a:extLst>
+              <a:ext uri="{FF2B5EF4-FFF2-40B4-BE49-F238E27FC236}">
+                <a16:creationId xmlns:a16="http://schemas.microsoft.com/office/drawing/2014/main" id="{963A5179-F0A1-4DB0-BCF7-5F158D13AD9F}"/>
+              </a:ext>
+            </a:extLst>
+          </p:cNvPr>
+          <p:cNvPicPr>
+            <a:picLocks noChangeAspect="1"/>
+          </p:cNvPicPr>
+          <p:nvPr/>
+        </p:nvPicPr>
+        <p:blipFill>
+          <a:blip r:embed="rId2"/>
+          <a:stretch>
+            <a:fillRect/>
+          </a:stretch>
+        </p:blipFill>
+        <p:spPr>
+          <a:xfrm>
+            <a:off x="848544" y="1628800"/>
+            <a:ext cx="2924638" cy="1670293"/>
+          </a:xfrm>
+          <a:prstGeom prst="rect">
+            <a:avLst/>
+          </a:prstGeom>
+        </p:spPr>
+      </p:pic>
+      <p:pic>
+        <p:nvPicPr>
+          <p:cNvPr id="9" name="Imagen 8">
+            <a:extLst>
+              <a:ext uri="{FF2B5EF4-FFF2-40B4-BE49-F238E27FC236}">
+                <a16:creationId xmlns:a16="http://schemas.microsoft.com/office/drawing/2014/main" id="{42DB2C08-C55C-4259-A71F-313D708BFFEC}"/>
+              </a:ext>
+            </a:extLst>
+          </p:cNvPr>
+          <p:cNvPicPr>
+            <a:picLocks noChangeAspect="1"/>
+          </p:cNvPicPr>
+          <p:nvPr/>
+        </p:nvPicPr>
+        <p:blipFill>
+          <a:blip r:embed="rId3"/>
+          <a:stretch>
+            <a:fillRect/>
+          </a:stretch>
+        </p:blipFill>
+        <p:spPr>
+          <a:xfrm>
+            <a:off x="4664968" y="1556792"/>
+            <a:ext cx="4492458" cy="4485371"/>
+          </a:xfrm>
+          <a:prstGeom prst="rect">
+            <a:avLst/>
+          </a:prstGeom>
+        </p:spPr>
+      </p:pic>
+      <p:sp>
+        <p:nvSpPr>
+          <p:cNvPr id="10" name="Rectángulo 9">
+            <a:extLst>
+              <a:ext uri="{FF2B5EF4-FFF2-40B4-BE49-F238E27FC236}">
+                <a16:creationId xmlns:a16="http://schemas.microsoft.com/office/drawing/2014/main" id="{522628E4-EF1A-4EE0-89CE-D6F54A25CB9F}"/>
+              </a:ext>
+            </a:extLst>
+          </p:cNvPr>
+          <p:cNvSpPr/>
+          <p:nvPr/>
+        </p:nvSpPr>
+        <p:spPr>
+          <a:xfrm>
+            <a:off x="823138" y="3717032"/>
+            <a:ext cx="3340596" cy="2123658"/>
+          </a:xfrm>
+          <a:prstGeom prst="rect">
+            <a:avLst/>
+          </a:prstGeom>
+        </p:spPr>
+        <p:txBody>
+          <a:bodyPr wrap="square">
+            <a:spAutoFit/>
+          </a:bodyPr>
+          <a:lstStyle/>
+          <a:p>
+            <a:r>
+              <a:rPr lang="en-US" sz="1200" u="none" dirty="0">
+                <a:latin typeface="Courier New" panose="02070309020205020404" pitchFamily="49" charset="0"/>
+                <a:cs typeface="Courier New" panose="02070309020205020404" pitchFamily="49" charset="0"/>
+              </a:rPr>
+              <a:t>Assumptions</a:t>
+            </a:r>
+          </a:p>
+          <a:p>
+            <a:r>
+              <a:rPr lang="en-US" sz="1200" u="none" dirty="0">
+                <a:latin typeface="Courier New" panose="02070309020205020404" pitchFamily="49" charset="0"/>
+                <a:cs typeface="Courier New" panose="02070309020205020404" pitchFamily="49" charset="0"/>
+              </a:rPr>
+              <a:t>Difference in means            5</a:t>
+            </a:r>
+          </a:p>
+          <a:p>
+            <a:r>
+              <a:rPr lang="en-US" sz="1200" u="none" dirty="0">
+                <a:latin typeface="Courier New" panose="02070309020205020404" pitchFamily="49" charset="0"/>
+                <a:cs typeface="Courier New" panose="02070309020205020404" pitchFamily="49" charset="0"/>
+              </a:rPr>
+              <a:t>Standard deviation            10</a:t>
+            </a:r>
+          </a:p>
+          <a:p>
+            <a:r>
+              <a:rPr lang="en-US" sz="1200" u="none" dirty="0">
+                <a:latin typeface="Courier New" panose="02070309020205020404" pitchFamily="49" charset="0"/>
+                <a:cs typeface="Courier New" panose="02070309020205020404" pitchFamily="49" charset="0"/>
+              </a:rPr>
+              <a:t>Alpha                       0.05</a:t>
+            </a:r>
+          </a:p>
+          <a:p>
+            <a:r>
+              <a:rPr lang="en-US" sz="1200" u="none" dirty="0">
+                <a:latin typeface="Courier New" panose="02070309020205020404" pitchFamily="49" charset="0"/>
+                <a:cs typeface="Courier New" panose="02070309020205020404" pitchFamily="49" charset="0"/>
+              </a:rPr>
+              <a:t>                       two-sided</a:t>
+            </a:r>
+          </a:p>
+          <a:p>
+            <a:r>
+              <a:rPr lang="en-US" sz="1200" u="none" dirty="0">
+                <a:latin typeface="Courier New" panose="02070309020205020404" pitchFamily="49" charset="0"/>
+                <a:cs typeface="Courier New" panose="02070309020205020404" pitchFamily="49" charset="0"/>
+              </a:rPr>
+              <a:t>Power                       0.75</a:t>
+            </a:r>
+          </a:p>
+          <a:p>
+            <a:r>
+              <a:rPr lang="en-US" sz="1200" u="none" dirty="0">
+                <a:latin typeface="Courier New" panose="02070309020205020404" pitchFamily="49" charset="0"/>
+                <a:cs typeface="Courier New" panose="02070309020205020404" pitchFamily="49" charset="0"/>
+              </a:rPr>
+              <a:t>N2/N1                          1</a:t>
+            </a:r>
+          </a:p>
+          <a:p>
+            <a:r>
+              <a:rPr lang="en-US" sz="1200" u="none" dirty="0">
+                <a:latin typeface="Courier New" panose="02070309020205020404" pitchFamily="49" charset="0"/>
+                <a:cs typeface="Courier New" panose="02070309020205020404" pitchFamily="49" charset="0"/>
+              </a:rPr>
+              <a:t>                                </a:t>
+            </a:r>
+          </a:p>
+          <a:p>
+            <a:r>
+              <a:rPr lang="en-US" sz="1200" b="1" u="none" dirty="0">
+                <a:latin typeface="Courier New" panose="02070309020205020404" pitchFamily="49" charset="0"/>
+                <a:cs typeface="Courier New" panose="02070309020205020404" pitchFamily="49" charset="0"/>
+              </a:rPr>
+              <a:t>Required sample size   Estimated</a:t>
+            </a:r>
+          </a:p>
+          <a:p>
+            <a:r>
+              <a:rPr lang="en-US" sz="1200" b="1" u="none" dirty="0">
+                <a:latin typeface="Courier New" panose="02070309020205020404" pitchFamily="49" charset="0"/>
+                <a:cs typeface="Courier New" panose="02070309020205020404" pitchFamily="49" charset="0"/>
+              </a:rPr>
+              <a:t>N1                            56</a:t>
+            </a:r>
+          </a:p>
+          <a:p>
+            <a:r>
+              <a:rPr lang="en-US" sz="1200" b="1" u="none" dirty="0">
+                <a:latin typeface="Courier New" panose="02070309020205020404" pitchFamily="49" charset="0"/>
+                <a:cs typeface="Courier New" panose="02070309020205020404" pitchFamily="49" charset="0"/>
+              </a:rPr>
+              <a:t>N2                            56</a:t>
+            </a:r>
+          </a:p>
+        </p:txBody>
+      </p:sp>
+    </p:spTree>
+    <p:extLst>
+      <p:ext uri="{BB962C8B-B14F-4D97-AF65-F5344CB8AC3E}">
+        <p14:creationId xmlns:p14="http://schemas.microsoft.com/office/powerpoint/2010/main" val="2022512648"/>
+      </p:ext>
+    </p:extLst>
+  </p:cSld>
+  <p:clrMapOvr>
+    <a:masterClrMapping/>
+  </p:clrMapOvr>
+</p:sld>
+</file>
+
+<file path=ppt/slides/slide29.xml><?xml version="1.0" encoding="utf-8"?>
+<p:sld xmlns:a="http://schemas.openxmlformats.org/drawingml/2006/main" xmlns:r="http://schemas.openxmlformats.org/officeDocument/2006/relationships" xmlns:p="http://schemas.openxmlformats.org/presentationml/2006/main">
+  <p:cSld>
+    <p:spTree>
+      <p:nvGrpSpPr>
+        <p:cNvPr id="1" name=""/>
+        <p:cNvGrpSpPr/>
+        <p:nvPr/>
+      </p:nvGrpSpPr>
+      <p:grpSpPr>
+        <a:xfrm>
+          <a:off x="0" y="0"/>
+          <a:ext cx="0" cy="0"/>
+          <a:chOff x="0" y="0"/>
+          <a:chExt cx="0" cy="0"/>
+        </a:xfrm>
+      </p:grpSpPr>
+      <p:sp>
+        <p:nvSpPr>
+          <p:cNvPr id="3" name="Título 2">
+            <a:extLst>
+              <a:ext uri="{FF2B5EF4-FFF2-40B4-BE49-F238E27FC236}">
+                <a16:creationId xmlns:a16="http://schemas.microsoft.com/office/drawing/2014/main" id="{A568C9BD-1C10-4529-A532-FE645B48FC58}"/>
+              </a:ext>
+            </a:extLst>
+          </p:cNvPr>
+          <p:cNvSpPr>
+            <a:spLocks noGrp="1"/>
+          </p:cNvSpPr>
+          <p:nvPr>
+            <p:ph type="title"/>
+          </p:nvPr>
+        </p:nvSpPr>
+        <p:spPr/>
+        <p:txBody>
+          <a:bodyPr/>
+          <a:lstStyle/>
+          <a:p>
+            <a:r>
+              <a:rPr lang="en-US" dirty="0"/>
+              <a:t>Some examples using R</a:t>
+            </a:r>
+          </a:p>
+        </p:txBody>
+      </p:sp>
+      <p:sp>
+        <p:nvSpPr>
+          <p:cNvPr id="5" name="Marcador de texto 4">
+            <a:extLst>
+              <a:ext uri="{FF2B5EF4-FFF2-40B4-BE49-F238E27FC236}">
+                <a16:creationId xmlns:a16="http://schemas.microsoft.com/office/drawing/2014/main" id="{7FEDFCC6-2391-4A9D-9252-A5EE06A32D1E}"/>
+              </a:ext>
+            </a:extLst>
+          </p:cNvPr>
+          <p:cNvSpPr>
+            <a:spLocks noGrp="1"/>
+          </p:cNvSpPr>
+          <p:nvPr>
+            <p:ph type="body" idx="1"/>
+          </p:nvPr>
+        </p:nvSpPr>
+        <p:spPr>
+          <a:xfrm>
+            <a:off x="606095" y="1114420"/>
+            <a:ext cx="4376738" cy="442372"/>
+          </a:xfrm>
+        </p:spPr>
+        <p:txBody>
+          <a:bodyPr/>
+          <a:lstStyle/>
+          <a:p>
+            <a:r>
+              <a:rPr lang="en-US" dirty="0"/>
+              <a:t>Power from sample size</a:t>
+            </a:r>
+          </a:p>
+        </p:txBody>
+      </p:sp>
+      <p:pic>
+        <p:nvPicPr>
+          <p:cNvPr id="2" name="Imagen 1">
+            <a:extLst>
+              <a:ext uri="{FF2B5EF4-FFF2-40B4-BE49-F238E27FC236}">
+                <a16:creationId xmlns:a16="http://schemas.microsoft.com/office/drawing/2014/main" id="{15F0B2BC-215C-4FB1-8958-103F316D4745}"/>
+              </a:ext>
+            </a:extLst>
+          </p:cNvPr>
+          <p:cNvPicPr>
+            <a:picLocks noChangeAspect="1"/>
+          </p:cNvPicPr>
+          <p:nvPr/>
+        </p:nvPicPr>
+        <p:blipFill>
+          <a:blip r:embed="rId2"/>
+          <a:stretch>
+            <a:fillRect/>
+          </a:stretch>
+        </p:blipFill>
+        <p:spPr>
+          <a:xfrm>
+            <a:off x="748574" y="1583630"/>
+            <a:ext cx="2764266" cy="2031270"/>
+          </a:xfrm>
+          <a:prstGeom prst="rect">
+            <a:avLst/>
+          </a:prstGeom>
+        </p:spPr>
+      </p:pic>
+      <p:pic>
+        <p:nvPicPr>
+          <p:cNvPr id="6" name="Imagen 5">
+            <a:extLst>
+              <a:ext uri="{FF2B5EF4-FFF2-40B4-BE49-F238E27FC236}">
+                <a16:creationId xmlns:a16="http://schemas.microsoft.com/office/drawing/2014/main" id="{7FFC304B-592C-4D6D-B1C0-6964AE7702A2}"/>
+              </a:ext>
+            </a:extLst>
+          </p:cNvPr>
+          <p:cNvPicPr>
+            <a:picLocks noChangeAspect="1"/>
+          </p:cNvPicPr>
+          <p:nvPr/>
+        </p:nvPicPr>
+        <p:blipFill>
+          <a:blip r:embed="rId3"/>
+          <a:stretch>
+            <a:fillRect/>
+          </a:stretch>
+        </p:blipFill>
+        <p:spPr>
+          <a:xfrm>
+            <a:off x="4522840" y="1583669"/>
+            <a:ext cx="4534616" cy="4527464"/>
+          </a:xfrm>
+          <a:prstGeom prst="rect">
+            <a:avLst/>
+          </a:prstGeom>
+        </p:spPr>
+      </p:pic>
+      <p:sp>
+        <p:nvSpPr>
+          <p:cNvPr id="7" name="Rectángulo 6">
+            <a:extLst>
+              <a:ext uri="{FF2B5EF4-FFF2-40B4-BE49-F238E27FC236}">
+                <a16:creationId xmlns:a16="http://schemas.microsoft.com/office/drawing/2014/main" id="{66B886B0-9E91-4FB1-A410-B456A4976A0C}"/>
+              </a:ext>
+            </a:extLst>
+          </p:cNvPr>
+          <p:cNvSpPr/>
+          <p:nvPr/>
+        </p:nvSpPr>
+        <p:spPr>
+          <a:xfrm>
+            <a:off x="748574" y="3827914"/>
+            <a:ext cx="3052564" cy="2123658"/>
+          </a:xfrm>
+          <a:prstGeom prst="rect">
+            <a:avLst/>
+          </a:prstGeom>
+        </p:spPr>
+        <p:txBody>
+          <a:bodyPr wrap="square">
+            <a:spAutoFit/>
+          </a:bodyPr>
+          <a:lstStyle/>
+          <a:p>
+            <a:r>
+              <a:rPr lang="en-US" sz="1200" u="none" dirty="0">
+                <a:latin typeface="Courier New" panose="02070309020205020404" pitchFamily="49" charset="0"/>
+                <a:cs typeface="Courier New" panose="02070309020205020404" pitchFamily="49" charset="0"/>
+              </a:rPr>
+              <a:t>Assumptions</a:t>
+            </a:r>
+          </a:p>
+          <a:p>
+            <a:r>
+              <a:rPr lang="en-US" sz="1200" u="none" dirty="0">
+                <a:latin typeface="Courier New" panose="02070309020205020404" pitchFamily="49" charset="0"/>
+                <a:cs typeface="Courier New" panose="02070309020205020404" pitchFamily="49" charset="0"/>
+              </a:rPr>
+              <a:t>Difference in means           5</a:t>
+            </a:r>
+          </a:p>
+          <a:p>
+            <a:r>
+              <a:rPr lang="en-US" sz="1200" u="none" dirty="0">
+                <a:latin typeface="Courier New" panose="02070309020205020404" pitchFamily="49" charset="0"/>
+                <a:cs typeface="Courier New" panose="02070309020205020404" pitchFamily="49" charset="0"/>
+              </a:rPr>
+              <a:t>Standard deviation           10</a:t>
+            </a:r>
+          </a:p>
+          <a:p>
+            <a:r>
+              <a:rPr lang="en-US" sz="1200" u="none" dirty="0">
+                <a:latin typeface="Courier New" panose="02070309020205020404" pitchFamily="49" charset="0"/>
+                <a:cs typeface="Courier New" panose="02070309020205020404" pitchFamily="49" charset="0"/>
+              </a:rPr>
+              <a:t>Alpha                      0.05</a:t>
+            </a:r>
+          </a:p>
+          <a:p>
+            <a:r>
+              <a:rPr lang="en-US" sz="1200" u="none" dirty="0">
+                <a:latin typeface="Courier New" panose="02070309020205020404" pitchFamily="49" charset="0"/>
+                <a:cs typeface="Courier New" panose="02070309020205020404" pitchFamily="49" charset="0"/>
+              </a:rPr>
+              <a:t>                      two-sided</a:t>
+            </a:r>
+          </a:p>
+          <a:p>
+            <a:r>
+              <a:rPr lang="en-US" sz="1200" u="none" dirty="0">
+                <a:latin typeface="Courier New" panose="02070309020205020404" pitchFamily="49" charset="0"/>
+                <a:cs typeface="Courier New" panose="02070309020205020404" pitchFamily="49" charset="0"/>
+              </a:rPr>
+              <a:t>Sample size                    </a:t>
+            </a:r>
+          </a:p>
+          <a:p>
+            <a:r>
+              <a:rPr lang="en-US" sz="1200" u="none" dirty="0">
+                <a:latin typeface="Courier New" panose="02070309020205020404" pitchFamily="49" charset="0"/>
+                <a:cs typeface="Courier New" panose="02070309020205020404" pitchFamily="49" charset="0"/>
+              </a:rPr>
+              <a:t>N1                           20</a:t>
+            </a:r>
+          </a:p>
+          <a:p>
+            <a:r>
+              <a:rPr lang="en-US" sz="1200" u="none" dirty="0">
+                <a:latin typeface="Courier New" panose="02070309020205020404" pitchFamily="49" charset="0"/>
+                <a:cs typeface="Courier New" panose="02070309020205020404" pitchFamily="49" charset="0"/>
+              </a:rPr>
+              <a:t>N2                           20</a:t>
+            </a:r>
+          </a:p>
+          <a:p>
+            <a:r>
+              <a:rPr lang="en-US" sz="1200" u="none" dirty="0">
+                <a:latin typeface="Courier New" panose="02070309020205020404" pitchFamily="49" charset="0"/>
+                <a:cs typeface="Courier New" panose="02070309020205020404" pitchFamily="49" charset="0"/>
+              </a:rPr>
+              <a:t>                               </a:t>
+            </a:r>
+          </a:p>
+          <a:p>
+            <a:r>
+              <a:rPr lang="en-US" sz="1200" b="1" u="none" dirty="0">
+                <a:latin typeface="Courier New" panose="02070309020205020404" pitchFamily="49" charset="0"/>
+                <a:cs typeface="Courier New" panose="02070309020205020404" pitchFamily="49" charset="0"/>
+              </a:rPr>
+              <a:t>                      Estimated</a:t>
+            </a:r>
+          </a:p>
+          <a:p>
+            <a:r>
+              <a:rPr lang="en-US" sz="1200" b="1" u="none" dirty="0">
+                <a:latin typeface="Courier New" panose="02070309020205020404" pitchFamily="49" charset="0"/>
+                <a:cs typeface="Courier New" panose="02070309020205020404" pitchFamily="49" charset="0"/>
+              </a:rPr>
+              <a:t>Power                     0.352</a:t>
+            </a:r>
+          </a:p>
+        </p:txBody>
+      </p:sp>
+    </p:spTree>
+    <p:extLst>
+      <p:ext uri="{BB962C8B-B14F-4D97-AF65-F5344CB8AC3E}">
+        <p14:creationId xmlns:p14="http://schemas.microsoft.com/office/powerpoint/2010/main" val="1145767110"/>
+      </p:ext>
+    </p:extLst>
+  </p:cSld>
+  <p:clrMapOvr>
+    <a:masterClrMapping/>
+  </p:clrMapOvr>
+</p:sld>
+</file>
+
 <file path=ppt/slides/slide3.xml><?xml version="1.0" encoding="utf-8"?>
 <p:sld xmlns:a="http://schemas.openxmlformats.org/drawingml/2006/main" xmlns:r="http://schemas.openxmlformats.org/officeDocument/2006/relationships" xmlns:p="http://schemas.openxmlformats.org/presentationml/2006/main">
   <p:cSld>
@@ -32303,7 +36392,7 @@
           <a:graphicData uri="http://schemas.openxmlformats.org/presentationml/2006/ole">
             <mc:AlternateContent xmlns:mc="http://schemas.openxmlformats.org/markup-compatibility/2006">
               <mc:Choice xmlns:v="urn:schemas-microsoft-com:vml" Requires="v">
-                <p:oleObj spid="_x0000_s1057" name="Equation" r:id="rId4" imgW="1650960" imgH="419040" progId="Equation.DSMT4">
+                <p:oleObj spid="_x0000_s1062" name="Equation" r:id="rId4" imgW="1650960" imgH="419040" progId="Equation.DSMT4">
                   <p:embed/>
                 </p:oleObj>
               </mc:Choice>
@@ -32910,7 +36999,7 @@
           <a:graphicData uri="http://schemas.openxmlformats.org/presentationml/2006/ole">
             <mc:AlternateContent xmlns:mc="http://schemas.openxmlformats.org/markup-compatibility/2006">
               <mc:Choice xmlns:v="urn:schemas-microsoft-com:vml" Requires="v">
-                <p:oleObj spid="_x0000_s8210" name="Equation" r:id="rId4" imgW="2603160" imgH="444240" progId="Equation.DSMT4">
+                <p:oleObj spid="_x0000_s8215" name="Equation" r:id="rId4" imgW="2603160" imgH="444240" progId="Equation.DSMT4">
                   <p:embed/>
                 </p:oleObj>
               </mc:Choice>
@@ -38284,7 +42373,7 @@
           <a:graphicData uri="http://schemas.openxmlformats.org/presentationml/2006/ole">
             <mc:AlternateContent xmlns:mc="http://schemas.openxmlformats.org/markup-compatibility/2006">
               <mc:Choice xmlns:v="urn:schemas-microsoft-com:vml" Requires="v">
-                <p:oleObj spid="_x0000_s10287" name="Equation" r:id="rId3" imgW="1930320" imgH="419040" progId="Equation.DSMT4">
+                <p:oleObj spid="_x0000_s10302" name="Equation" r:id="rId3" imgW="1930320" imgH="419040" progId="Equation.DSMT4">
                   <p:embed/>
                 </p:oleObj>
               </mc:Choice>
@@ -38365,7 +42454,7 @@
           <a:graphicData uri="http://schemas.openxmlformats.org/presentationml/2006/ole">
             <mc:AlternateContent xmlns:mc="http://schemas.openxmlformats.org/markup-compatibility/2006">
               <mc:Choice xmlns:v="urn:schemas-microsoft-com:vml" Requires="v">
-                <p:oleObj spid="_x0000_s10288" name="Equation" r:id="rId5" imgW="1993680" imgH="419040" progId="Equation.DSMT4">
+                <p:oleObj spid="_x0000_s10303" name="Equation" r:id="rId5" imgW="1993680" imgH="419040" progId="Equation.DSMT4">
                   <p:embed/>
                 </p:oleObj>
               </mc:Choice>
@@ -38446,7 +42535,7 @@
           <a:graphicData uri="http://schemas.openxmlformats.org/presentationml/2006/ole">
             <mc:AlternateContent xmlns:mc="http://schemas.openxmlformats.org/markup-compatibility/2006">
               <mc:Choice xmlns:v="urn:schemas-microsoft-com:vml" Requires="v">
-                <p:oleObj spid="_x0000_s10289" name="Equation" r:id="rId7" imgW="2184120" imgH="444240" progId="Equation.DSMT4">
+                <p:oleObj spid="_x0000_s10304" name="Equation" r:id="rId7" imgW="2184120" imgH="444240" progId="Equation.DSMT4">
                   <p:embed/>
                 </p:oleObj>
               </mc:Choice>

</xml_diff>